<commit_message>
added comments and corrections
</commit_message>
<xml_diff>
--- a/doc/pres1/wk4-progress.pptx
+++ b/doc/pres1/wk4-progress.pptx
@@ -126,8 +126,45 @@
 </p:presentation>
 </file>
 
+<file path=ppt/commentAuthors.xml><?xml version="1.0" encoding="utf-8"?>
+<p:cmAuthorLst xmlns:a="http://schemas.openxmlformats.org/drawingml/2006/main" xmlns:r="http://schemas.openxmlformats.org/officeDocument/2006/relationships" xmlns:p="http://schemas.openxmlformats.org/presentationml/2006/main">
+  <p:cmAuthor id="0" name="tag1g09" initials="t" lastIdx="4" clrIdx="0"/>
+</p:cmAuthorLst>
+</file>
+
 <file path=ppt/activeX/activeX1.xml><?xml version="1.0" encoding="utf-8"?>
 <ax:ocx xmlns:ax="http://schemas.microsoft.com/office/2006/activeX" xmlns:r="http://schemas.openxmlformats.org/officeDocument/2006/relationships" ax:classid="{D27CDB6E-AE6D-11CF-96B8-444553540000}" ax:persistence="persistStorage" r:id="rId1"/>
+</file>
+
+<file path=ppt/comments/comment1.xml><?xml version="1.0" encoding="utf-8"?>
+<p:cmLst xmlns:a="http://schemas.openxmlformats.org/drawingml/2006/main" xmlns:r="http://schemas.openxmlformats.org/officeDocument/2006/relationships" xmlns:p="http://schemas.openxmlformats.org/presentationml/2006/main">
+  <p:cm authorId="0" dt="2012-10-23T13:09:23.805" idx="1">
+    <p:pos x="3290" y="1437"/>
+    <p:text>Not sure what this means</p:text>
+  </p:cm>
+  <p:cm authorId="0" dt="2012-10-23T13:10:21.004" idx="2">
+    <p:pos x="4537" y="2102"/>
+    <p:text>This looks like search engine abuse tecniques</p:text>
+  </p:cm>
+</p:cmLst>
+</file>
+
+<file path=ppt/comments/comment2.xml><?xml version="1.0" encoding="utf-8"?>
+<p:cmLst xmlns:a="http://schemas.openxmlformats.org/drawingml/2006/main" xmlns:r="http://schemas.openxmlformats.org/officeDocument/2006/relationships" xmlns:p="http://schemas.openxmlformats.org/presentationml/2006/main">
+  <p:cm authorId="0" dt="2012-10-23T13:13:15.533" idx="3">
+    <p:pos x="4661" y="3064"/>
+    <p:text>I thought it reduced the occurance of malicious pages on google. I didn't think they calculated the revenue</p:text>
+  </p:cm>
+</p:cmLst>
+</file>
+
+<file path=ppt/comments/comment3.xml><?xml version="1.0" encoding="utf-8"?>
+<p:cmLst xmlns:a="http://schemas.openxmlformats.org/drawingml/2006/main" xmlns:r="http://schemas.openxmlformats.org/officeDocument/2006/relationships" xmlns:p="http://schemas.openxmlformats.org/presentationml/2006/main">
+  <p:cm authorId="0" dt="2012-10-23T13:15:13.711" idx="4">
+    <p:pos x="10" y="10"/>
+    <p:text>This digram does seem to work, It needs finishing.</p:text>
+  </p:cm>
+</p:cmLst>
 </file>
 
 <file path=ppt/notesMasters/notesMaster1.xml><?xml version="1.0" encoding="utf-8"?>
@@ -382,6 +419,11 @@
         </p:txBody>
       </p:sp>
     </p:spTree>
+    <p:extLst>
+      <p:ext uri="{BB962C8B-B14F-4D97-AF65-F5344CB8AC3E}">
+        <p14:creationId xmlns:p14="http://schemas.microsoft.com/office/powerpoint/2010/main" val="1219798393"/>
+      </p:ext>
+    </p:extLst>
   </p:cSld>
   <p:clrMap bg1="lt1" tx1="dk1" bg2="lt2" tx2="dk2" accent1="accent1" accent2="accent2" accent3="accent3" accent4="accent4" accent5="accent5" accent6="accent6" hlink="hlink" folHlink="folHlink"/>
   <p:notesStyle>
@@ -3691,11 +3733,7 @@
             </a:r>
             <a:r>
               <a:rPr lang="en-GB" dirty="0" smtClean="0"/>
-              <a:t>. Twitter</a:t>
-            </a:r>
-            <a:r>
-              <a:rPr lang="en-GB" dirty="0" smtClean="0"/>
-              <a:t>)</a:t>
+              <a:t>. Twitter)</a:t>
             </a:r>
             <a:endParaRPr lang="en-US" dirty="0" smtClean="0"/>
           </a:p>
@@ -3820,11 +3858,7 @@
             </a:r>
             <a:r>
               <a:rPr lang="en-GB" dirty="0" smtClean="0"/>
-              <a:t>. Twitter</a:t>
-            </a:r>
-            <a:r>
-              <a:rPr lang="en-GB" dirty="0" smtClean="0"/>
-              <a:t>)</a:t>
+              <a:t>. Twitter)</a:t>
             </a:r>
             <a:endParaRPr lang="en-US" dirty="0" smtClean="0"/>
           </a:p>
@@ -3918,13 +3952,8 @@
             <a:pPr algn="ctr"/>
             <a:r>
               <a:rPr lang="en-GB" dirty="0" smtClean="0"/>
-              <a:t>Taken </a:t>
-            </a:r>
-            <a:r>
-              <a:rPr lang="en-GB" dirty="0" smtClean="0"/>
-              <a:t>2</a:t>
-            </a:r>
-            <a:endParaRPr lang="en-GB" dirty="0" smtClean="0"/>
+              <a:t>Taken 2</a:t>
+            </a:r>
           </a:p>
         </p:txBody>
       </p:sp>
@@ -3969,11 +3998,7 @@
             <a:pPr algn="ctr"/>
             <a:r>
               <a:rPr lang="en-GB" dirty="0" smtClean="0"/>
-              <a:t>Russell </a:t>
-            </a:r>
-            <a:r>
-              <a:rPr lang="en-GB" dirty="0" smtClean="0"/>
-              <a:t>Howard</a:t>
+              <a:t>Russell Howard</a:t>
             </a:r>
             <a:endParaRPr lang="en-GB" dirty="0"/>
           </a:p>
@@ -4022,7 +4047,6 @@
               <a:rPr lang="en-GB" dirty="0" smtClean="0"/>
               <a:t>Armstrong</a:t>
             </a:r>
-            <a:endParaRPr lang="en-GB" dirty="0" smtClean="0"/>
           </a:p>
         </p:txBody>
       </p:sp>
@@ -4069,7 +4093,6 @@
               <a:rPr lang="en-GB" dirty="0" smtClean="0"/>
               <a:t>Costa</a:t>
             </a:r>
-            <a:endParaRPr lang="en-GB" dirty="0" smtClean="0"/>
           </a:p>
         </p:txBody>
       </p:sp>
@@ -4114,13 +4137,8 @@
             <a:pPr algn="ctr"/>
             <a:r>
               <a:rPr lang="en-GB" dirty="0" smtClean="0"/>
-              <a:t>Taken </a:t>
-            </a:r>
-            <a:r>
-              <a:rPr lang="en-GB" dirty="0" smtClean="0"/>
-              <a:t>2a</a:t>
-            </a:r>
-            <a:endParaRPr lang="en-GB" dirty="0" smtClean="0"/>
+              <a:t>Taken 2a</a:t>
+            </a:r>
           </a:p>
         </p:txBody>
       </p:sp>
@@ -4196,8 +4214,13 @@
           <a:p>
             <a:r>
               <a:rPr lang="en-GB" dirty="0" smtClean="0"/>
-              <a:t>A website with the usual:</a:t>
-            </a:r>
+              <a:t>Technologies</a:t>
+            </a:r>
+            <a:r>
+              <a:rPr lang="en-GB" dirty="0" smtClean="0"/>
+              <a:t>:</a:t>
+            </a:r>
+            <a:endParaRPr lang="en-GB" dirty="0" smtClean="0"/>
           </a:p>
           <a:p>
             <a:pPr lvl="1"/>
@@ -4207,6 +4230,10 @@
               </a:rPr>
               <a:t>Django</a:t>
             </a:r>
+            <a:r>
+              <a:rPr lang="en-GB" dirty="0" smtClean="0"/>
+              <a:t> Web framework</a:t>
+            </a:r>
             <a:endParaRPr lang="en-GB" dirty="0" smtClean="0"/>
           </a:p>
           <a:p>
@@ -4216,6 +4243,10 @@
                 <a:hlinkClick r:id="rId3"/>
               </a:rPr>
               <a:t>Bootstrap</a:t>
+            </a:r>
+            <a:r>
+              <a:rPr lang="en-GB" dirty="0" smtClean="0"/>
+              <a:t> Frontend Framework</a:t>
             </a:r>
             <a:endParaRPr lang="en-GB" dirty="0" smtClean="0"/>
           </a:p>
@@ -4438,7 +4469,64 @@
       </p:sp>
     </p:spTree>
     <p:controls>
-      <p:control spid="1026" name="ShockwaveFlash1" r:id="rId2" imgW="8207353" imgH="4464305"/>
+      <mc:AlternateContent xmlns:mc="http://schemas.openxmlformats.org/markup-compatibility/2006">
+        <mc:Choice xmlns:v="urn:schemas-microsoft-com:vml" Requires="v">
+          <p:control spid="1026" r:id="rId2" imgW="8207353" imgH="4464305"/>
+        </mc:Choice>
+        <mc:Fallback>
+          <p:control r:id="rId2" imgW="8207353" imgH="4464305">
+            <p:pic>
+              <p:nvPicPr>
+                <p:cNvPr id="0" name="ShockwaveFlash1"/>
+                <p:cNvPicPr preferRelativeResize="0">
+                  <a:picLocks noChangeArrowheads="1" noChangeShapeType="1"/>
+                </p:cNvPicPr>
+                <p:nvPr/>
+              </p:nvPicPr>
+              <p:blipFill>
+                <a:blip r:embed="rId4">
+                  <a:extLst>
+                    <a:ext uri="{28A0092B-C50C-407E-A947-70E740481C1C}">
+                      <a14:useLocalDpi xmlns:a14="http://schemas.microsoft.com/office/drawing/2010/main" val="0"/>
+                    </a:ext>
+                  </a:extLst>
+                </a:blip>
+                <a:srcRect/>
+                <a:stretch>
+                  <a:fillRect/>
+                </a:stretch>
+              </p:blipFill>
+              <p:spPr bwMode="auto">
+                <a:xfrm>
+                  <a:off x="468313" y="1628775"/>
+                  <a:ext cx="8207375" cy="4464050"/>
+                </a:xfrm>
+                <a:prstGeom prst="rect">
+                  <a:avLst/>
+                </a:prstGeom>
+                <a:noFill/>
+                <a:ln w="9525">
+                  <a:miter lim="800000"/>
+                  <a:headEnd/>
+                  <a:tailEnd/>
+                </a:ln>
+                <a:effectLst/>
+                <a:extLst>
+                  <a:ext uri="{AF507438-7753-43E0-B8FC-AC1667EBCBE1}">
+                    <a14:hiddenEffects xmlns:a14="http://schemas.microsoft.com/office/drawing/2010/main">
+                      <a:effectLst>
+                        <a:outerShdw dist="35921" dir="2700000" algn="ctr" rotWithShape="0">
+                          <a:schemeClr val="bg2"/>
+                        </a:outerShdw>
+                      </a:effectLst>
+                    </a14:hiddenEffects>
+                  </a:ext>
+                </a:extLst>
+              </p:spPr>
+            </p:pic>
+          </p:control>
+        </mc:Fallback>
+      </mc:AlternateContent>
     </p:controls>
   </p:cSld>
   <p:clrMapOvr>
@@ -4969,7 +5057,15 @@
             </a:r>
             <a:r>
               <a:rPr lang="en-GB" dirty="0"/>
-              <a:t>: automatically detect SEO attacks and campaigns</a:t>
+              <a:t>: automatically </a:t>
+            </a:r>
+            <a:r>
+              <a:rPr lang="en-GB" dirty="0" smtClean="0"/>
+              <a:t>detects </a:t>
+            </a:r>
+            <a:r>
+              <a:rPr lang="en-GB" dirty="0"/>
+              <a:t>SEO attacks and campaigns</a:t>
             </a:r>
           </a:p>
           <a:p>
@@ -5068,7 +5164,7 @@
         <p:spPr/>
         <p:txBody>
           <a:bodyPr>
-            <a:normAutofit fontScale="92500" lnSpcReduction="20000"/>
+            <a:normAutofit fontScale="85000" lnSpcReduction="10000"/>
           </a:bodyPr>
           <a:lstStyle/>
           <a:p>
@@ -5115,30 +5211,64 @@
             <a:pPr lvl="1"/>
             <a:r>
               <a:rPr lang="en-GB" dirty="0"/>
-              <a:t>Filter search results by reviewing URL components (Low interaction)</a:t>
-            </a:r>
+              <a:t>Filter search results by reviewing URL components </a:t>
+            </a:r>
+            <a:r>
+              <a:rPr lang="en-GB" dirty="0" smtClean="0"/>
+              <a:t>(</a:t>
+            </a:r>
+            <a:r>
+              <a:rPr lang="en-GB" dirty="0" smtClean="0"/>
+              <a:t>Passive</a:t>
+            </a:r>
+            <a:r>
+              <a:rPr lang="en-GB" dirty="0" smtClean="0"/>
+              <a:t>)</a:t>
+            </a:r>
+            <a:endParaRPr lang="en-GB" dirty="0"/>
           </a:p>
           <a:p>
             <a:pPr lvl="1"/>
             <a:r>
               <a:rPr lang="en-GB" dirty="0"/>
-              <a:t>Suspicious websites are visited with a client </a:t>
-            </a:r>
-            <a:r>
-              <a:rPr lang="en-GB" dirty="0" err="1"/>
-              <a:t>honeypot</a:t>
+              <a:t>Suspicious websites are visited with a client honeypot </a:t>
+            </a:r>
+            <a:r>
+              <a:rPr lang="en-GB" dirty="0" smtClean="0"/>
+              <a:t>(Active - </a:t>
+            </a:r>
+            <a:r>
+              <a:rPr lang="en-GB" dirty="0" smtClean="0"/>
+              <a:t>Low</a:t>
+            </a:r>
+            <a:r>
+              <a:rPr lang="en-GB" dirty="0" smtClean="0"/>
+              <a:t> </a:t>
             </a:r>
             <a:r>
               <a:rPr lang="en-GB" dirty="0"/>
-              <a:t> (High interaction)</a:t>
+              <a:t>interaction)</a:t>
             </a:r>
           </a:p>
           <a:p>
             <a:pPr lvl="1"/>
             <a:r>
               <a:rPr lang="en-GB" dirty="0"/>
-              <a:t>Source code analysis with specialised VM</a:t>
-            </a:r>
+              <a:t>A</a:t>
+            </a:r>
+            <a:r>
+              <a:rPr lang="en-GB" dirty="0" smtClean="0"/>
+              <a:t>nalysis </a:t>
+            </a:r>
+            <a:r>
+              <a:rPr lang="en-GB" dirty="0"/>
+              <a:t>with specialised </a:t>
+            </a:r>
+            <a:r>
+              <a:rPr lang="en-GB" dirty="0" smtClean="0"/>
+              <a:t>VM (Active - High Interaction)</a:t>
+            </a:r>
+            <a:endParaRPr lang="en-GB" dirty="0"/>
           </a:p>
           <a:p>
             <a:endParaRPr lang="en-GB" dirty="0"/>
@@ -5223,7 +5353,7 @@
         <p:spPr/>
         <p:txBody>
           <a:bodyPr>
-            <a:normAutofit fontScale="92500"/>
+            <a:normAutofit/>
           </a:bodyPr>
           <a:lstStyle/>
           <a:p>
@@ -5239,25 +5369,11 @@
           <a:p>
             <a:r>
               <a:rPr lang="en-GB" dirty="0"/>
-              <a:t>Classification of MFA (Made for </a:t>
-            </a:r>
-            <a:r>
-              <a:rPr lang="en-GB" dirty="0" err="1"/>
-              <a:t>AdSense</a:t>
-            </a:r>
-            <a:r>
-              <a:rPr lang="en-GB" dirty="0"/>
-              <a:t>) and malware sites</a:t>
-            </a:r>
-          </a:p>
-          <a:p>
-            <a:r>
-              <a:rPr lang="en-GB" dirty="0"/>
-              <a:t>Difference between MFA and malware </a:t>
-            </a:r>
-            <a:r>
-              <a:rPr lang="en-GB" dirty="0" smtClean="0"/>
-              <a:t>site tactics</a:t>
+              <a:t>Classification of MFA (Made for AdSense) and malware </a:t>
+            </a:r>
+            <a:r>
+              <a:rPr lang="en-GB" dirty="0" smtClean="0"/>
+              <a:t>sites</a:t>
             </a:r>
             <a:endParaRPr lang="en-GB" dirty="0"/>
           </a:p>
@@ -5547,7 +5663,11 @@
           <a:p>
             <a:r>
               <a:rPr lang="en-GB" dirty="0" smtClean="0"/>
-              <a:t>Arch. Design: Task Breakdown</a:t>
+              <a:t>Arch. Design: Task </a:t>
+            </a:r>
+            <a:r>
+              <a:rPr lang="en-GB" dirty="0" smtClean="0"/>
+              <a:t>Type Breakdown</a:t>
             </a:r>
             <a:endParaRPr lang="en-GB" dirty="0"/>
           </a:p>
@@ -5566,7 +5686,7 @@
         <p:spPr/>
         <p:txBody>
           <a:bodyPr>
-            <a:normAutofit fontScale="85000" lnSpcReduction="20000"/>
+            <a:normAutofit fontScale="92500" lnSpcReduction="20000"/>
           </a:bodyPr>
           <a:lstStyle/>
           <a:p>
@@ -5609,24 +5729,33 @@
             </a:r>
             <a:r>
               <a:rPr lang="en-GB" dirty="0" smtClean="0"/>
-              <a:t> and [The Register](</a:t>
-            </a:r>
-            <a:r>
-              <a:rPr lang="en-GB" dirty="0">
+              <a:t> and </a:t>
+            </a:r>
+            <a:r>
+              <a:rPr lang="en-GB" dirty="0" smtClean="0">
                 <a:hlinkClick r:id="rId5"/>
               </a:rPr>
-              <a:t>http://www.theregister.co.uk/</a:t>
-            </a:r>
-            <a:r>
-              <a:rPr lang="en-GB" dirty="0" smtClean="0"/>
-              <a:t>]</a:t>
-            </a:r>
+              <a:t>The Register</a:t>
+            </a:r>
+            <a:endParaRPr lang="en-GB" dirty="0" smtClean="0"/>
           </a:p>
           <a:p>
             <a:pPr lvl="1"/>
             <a:r>
               <a:rPr lang="en-GB" dirty="0" smtClean="0"/>
-              <a:t>Takes no input, outputs a list of keywords</a:t>
+              <a:t>Takes no input, </a:t>
+            </a:r>
+            <a:r>
+              <a:rPr lang="en-GB" dirty="0" smtClean="0"/>
+              <a:t>returns</a:t>
+            </a:r>
+            <a:r>
+              <a:rPr lang="en-GB" dirty="0" smtClean="0"/>
+              <a:t> </a:t>
+            </a:r>
+            <a:r>
+              <a:rPr lang="en-GB" dirty="0" smtClean="0"/>
+              <a:t>a list of keywords</a:t>
             </a:r>
           </a:p>
           <a:p>
@@ -5654,7 +5783,19 @@
             <a:pPr lvl="1"/>
             <a:r>
               <a:rPr lang="en-GB" dirty="0" smtClean="0"/>
-              <a:t>Takes a keyword as input, outputs a list of URLs</a:t>
+              <a:t>Takes a keyword as input, </a:t>
+            </a:r>
+            <a:r>
+              <a:rPr lang="en-GB" dirty="0" smtClean="0"/>
+              <a:t>returns</a:t>
+            </a:r>
+            <a:r>
+              <a:rPr lang="en-GB" dirty="0" smtClean="0"/>
+              <a:t> </a:t>
+            </a:r>
+            <a:r>
+              <a:rPr lang="en-GB" dirty="0" smtClean="0"/>
+              <a:t>a list of URLs</a:t>
             </a:r>
           </a:p>
           <a:p>
@@ -5667,14 +5808,35 @@
             <a:pPr lvl="1"/>
             <a:r>
               <a:rPr lang="en-GB" dirty="0" smtClean="0"/>
-              <a:t>Dispatches a page to be scanned for malware. Either the active or passive scanning systems.</a:t>
-            </a:r>
+              <a:t>Queues a </a:t>
+            </a:r>
+            <a:r>
+              <a:rPr lang="en-GB" dirty="0" smtClean="0"/>
+              <a:t>page to be scanned for malware</a:t>
+            </a:r>
+            <a:r>
+              <a:rPr lang="en-GB" dirty="0" smtClean="0"/>
+              <a:t>.</a:t>
+            </a:r>
+            <a:endParaRPr lang="en-GB" dirty="0" smtClean="0"/>
           </a:p>
           <a:p>
             <a:pPr lvl="1"/>
             <a:r>
               <a:rPr lang="en-GB" dirty="0" smtClean="0"/>
-              <a:t>Takes a URL as input, outputs a malware report.</a:t>
+              <a:t>Takes a URL as input, </a:t>
+            </a:r>
+            <a:r>
+              <a:rPr lang="en-GB" dirty="0" smtClean="0"/>
+              <a:t>returns</a:t>
+            </a:r>
+            <a:r>
+              <a:rPr lang="en-GB" dirty="0" smtClean="0"/>
+              <a:t> </a:t>
+            </a:r>
+            <a:r>
+              <a:rPr lang="en-GB" dirty="0" smtClean="0"/>
+              <a:t>a malware report.</a:t>
             </a:r>
             <a:endParaRPr lang="en-GB" dirty="0"/>
           </a:p>

</xml_diff>

<commit_message>
added Malware detection slides
</commit_message>
<xml_diff>
--- a/doc/pres1/wk4-progress.pptx
+++ b/doc/pres1/wk4-progress.pptx
@@ -5,7 +5,7 @@
     <p:sldMasterId id="2147483648" r:id="rId1"/>
   </p:sldMasterIdLst>
   <p:notesMasterIdLst>
-    <p:notesMasterId r:id="rId19"/>
+    <p:notesMasterId r:id="rId21"/>
   </p:notesMasterIdLst>
   <p:sldIdLst>
     <p:sldId id="256" r:id="rId2"/>
@@ -20,11 +20,13 @@
     <p:sldId id="264" r:id="rId11"/>
     <p:sldId id="268" r:id="rId12"/>
     <p:sldId id="269" r:id="rId13"/>
-    <p:sldId id="265" r:id="rId14"/>
-    <p:sldId id="266" r:id="rId15"/>
-    <p:sldId id="270" r:id="rId16"/>
-    <p:sldId id="272" r:id="rId17"/>
-    <p:sldId id="273" r:id="rId18"/>
+    <p:sldId id="274" r:id="rId14"/>
+    <p:sldId id="275" r:id="rId15"/>
+    <p:sldId id="265" r:id="rId16"/>
+    <p:sldId id="266" r:id="rId17"/>
+    <p:sldId id="270" r:id="rId18"/>
+    <p:sldId id="272" r:id="rId19"/>
+    <p:sldId id="273" r:id="rId20"/>
   </p:sldIdLst>
   <p:sldSz cx="9144000" cy="6858000" type="screen4x3"/>
   <p:notesSz cx="6858000" cy="9144000"/>
@@ -4378,10 +4380,85 @@
         </p:nvSpPr>
         <p:spPr/>
         <p:txBody>
-          <a:bodyPr/>
-          <a:lstStyle/>
-          <a:p>
-            <a:endParaRPr lang="en-GB"/>
+          <a:bodyPr>
+            <a:normAutofit fontScale="92500" lnSpcReduction="20000"/>
+          </a:bodyPr>
+          <a:lstStyle/>
+          <a:p>
+            <a:r>
+              <a:rPr lang="en-GB" dirty="0"/>
+              <a:t>Two main methods for malware </a:t>
+            </a:r>
+            <a:r>
+              <a:rPr lang="en-GB" dirty="0" smtClean="0"/>
+              <a:t>detection:</a:t>
+            </a:r>
+            <a:endParaRPr lang="en-GB" dirty="0"/>
+          </a:p>
+          <a:p>
+            <a:pPr lvl="1"/>
+            <a:r>
+              <a:rPr lang="en-GB" dirty="0"/>
+              <a:t>Passive malware detection</a:t>
+            </a:r>
+          </a:p>
+          <a:p>
+            <a:pPr lvl="1"/>
+            <a:r>
+              <a:rPr lang="en-GB" dirty="0"/>
+              <a:t>Active malware detection</a:t>
+            </a:r>
+          </a:p>
+          <a:p>
+            <a:r>
+              <a:rPr lang="en-GB" dirty="0"/>
+              <a:t>Passive </a:t>
+            </a:r>
+            <a:r>
+              <a:rPr lang="en-GB" dirty="0" smtClean="0"/>
+              <a:t>method:</a:t>
+            </a:r>
+          </a:p>
+          <a:p>
+            <a:pPr lvl="1"/>
+            <a:r>
+              <a:rPr lang="en-GB" dirty="0" smtClean="0"/>
+              <a:t>A </a:t>
+            </a:r>
+            <a:r>
+              <a:rPr lang="en-GB" dirty="0"/>
+              <a:t>malicious attacker injects a malicious code into a user’s PC.</a:t>
+            </a:r>
+          </a:p>
+          <a:p>
+            <a:r>
+              <a:rPr lang="en-GB" dirty="0"/>
+              <a:t>Active </a:t>
+            </a:r>
+            <a:r>
+              <a:rPr lang="en-GB" dirty="0" smtClean="0"/>
+              <a:t>method:</a:t>
+            </a:r>
+          </a:p>
+          <a:p>
+            <a:pPr lvl="1"/>
+            <a:r>
+              <a:rPr lang="en-GB" dirty="0" smtClean="0"/>
+              <a:t>The </a:t>
+            </a:r>
+            <a:r>
+              <a:rPr lang="en-GB" dirty="0"/>
+              <a:t>malicious code collection system attempt to connect to a particular </a:t>
+            </a:r>
+            <a:r>
+              <a:rPr lang="en-GB" dirty="0" smtClean="0"/>
+              <a:t>website </a:t>
+            </a:r>
+            <a:r>
+              <a:rPr lang="en-GB" dirty="0"/>
+              <a:t>and perform malicious action on the website in question. Called client honey pot.</a:t>
+            </a:r>
+            <a:endParaRPr lang="en-GB" dirty="0"/>
           </a:p>
         </p:txBody>
       </p:sp>
@@ -4401,6 +4478,322 @@
 </file>
 
 <file path=ppt/slides/slide13.xml><?xml version="1.0" encoding="utf-8"?>
+<p:sld xmlns:a="http://schemas.openxmlformats.org/drawingml/2006/main" xmlns:r="http://schemas.openxmlformats.org/officeDocument/2006/relationships" xmlns:p="http://schemas.openxmlformats.org/presentationml/2006/main">
+  <p:cSld>
+    <p:spTree>
+      <p:nvGrpSpPr>
+        <p:cNvPr id="1" name=""/>
+        <p:cNvGrpSpPr/>
+        <p:nvPr/>
+      </p:nvGrpSpPr>
+      <p:grpSpPr>
+        <a:xfrm>
+          <a:off x="0" y="0"/>
+          <a:ext cx="0" cy="0"/>
+          <a:chOff x="0" y="0"/>
+          <a:chExt cx="0" cy="0"/>
+        </a:xfrm>
+      </p:grpSpPr>
+      <p:sp>
+        <p:nvSpPr>
+          <p:cNvPr id="2" name="Title 1"/>
+          <p:cNvSpPr>
+            <a:spLocks noGrp="1"/>
+          </p:cNvSpPr>
+          <p:nvPr>
+            <p:ph type="title"/>
+          </p:nvPr>
+        </p:nvSpPr>
+        <p:spPr/>
+        <p:txBody>
+          <a:bodyPr/>
+          <a:lstStyle/>
+          <a:p>
+            <a:r>
+              <a:rPr lang="en-GB" dirty="0" smtClean="0"/>
+              <a:t>Malware Detection</a:t>
+            </a:r>
+            <a:endParaRPr lang="en-GB" dirty="0"/>
+          </a:p>
+        </p:txBody>
+      </p:sp>
+      <p:sp>
+        <p:nvSpPr>
+          <p:cNvPr id="3" name="Content Placeholder 2"/>
+          <p:cNvSpPr>
+            <a:spLocks noGrp="1"/>
+          </p:cNvSpPr>
+          <p:nvPr>
+            <p:ph idx="1"/>
+          </p:nvPr>
+        </p:nvSpPr>
+        <p:spPr/>
+        <p:txBody>
+          <a:bodyPr>
+            <a:normAutofit fontScale="70000" lnSpcReduction="20000"/>
+          </a:bodyPr>
+          <a:lstStyle/>
+          <a:p>
+            <a:pPr marL="0" indent="0">
+              <a:buNone/>
+            </a:pPr>
+            <a:r>
+              <a:rPr lang="en-GB" dirty="0"/>
+              <a:t>The client honey pot or active method divided into two </a:t>
+            </a:r>
+            <a:r>
+              <a:rPr lang="en-GB" dirty="0" smtClean="0"/>
+              <a:t>groups:</a:t>
+            </a:r>
+          </a:p>
+          <a:p>
+            <a:r>
+              <a:rPr lang="en-GB" dirty="0" smtClean="0"/>
+              <a:t>Low </a:t>
+            </a:r>
+            <a:r>
+              <a:rPr lang="en-GB" dirty="0"/>
+              <a:t>interaction client honey </a:t>
+            </a:r>
+            <a:r>
+              <a:rPr lang="en-GB" dirty="0" smtClean="0"/>
+              <a:t>pot</a:t>
+            </a:r>
+          </a:p>
+          <a:p>
+            <a:pPr lvl="1"/>
+            <a:r>
+              <a:rPr lang="en-GB" dirty="0"/>
+              <a:t>Low interaction client honey pot</a:t>
+            </a:r>
+          </a:p>
+          <a:p>
+            <a:pPr lvl="1"/>
+            <a:r>
+              <a:rPr lang="en-GB" dirty="0"/>
+              <a:t>Determined what is a malicious website</a:t>
+            </a:r>
+          </a:p>
+          <a:p>
+            <a:pPr lvl="1"/>
+            <a:r>
+              <a:rPr lang="en-GB" dirty="0"/>
+              <a:t>The actual website is not visited</a:t>
+            </a:r>
+          </a:p>
+          <a:p>
+            <a:pPr lvl="1"/>
+            <a:r>
+              <a:rPr lang="en-GB" dirty="0"/>
+              <a:t>The source code of target website is crawled</a:t>
+            </a:r>
+          </a:p>
+          <a:p>
+            <a:pPr lvl="1"/>
+            <a:r>
+              <a:rPr lang="en-GB" dirty="0"/>
+              <a:t>Comparing website source with the malicious action pattern of the system</a:t>
+            </a:r>
+            <a:endParaRPr lang="en-GB" dirty="0" smtClean="0"/>
+          </a:p>
+          <a:p>
+            <a:r>
+              <a:rPr lang="en-GB" dirty="0"/>
+              <a:t>High interaction client honey </a:t>
+            </a:r>
+            <a:r>
+              <a:rPr lang="en-GB" dirty="0" smtClean="0"/>
+              <a:t>pot</a:t>
+            </a:r>
+          </a:p>
+          <a:p>
+            <a:pPr lvl="1"/>
+            <a:r>
+              <a:rPr lang="en-GB" dirty="0"/>
+              <a:t>Visit the website to check by using the web browser </a:t>
+            </a:r>
+          </a:p>
+          <a:p>
+            <a:pPr lvl="1"/>
+            <a:r>
+              <a:rPr lang="en-GB" dirty="0"/>
+              <a:t>Analyse the malicious website by monitoring malicious behaviour</a:t>
+            </a:r>
+          </a:p>
+          <a:p>
+            <a:pPr lvl="1"/>
+            <a:r>
+              <a:rPr lang="en-GB" dirty="0"/>
+              <a:t>Monitor files, process creation, and registry modification</a:t>
+            </a:r>
+            <a:endParaRPr lang="en-GB" dirty="0" smtClean="0"/>
+          </a:p>
+        </p:txBody>
+      </p:sp>
+    </p:spTree>
+    <p:extLst>
+      <p:ext uri="{BB962C8B-B14F-4D97-AF65-F5344CB8AC3E}">
+        <p14:creationId xmlns:p14="http://schemas.microsoft.com/office/powerpoint/2010/main" val="3521878626"/>
+      </p:ext>
+    </p:extLst>
+  </p:cSld>
+  <p:clrMapOvr>
+    <a:masterClrMapping/>
+  </p:clrMapOvr>
+  <p:timing>
+    <p:tnLst>
+      <p:par>
+        <p:cTn id="1" dur="indefinite" restart="never" nodeType="tmRoot"/>
+      </p:par>
+    </p:tnLst>
+  </p:timing>
+</p:sld>
+</file>
+
+<file path=ppt/slides/slide14.xml><?xml version="1.0" encoding="utf-8"?>
+<p:sld xmlns:a="http://schemas.openxmlformats.org/drawingml/2006/main" xmlns:r="http://schemas.openxmlformats.org/officeDocument/2006/relationships" xmlns:p="http://schemas.openxmlformats.org/presentationml/2006/main">
+  <p:cSld>
+    <p:spTree>
+      <p:nvGrpSpPr>
+        <p:cNvPr id="1" name=""/>
+        <p:cNvGrpSpPr/>
+        <p:nvPr/>
+      </p:nvGrpSpPr>
+      <p:grpSpPr>
+        <a:xfrm>
+          <a:off x="0" y="0"/>
+          <a:ext cx="0" cy="0"/>
+          <a:chOff x="0" y="0"/>
+          <a:chExt cx="0" cy="0"/>
+        </a:xfrm>
+      </p:grpSpPr>
+      <p:sp>
+        <p:nvSpPr>
+          <p:cNvPr id="2" name="Title 1"/>
+          <p:cNvSpPr>
+            <a:spLocks noGrp="1"/>
+          </p:cNvSpPr>
+          <p:nvPr>
+            <p:ph type="title"/>
+          </p:nvPr>
+        </p:nvSpPr>
+        <p:spPr/>
+        <p:txBody>
+          <a:bodyPr/>
+          <a:lstStyle/>
+          <a:p>
+            <a:r>
+              <a:rPr lang="en-GB" dirty="0" smtClean="0"/>
+              <a:t>Malware Detection</a:t>
+            </a:r>
+            <a:endParaRPr lang="en-GB" dirty="0"/>
+          </a:p>
+        </p:txBody>
+      </p:sp>
+      <p:sp>
+        <p:nvSpPr>
+          <p:cNvPr id="3" name="Content Placeholder 2"/>
+          <p:cNvSpPr>
+            <a:spLocks noGrp="1"/>
+          </p:cNvSpPr>
+          <p:nvPr>
+            <p:ph idx="1"/>
+          </p:nvPr>
+        </p:nvSpPr>
+        <p:spPr/>
+        <p:txBody>
+          <a:bodyPr>
+            <a:normAutofit/>
+          </a:bodyPr>
+          <a:lstStyle/>
+          <a:p>
+            <a:pPr marL="0" indent="0">
+              <a:buNone/>
+            </a:pPr>
+            <a:r>
+              <a:rPr lang="en-GB" dirty="0"/>
+              <a:t>There two possible solution for malware </a:t>
+            </a:r>
+            <a:r>
+              <a:rPr lang="en-GB" dirty="0" smtClean="0"/>
+              <a:t>detection:</a:t>
+            </a:r>
+          </a:p>
+          <a:p>
+            <a:r>
+              <a:rPr lang="en-GB" dirty="0" smtClean="0"/>
+              <a:t>Hybrid client honey pot</a:t>
+            </a:r>
+          </a:p>
+          <a:p>
+            <a:r>
+              <a:rPr lang="en-GB" dirty="0" smtClean="0"/>
+              <a:t>Studying </a:t>
+            </a:r>
+            <a:r>
+              <a:rPr lang="en-GB" dirty="0"/>
+              <a:t>structure of URLs </a:t>
+            </a:r>
+            <a:r>
+              <a:rPr lang="en-GB" dirty="0" smtClean="0"/>
+              <a:t>words</a:t>
+            </a:r>
+          </a:p>
+          <a:p>
+            <a:pPr lvl="1"/>
+            <a:r>
+              <a:rPr lang="en-GB" dirty="0"/>
+              <a:t>Studying the structure of URLs contains three steps:</a:t>
+            </a:r>
+          </a:p>
+          <a:p>
+            <a:pPr lvl="2"/>
+            <a:r>
+              <a:rPr lang="en-GB" dirty="0" smtClean="0"/>
+              <a:t>Identify </a:t>
+            </a:r>
+            <a:r>
+              <a:rPr lang="en-GB" dirty="0"/>
+              <a:t>suspicious websites </a:t>
+            </a:r>
+          </a:p>
+          <a:p>
+            <a:pPr lvl="2"/>
+            <a:r>
+              <a:rPr lang="en-GB" dirty="0"/>
+              <a:t>Derive lexical features for each suspicious websites</a:t>
+            </a:r>
+          </a:p>
+          <a:p>
+            <a:pPr lvl="2"/>
+            <a:r>
+              <a:rPr lang="en-GB" dirty="0"/>
+              <a:t>Perform group analysis to pick out suspicious cluster </a:t>
+            </a:r>
+          </a:p>
+        </p:txBody>
+      </p:sp>
+    </p:spTree>
+    <p:extLst>
+      <p:ext uri="{BB962C8B-B14F-4D97-AF65-F5344CB8AC3E}">
+        <p14:creationId xmlns:p14="http://schemas.microsoft.com/office/powerpoint/2010/main" val="514011514"/>
+      </p:ext>
+    </p:extLst>
+  </p:cSld>
+  <p:clrMapOvr>
+    <a:masterClrMapping/>
+  </p:clrMapOvr>
+  <p:timing>
+    <p:tnLst>
+      <p:par>
+        <p:cTn id="1" dur="indefinite" restart="never" nodeType="tmRoot"/>
+      </p:par>
+    </p:tnLst>
+  </p:timing>
+</p:sld>
+</file>
+
+<file path=ppt/slides/slide15.xml><?xml version="1.0" encoding="utf-8"?>
 <p:sld xmlns:a="http://schemas.openxmlformats.org/drawingml/2006/main" xmlns:r="http://schemas.openxmlformats.org/officeDocument/2006/relationships" xmlns:p="http://schemas.openxmlformats.org/presentationml/2006/main">
   <p:cSld>
     <p:spTree>
@@ -4542,154 +4935,6 @@
 </p:sld>
 </file>
 
-<file path=ppt/slides/slide14.xml><?xml version="1.0" encoding="utf-8"?>
-<p:sld xmlns:a="http://schemas.openxmlformats.org/drawingml/2006/main" xmlns:r="http://schemas.openxmlformats.org/officeDocument/2006/relationships" xmlns:p="http://schemas.openxmlformats.org/presentationml/2006/main">
-  <p:cSld>
-    <p:spTree>
-      <p:nvGrpSpPr>
-        <p:cNvPr id="1" name=""/>
-        <p:cNvGrpSpPr/>
-        <p:nvPr/>
-      </p:nvGrpSpPr>
-      <p:grpSpPr>
-        <a:xfrm>
-          <a:off x="0" y="0"/>
-          <a:ext cx="0" cy="0"/>
-          <a:chOff x="0" y="0"/>
-          <a:chExt cx="0" cy="0"/>
-        </a:xfrm>
-      </p:grpSpPr>
-      <p:sp>
-        <p:nvSpPr>
-          <p:cNvPr id="2" name="Title 1"/>
-          <p:cNvSpPr>
-            <a:spLocks noGrp="1"/>
-          </p:cNvSpPr>
-          <p:nvPr>
-            <p:ph type="title"/>
-          </p:nvPr>
-        </p:nvSpPr>
-        <p:spPr/>
-        <p:txBody>
-          <a:bodyPr/>
-          <a:lstStyle/>
-          <a:p>
-            <a:r>
-              <a:rPr lang="en-GB" dirty="0" smtClean="0"/>
-              <a:t>Project Progress</a:t>
-            </a:r>
-            <a:endParaRPr lang="en-GB" dirty="0"/>
-          </a:p>
-        </p:txBody>
-      </p:sp>
-      <p:sp>
-        <p:nvSpPr>
-          <p:cNvPr id="3" name="Content Placeholder 2"/>
-          <p:cNvSpPr>
-            <a:spLocks noGrp="1"/>
-          </p:cNvSpPr>
-          <p:nvPr>
-            <p:ph idx="1"/>
-          </p:nvPr>
-        </p:nvSpPr>
-        <p:spPr/>
-        <p:txBody>
-          <a:bodyPr/>
-          <a:lstStyle/>
-          <a:p>
-            <a:endParaRPr lang="en-GB" dirty="0"/>
-          </a:p>
-        </p:txBody>
-      </p:sp>
-    </p:spTree>
-  </p:cSld>
-  <p:clrMapOvr>
-    <a:masterClrMapping/>
-  </p:clrMapOvr>
-  <p:timing>
-    <p:tnLst>
-      <p:par>
-        <p:cTn id="1" dur="indefinite" restart="never" nodeType="tmRoot"/>
-      </p:par>
-    </p:tnLst>
-  </p:timing>
-</p:sld>
-</file>
-
-<file path=ppt/slides/slide15.xml><?xml version="1.0" encoding="utf-8"?>
-<p:sld xmlns:a="http://schemas.openxmlformats.org/drawingml/2006/main" xmlns:r="http://schemas.openxmlformats.org/officeDocument/2006/relationships" xmlns:p="http://schemas.openxmlformats.org/presentationml/2006/main">
-  <p:cSld>
-    <p:spTree>
-      <p:nvGrpSpPr>
-        <p:cNvPr id="1" name=""/>
-        <p:cNvGrpSpPr/>
-        <p:nvPr/>
-      </p:nvGrpSpPr>
-      <p:grpSpPr>
-        <a:xfrm>
-          <a:off x="0" y="0"/>
-          <a:ext cx="0" cy="0"/>
-          <a:chOff x="0" y="0"/>
-          <a:chExt cx="0" cy="0"/>
-        </a:xfrm>
-      </p:grpSpPr>
-      <p:sp>
-        <p:nvSpPr>
-          <p:cNvPr id="2" name="Title 1"/>
-          <p:cNvSpPr>
-            <a:spLocks noGrp="1"/>
-          </p:cNvSpPr>
-          <p:nvPr>
-            <p:ph type="title"/>
-          </p:nvPr>
-        </p:nvSpPr>
-        <p:spPr/>
-        <p:txBody>
-          <a:bodyPr/>
-          <a:lstStyle/>
-          <a:p>
-            <a:r>
-              <a:rPr lang="en-GB" dirty="0" smtClean="0"/>
-              <a:t>Remaining Work</a:t>
-            </a:r>
-            <a:endParaRPr lang="en-GB" dirty="0"/>
-          </a:p>
-        </p:txBody>
-      </p:sp>
-      <p:sp>
-        <p:nvSpPr>
-          <p:cNvPr id="3" name="Content Placeholder 2"/>
-          <p:cNvSpPr>
-            <a:spLocks noGrp="1"/>
-          </p:cNvSpPr>
-          <p:nvPr>
-            <p:ph idx="1"/>
-          </p:nvPr>
-        </p:nvSpPr>
-        <p:spPr/>
-        <p:txBody>
-          <a:bodyPr/>
-          <a:lstStyle/>
-          <a:p>
-            <a:endParaRPr lang="en-GB"/>
-          </a:p>
-        </p:txBody>
-      </p:sp>
-    </p:spTree>
-  </p:cSld>
-  <p:clrMapOvr>
-    <a:masterClrMapping/>
-  </p:clrMapOvr>
-  <p:timing>
-    <p:tnLst>
-      <p:par>
-        <p:cTn id="1" dur="indefinite" restart="never" nodeType="tmRoot"/>
-      </p:par>
-    </p:tnLst>
-  </p:timing>
-</p:sld>
-</file>
-
 <file path=ppt/slides/slide16.xml><?xml version="1.0" encoding="utf-8"?>
 <p:sld xmlns:a="http://schemas.openxmlformats.org/drawingml/2006/main" xmlns:r="http://schemas.openxmlformats.org/officeDocument/2006/relationships" xmlns:p="http://schemas.openxmlformats.org/presentationml/2006/main">
   <p:cSld>
@@ -4714,17 +4959,17 @@
             <a:spLocks noGrp="1"/>
           </p:cNvSpPr>
           <p:nvPr>
-            <p:ph type="ctrTitle"/>
-          </p:nvPr>
-        </p:nvSpPr>
-        <p:spPr/>
-        <p:txBody>
-          <a:bodyPr/>
-          <a:lstStyle/>
-          <a:p>
-            <a:r>
-              <a:rPr lang="en-GB" dirty="0" smtClean="0"/>
-              <a:t>Any Questions?</a:t>
+            <p:ph type="title"/>
+          </p:nvPr>
+        </p:nvSpPr>
+        <p:spPr/>
+        <p:txBody>
+          <a:bodyPr/>
+          <a:lstStyle/>
+          <a:p>
+            <a:r>
+              <a:rPr lang="en-GB" dirty="0" smtClean="0"/>
+              <a:t>Project Progress</a:t>
             </a:r>
             <a:endParaRPr lang="en-GB" dirty="0"/>
           </a:p>
@@ -4732,20 +4977,20 @@
       </p:sp>
       <p:sp>
         <p:nvSpPr>
-          <p:cNvPr id="3" name="Subtitle 2"/>
-          <p:cNvSpPr>
-            <a:spLocks noGrp="1"/>
-          </p:cNvSpPr>
-          <p:nvPr>
-            <p:ph type="subTitle" idx="1"/>
-          </p:nvPr>
-        </p:nvSpPr>
-        <p:spPr/>
-        <p:txBody>
-          <a:bodyPr/>
-          <a:lstStyle/>
-          <a:p>
-            <a:endParaRPr lang="en-GB"/>
+          <p:cNvPr id="3" name="Content Placeholder 2"/>
+          <p:cNvSpPr>
+            <a:spLocks noGrp="1"/>
+          </p:cNvSpPr>
+          <p:nvPr>
+            <p:ph idx="1"/>
+          </p:nvPr>
+        </p:nvSpPr>
+        <p:spPr/>
+        <p:txBody>
+          <a:bodyPr/>
+          <a:lstStyle/>
+          <a:p>
+            <a:endParaRPr lang="en-GB" dirty="0"/>
           </a:p>
         </p:txBody>
       </p:sp>
@@ -4765,6 +5010,154 @@
 </file>
 
 <file path=ppt/slides/slide17.xml><?xml version="1.0" encoding="utf-8"?>
+<p:sld xmlns:a="http://schemas.openxmlformats.org/drawingml/2006/main" xmlns:r="http://schemas.openxmlformats.org/officeDocument/2006/relationships" xmlns:p="http://schemas.openxmlformats.org/presentationml/2006/main">
+  <p:cSld>
+    <p:spTree>
+      <p:nvGrpSpPr>
+        <p:cNvPr id="1" name=""/>
+        <p:cNvGrpSpPr/>
+        <p:nvPr/>
+      </p:nvGrpSpPr>
+      <p:grpSpPr>
+        <a:xfrm>
+          <a:off x="0" y="0"/>
+          <a:ext cx="0" cy="0"/>
+          <a:chOff x="0" y="0"/>
+          <a:chExt cx="0" cy="0"/>
+        </a:xfrm>
+      </p:grpSpPr>
+      <p:sp>
+        <p:nvSpPr>
+          <p:cNvPr id="2" name="Title 1"/>
+          <p:cNvSpPr>
+            <a:spLocks noGrp="1"/>
+          </p:cNvSpPr>
+          <p:nvPr>
+            <p:ph type="title"/>
+          </p:nvPr>
+        </p:nvSpPr>
+        <p:spPr/>
+        <p:txBody>
+          <a:bodyPr/>
+          <a:lstStyle/>
+          <a:p>
+            <a:r>
+              <a:rPr lang="en-GB" dirty="0" smtClean="0"/>
+              <a:t>Remaining Work</a:t>
+            </a:r>
+            <a:endParaRPr lang="en-GB" dirty="0"/>
+          </a:p>
+        </p:txBody>
+      </p:sp>
+      <p:sp>
+        <p:nvSpPr>
+          <p:cNvPr id="3" name="Content Placeholder 2"/>
+          <p:cNvSpPr>
+            <a:spLocks noGrp="1"/>
+          </p:cNvSpPr>
+          <p:nvPr>
+            <p:ph idx="1"/>
+          </p:nvPr>
+        </p:nvSpPr>
+        <p:spPr/>
+        <p:txBody>
+          <a:bodyPr/>
+          <a:lstStyle/>
+          <a:p>
+            <a:endParaRPr lang="en-GB"/>
+          </a:p>
+        </p:txBody>
+      </p:sp>
+    </p:spTree>
+  </p:cSld>
+  <p:clrMapOvr>
+    <a:masterClrMapping/>
+  </p:clrMapOvr>
+  <p:timing>
+    <p:tnLst>
+      <p:par>
+        <p:cTn id="1" dur="indefinite" restart="never" nodeType="tmRoot"/>
+      </p:par>
+    </p:tnLst>
+  </p:timing>
+</p:sld>
+</file>
+
+<file path=ppt/slides/slide18.xml><?xml version="1.0" encoding="utf-8"?>
+<p:sld xmlns:a="http://schemas.openxmlformats.org/drawingml/2006/main" xmlns:r="http://schemas.openxmlformats.org/officeDocument/2006/relationships" xmlns:p="http://schemas.openxmlformats.org/presentationml/2006/main">
+  <p:cSld>
+    <p:spTree>
+      <p:nvGrpSpPr>
+        <p:cNvPr id="1" name=""/>
+        <p:cNvGrpSpPr/>
+        <p:nvPr/>
+      </p:nvGrpSpPr>
+      <p:grpSpPr>
+        <a:xfrm>
+          <a:off x="0" y="0"/>
+          <a:ext cx="0" cy="0"/>
+          <a:chOff x="0" y="0"/>
+          <a:chExt cx="0" cy="0"/>
+        </a:xfrm>
+      </p:grpSpPr>
+      <p:sp>
+        <p:nvSpPr>
+          <p:cNvPr id="2" name="Title 1"/>
+          <p:cNvSpPr>
+            <a:spLocks noGrp="1"/>
+          </p:cNvSpPr>
+          <p:nvPr>
+            <p:ph type="ctrTitle"/>
+          </p:nvPr>
+        </p:nvSpPr>
+        <p:spPr/>
+        <p:txBody>
+          <a:bodyPr/>
+          <a:lstStyle/>
+          <a:p>
+            <a:r>
+              <a:rPr lang="en-GB" dirty="0" smtClean="0"/>
+              <a:t>Any Questions?</a:t>
+            </a:r>
+            <a:endParaRPr lang="en-GB" dirty="0"/>
+          </a:p>
+        </p:txBody>
+      </p:sp>
+      <p:sp>
+        <p:nvSpPr>
+          <p:cNvPr id="3" name="Subtitle 2"/>
+          <p:cNvSpPr>
+            <a:spLocks noGrp="1"/>
+          </p:cNvSpPr>
+          <p:nvPr>
+            <p:ph type="subTitle" idx="1"/>
+          </p:nvPr>
+        </p:nvSpPr>
+        <p:spPr/>
+        <p:txBody>
+          <a:bodyPr/>
+          <a:lstStyle/>
+          <a:p>
+            <a:endParaRPr lang="en-GB"/>
+          </a:p>
+        </p:txBody>
+      </p:sp>
+    </p:spTree>
+  </p:cSld>
+  <p:clrMapOvr>
+    <a:masterClrMapping/>
+  </p:clrMapOvr>
+  <p:timing>
+    <p:tnLst>
+      <p:par>
+        <p:cTn id="1" dur="indefinite" restart="never" nodeType="tmRoot"/>
+      </p:par>
+    </p:tnLst>
+  </p:timing>
+</p:sld>
+</file>
+
+<file path=ppt/slides/slide19.xml><?xml version="1.0" encoding="utf-8"?>
 <p:sld xmlns:a="http://schemas.openxmlformats.org/drawingml/2006/main" xmlns:r="http://schemas.openxmlformats.org/officeDocument/2006/relationships" xmlns:p="http://schemas.openxmlformats.org/presentationml/2006/main">
   <p:cSld>
     <p:spTree>

</xml_diff>

<commit_message>
Added intro to slide set, also time issues
Beginning to re-format slides to a finished standard
</commit_message>
<xml_diff>
--- a/doc/pres1/wk4-progress.pptx
+++ b/doc/pres1/wk4-progress.pptx
@@ -134,10 +134,6 @@
 </p:cmAuthorLst>
 </file>
 
-<file path=ppt/activeX/activeX1.xml><?xml version="1.0" encoding="utf-8"?>
-<ax:ocx xmlns:ax="http://schemas.microsoft.com/office/2006/activeX" xmlns:r="http://schemas.openxmlformats.org/officeDocument/2006/relationships" ax:classid="{D27CDB6E-AE6D-11CF-96B8-444553540000}" ax:persistence="persistStorage" r:id="rId1"/>
-</file>
-
 <file path=ppt/comments/comment1.xml><?xml version="1.0" encoding="utf-8"?>
 <p:cmLst xmlns:a="http://schemas.openxmlformats.org/drawingml/2006/main" xmlns:r="http://schemas.openxmlformats.org/officeDocument/2006/relationships" xmlns:p="http://schemas.openxmlformats.org/presentationml/2006/main">
   <p:cm authorId="0" dt="2012-10-23T13:09:23.805" idx="1">
@@ -841,6 +837,13 @@
   <p:clrMapOvr>
     <a:masterClrMapping/>
   </p:clrMapOvr>
+  <p:timing>
+    <p:tnLst>
+      <p:par>
+        <p:cTn id="1" dur="indefinite" restart="never" nodeType="tmRoot"/>
+      </p:par>
+    </p:tnLst>
+  </p:timing>
 </p:sldLayout>
 </file>
 
@@ -3302,6 +3305,13 @@
     <p:sldLayoutId id="2147483658" r:id="rId10"/>
     <p:sldLayoutId id="2147483659" r:id="rId11"/>
   </p:sldLayoutIdLst>
+  <p:timing>
+    <p:tnLst>
+      <p:par>
+        <p:cTn id="1" dur="indefinite" restart="never" nodeType="tmRoot"/>
+      </p:par>
+    </p:tnLst>
+  </p:timing>
   <p:txStyles>
     <p:titleStyle>
       <a:lvl1pPr algn="ctr" defTabSz="914400" rtl="0" eaLnBrk="1" latinLnBrk="0" hangingPunct="1">
@@ -3589,7 +3599,7 @@
           <a:p>
             <a:r>
               <a:rPr lang="en-GB" dirty="0" smtClean="0"/>
-              <a:t>MALUCRAWL</a:t>
+              <a:t>Malucrawl</a:t>
             </a:r>
             <a:endParaRPr lang="en-GB" dirty="0"/>
           </a:p>
@@ -3622,6 +3632,10 @@
             <a:r>
               <a:rPr lang="en-GB" dirty="0" smtClean="0"/>
               <a:t>Week 4 Progress </a:t>
+            </a:r>
+            <a:r>
+              <a:rPr lang="en-GB" dirty="0" smtClean="0"/>
+              <a:t>Seminar</a:t>
             </a:r>
             <a:endParaRPr lang="en-GB" dirty="0"/>
           </a:p>
@@ -3794,15 +3808,7 @@
             </a:r>
             <a:r>
               <a:rPr lang="en-GB" dirty="0" smtClean="0"/>
-              <a:t>. </a:t>
-            </a:r>
-            <a:r>
-              <a:rPr lang="en-GB" dirty="0" err="1" smtClean="0"/>
-              <a:t>Dogpile</a:t>
-            </a:r>
-            <a:r>
-              <a:rPr lang="en-GB" dirty="0" smtClean="0"/>
-              <a:t>)</a:t>
+              <a:t>. Dogpile)</a:t>
             </a:r>
           </a:p>
         </p:txBody>
@@ -4216,73 +4222,28 @@
           <a:p>
             <a:r>
               <a:rPr lang="en-GB" dirty="0" smtClean="0"/>
-              <a:t>Technologies</a:t>
-            </a:r>
-            <a:r>
-              <a:rPr lang="en-GB" dirty="0" smtClean="0"/>
-              <a:t>:</a:t>
-            </a:r>
-            <a:endParaRPr lang="en-GB" dirty="0" smtClean="0"/>
+              <a:t>Technologies:</a:t>
+            </a:r>
           </a:p>
           <a:p>
             <a:pPr lvl="1"/>
             <a:r>
-              <a:rPr lang="en-GB" dirty="0" err="1" smtClean="0">
-                <a:hlinkClick r:id="rId2"/>
-              </a:rPr>
-              <a:t>Django</a:t>
-            </a:r>
-            <a:r>
-              <a:rPr lang="en-GB" dirty="0" smtClean="0"/>
-              <a:t> Web framework</a:t>
-            </a:r>
-            <a:endParaRPr lang="en-GB" dirty="0" smtClean="0"/>
+              <a:rPr lang="en-GB" dirty="0" smtClean="0"/>
+              <a:t>Django Web framework</a:t>
+            </a:r>
           </a:p>
           <a:p>
             <a:pPr lvl="1"/>
             <a:r>
-              <a:rPr lang="en-GB" dirty="0" smtClean="0">
-                <a:hlinkClick r:id="rId3"/>
-              </a:rPr>
-              <a:t>Bootstrap</a:t>
-            </a:r>
-            <a:r>
-              <a:rPr lang="en-GB" dirty="0" smtClean="0"/>
-              <a:t> Frontend Framework</a:t>
-            </a:r>
-            <a:endParaRPr lang="en-GB" dirty="0" smtClean="0"/>
+              <a:rPr lang="en-GB" dirty="0" smtClean="0"/>
+              <a:t>Bootstrap Frontend Framework</a:t>
+            </a:r>
           </a:p>
           <a:p>
             <a:pPr lvl="1"/>
             <a:r>
-              <a:rPr lang="en-GB" dirty="0" err="1" smtClean="0">
-                <a:hlinkClick r:id="rId4"/>
-              </a:rPr>
-              <a:t>jQuery</a:t>
-            </a:r>
-            <a:r>
-              <a:rPr lang="en-GB" dirty="0" smtClean="0"/>
-              <a:t>, </a:t>
-            </a:r>
-            <a:r>
-              <a:rPr lang="en-GB" dirty="0" err="1" smtClean="0">
-                <a:hlinkClick r:id="rId5"/>
-              </a:rPr>
-              <a:t>AngularJS</a:t>
-            </a:r>
-            <a:r>
-              <a:rPr lang="en-GB" dirty="0" smtClean="0"/>
-              <a:t>, </a:t>
-            </a:r>
-            <a:r>
-              <a:rPr lang="en-GB" dirty="0" smtClean="0">
-                <a:hlinkClick r:id="rId6"/>
-              </a:rPr>
-              <a:t>D3.js</a:t>
-            </a:r>
-            <a:r>
-              <a:rPr lang="en-GB" dirty="0" smtClean="0"/>
-              <a:t> etc...</a:t>
+              <a:rPr lang="en-GB" dirty="0" smtClean="0"/>
+              <a:t>jQuery, AngularJS, D3.js etc...</a:t>
             </a:r>
           </a:p>
           <a:p>
@@ -4458,7 +4419,6 @@
               <a:rPr lang="en-GB" dirty="0"/>
               <a:t>and perform malicious action on the website in question. Called client honey pot.</a:t>
             </a:r>
-            <a:endParaRPr lang="en-GB" dirty="0"/>
           </a:p>
         </p:txBody>
       </p:sp>
@@ -4827,100 +4787,40 @@
           <a:p>
             <a:r>
               <a:rPr lang="en-GB" dirty="0" smtClean="0"/>
-              <a:t>A </a:t>
-            </a:r>
-            <a:r>
-              <a:rPr lang="en-GB" i="1" dirty="0" smtClean="0"/>
-              <a:t>Demo</a:t>
-            </a:r>
-            <a:r>
-              <a:rPr lang="en-GB" dirty="0" smtClean="0"/>
-              <a:t> Perchance?</a:t>
+              <a:t>Framework Demo</a:t>
             </a:r>
             <a:endParaRPr lang="en-GB" dirty="0"/>
           </a:p>
         </p:txBody>
       </p:sp>
-      <p:sp>
-        <p:nvSpPr>
-          <p:cNvPr id="3" name="Content Placeholder 2"/>
-          <p:cNvSpPr>
-            <a:spLocks noGrp="1"/>
-          </p:cNvSpPr>
+      <p:pic>
+        <p:nvPicPr>
+          <p:cNvPr id="8" name="F1_BY9V8YTo?version=3&amp;hl=en_US&amp;rel=0"/>
+          <p:cNvPicPr>
+            <a:picLocks noGrp="1" noRot="1" noChangeAspect="1"/>
+          </p:cNvPicPr>
           <p:nvPr>
             <p:ph idx="1"/>
-          </p:nvPr>
-        </p:nvSpPr>
-        <p:spPr/>
-        <p:txBody>
-          <a:bodyPr/>
-          <a:lstStyle/>
-          <a:p>
-            <a:endParaRPr lang="en-GB" dirty="0"/>
-          </a:p>
-        </p:txBody>
-      </p:sp>
+            <a:videoFile r:link="rId1"/>
+          </p:nvPr>
+        </p:nvPicPr>
+        <p:blipFill>
+          <a:blip r:embed="rId3"/>
+          <a:stretch>
+            <a:fillRect/>
+          </a:stretch>
+        </p:blipFill>
+        <p:spPr>
+          <a:xfrm>
+            <a:off x="899592" y="1124744"/>
+            <a:ext cx="7287949" cy="5465962"/>
+          </a:xfrm>
+          <a:prstGeom prst="rect">
+            <a:avLst/>
+          </a:prstGeom>
+        </p:spPr>
+      </p:pic>
     </p:spTree>
-    <p:controls>
-      <mc:AlternateContent xmlns:mc="http://schemas.openxmlformats.org/markup-compatibility/2006">
-        <mc:Choice xmlns:v="urn:schemas-microsoft-com:vml" Requires="v">
-          <p:control spid="1026" r:id="rId2" imgW="8207353" imgH="4464305"/>
-        </mc:Choice>
-        <mc:Fallback>
-          <p:control r:id="rId2" imgW="8207353" imgH="4464305">
-            <p:pic>
-              <p:nvPicPr>
-                <p:cNvPr id="0" name="ShockwaveFlash1"/>
-                <p:cNvPicPr preferRelativeResize="0">
-                  <a:picLocks noChangeArrowheads="1" noChangeShapeType="1"/>
-                </p:cNvPicPr>
-                <p:nvPr/>
-              </p:nvPicPr>
-              <p:blipFill>
-                <a:blip r:embed="rId4">
-                  <a:extLst>
-                    <a:ext uri="{28A0092B-C50C-407E-A947-70E740481C1C}">
-                      <a14:useLocalDpi xmlns:a14="http://schemas.microsoft.com/office/drawing/2010/main" val="0"/>
-                    </a:ext>
-                  </a:extLst>
-                </a:blip>
-                <a:srcRect/>
-                <a:stretch>
-                  <a:fillRect/>
-                </a:stretch>
-              </p:blipFill>
-              <p:spPr bwMode="auto">
-                <a:xfrm>
-                  <a:off x="468313" y="1628775"/>
-                  <a:ext cx="8207375" cy="4464050"/>
-                </a:xfrm>
-                <a:prstGeom prst="rect">
-                  <a:avLst/>
-                </a:prstGeom>
-                <a:noFill/>
-                <a:ln w="9525">
-                  <a:miter lim="800000"/>
-                  <a:headEnd/>
-                  <a:tailEnd/>
-                </a:ln>
-                <a:effectLst/>
-                <a:extLst>
-                  <a:ext uri="{AF507438-7753-43E0-B8FC-AC1667EBCBE1}">
-                    <a14:hiddenEffects xmlns:a14="http://schemas.microsoft.com/office/drawing/2010/main">
-                      <a:effectLst>
-                        <a:outerShdw dist="35921" dir="2700000" algn="ctr" rotWithShape="0">
-                          <a:schemeClr val="bg2"/>
-                        </a:outerShdw>
-                      </a:effectLst>
-                    </a14:hiddenEffects>
-                  </a:ext>
-                </a:extLst>
-              </p:spPr>
-            </p:pic>
-          </p:control>
-        </mc:Fallback>
-      </mc:AlternateContent>
-    </p:controls>
   </p:cSld>
   <p:clrMapOvr>
     <a:masterClrMapping/>
@@ -4928,7 +4828,80 @@
   <p:timing>
     <p:tnLst>
       <p:par>
-        <p:cTn id="1" dur="indefinite" restart="never" nodeType="tmRoot"/>
+        <p:cTn id="1" dur="indefinite" restart="never" nodeType="tmRoot">
+          <p:childTnLst>
+            <p:seq concurrent="1" nextAc="seek">
+              <p:cTn id="2" dur="indefinite" nodeType="mainSeq">
+                <p:childTnLst>
+                  <p:par>
+                    <p:cTn id="3" fill="hold">
+                      <p:stCondLst>
+                        <p:cond delay="indefinite"/>
+                        <p:cond evt="onBegin" delay="0">
+                          <p:tn val="2"/>
+                        </p:cond>
+                      </p:stCondLst>
+                      <p:childTnLst>
+                        <p:par>
+                          <p:cTn id="4" fill="hold">
+                            <p:stCondLst>
+                              <p:cond delay="0"/>
+                            </p:stCondLst>
+                            <p:childTnLst>
+                              <p:par>
+                                <p:cTn id="5" presetID="1" presetClass="mediacall" presetSubtype="0" fill="hold" nodeType="afterEffect">
+                                  <p:stCondLst>
+                                    <p:cond delay="0"/>
+                                  </p:stCondLst>
+                                  <p:childTnLst>
+                                    <p:cmd type="call" cmd="playFrom(0.0)">
+                                      <p:cBhvr>
+                                        <p:cTn id="6" dur="1" fill="hold"/>
+                                        <p:tgtEl>
+                                          <p:spTgt spid="8"/>
+                                        </p:tgtEl>
+                                      </p:cBhvr>
+                                    </p:cmd>
+                                  </p:childTnLst>
+                                </p:cTn>
+                              </p:par>
+                            </p:childTnLst>
+                          </p:cTn>
+                        </p:par>
+                      </p:childTnLst>
+                    </p:cTn>
+                  </p:par>
+                </p:childTnLst>
+              </p:cTn>
+              <p:prevCondLst>
+                <p:cond evt="onPrev" delay="0">
+                  <p:tgtEl>
+                    <p:sldTgt/>
+                  </p:tgtEl>
+                </p:cond>
+              </p:prevCondLst>
+              <p:nextCondLst>
+                <p:cond evt="onNext" delay="0">
+                  <p:tgtEl>
+                    <p:sldTgt/>
+                  </p:tgtEl>
+                </p:cond>
+              </p:nextCondLst>
+            </p:seq>
+            <p:video>
+              <p:cMediaNode vol="80000">
+                <p:cTn id="7" fill="hold" display="0">
+                  <p:stCondLst>
+                    <p:cond delay="indefinite"/>
+                  </p:stCondLst>
+                </p:cTn>
+                <p:tgtEl>
+                  <p:spTgt spid="8"/>
+                </p:tgtEl>
+              </p:cMediaNode>
+            </p:video>
+          </p:childTnLst>
+        </p:cTn>
       </p:par>
     </p:tnLst>
   </p:timing>
@@ -5212,10 +5185,29 @@
           <a:bodyPr/>
           <a:lstStyle/>
           <a:p>
-            <a:r>
-              <a:rPr lang="en-GB" dirty="0" smtClean="0"/>
-              <a:t>Paper references etc.</a:t>
-            </a:r>
+            <a:pPr marL="971550" lvl="1" indent="-514350">
+              <a:buFont typeface="+mj-lt"/>
+              <a:buAutoNum type="arabicPeriod"/>
+            </a:pPr>
+            <a:r>
+              <a:rPr lang="en-GB" dirty="0">
+                <a:hlinkClick r:id="rId2"/>
+              </a:rPr>
+              <a:t>http://</a:t>
+            </a:r>
+            <a:r>
+              <a:rPr lang="en-GB" dirty="0" smtClean="0">
+                <a:hlinkClick r:id="rId2"/>
+              </a:rPr>
+              <a:t>www.mcafee.com/us/about/news/2012/q3/20120910-01.aspx?cid=110907</a:t>
+            </a:r>
+            <a:endParaRPr lang="en-GB" dirty="0" smtClean="0"/>
+          </a:p>
+          <a:p>
+            <a:pPr marL="971550" lvl="1" indent="-514350">
+              <a:buFont typeface="+mj-lt"/>
+              <a:buAutoNum type="arabicPeriod"/>
+            </a:pPr>
             <a:endParaRPr lang="en-GB" dirty="0"/>
           </a:p>
         </p:txBody>
@@ -5291,26 +5283,57 @@
           <a:lstStyle/>
           <a:p>
             <a:r>
-              <a:rPr lang="en-GB" dirty="0" err="1" smtClean="0"/>
-              <a:t>Teh</a:t>
-            </a:r>
-            <a:r>
-              <a:rPr lang="en-GB" dirty="0" smtClean="0"/>
-              <a:t> Problem</a:t>
-            </a:r>
-          </a:p>
-          <a:p>
-            <a:r>
-              <a:rPr lang="en-GB" dirty="0" smtClean="0"/>
-              <a:t>Stuff from brief</a:t>
-            </a:r>
-          </a:p>
-          <a:p>
-            <a:r>
-              <a:rPr lang="en-GB" dirty="0" err="1" smtClean="0"/>
-              <a:t>Lololol</a:t>
-            </a:r>
-            <a:endParaRPr lang="en-GB" dirty="0" smtClean="0"/>
+              <a:rPr lang="en-GB" dirty="0" smtClean="0"/>
+              <a:t>Trending Topics</a:t>
+            </a:r>
+          </a:p>
+          <a:p>
+            <a:pPr lvl="1"/>
+            <a:r>
+              <a:rPr lang="en-GB" dirty="0" smtClean="0"/>
+              <a:t>Twitter</a:t>
+            </a:r>
+          </a:p>
+          <a:p>
+            <a:pPr lvl="1"/>
+            <a:r>
+              <a:rPr lang="en-GB" dirty="0" smtClean="0"/>
+              <a:t>Media</a:t>
+            </a:r>
+          </a:p>
+          <a:p>
+            <a:pPr lvl="1"/>
+            <a:r>
+              <a:rPr lang="en-GB" dirty="0" smtClean="0"/>
+              <a:t>Google</a:t>
+            </a:r>
+            <a:endParaRPr lang="en-GB" dirty="0"/>
+          </a:p>
+          <a:p>
+            <a:r>
+              <a:rPr lang="en-GB" dirty="0" smtClean="0"/>
+              <a:t>Is Malware targeted towards trends?</a:t>
+            </a:r>
+          </a:p>
+          <a:p>
+            <a:pPr lvl="1"/>
+            <a:r>
+              <a:rPr lang="en-GB" dirty="0" smtClean="0"/>
+              <a:t>Emma Watson =&gt; Malware?</a:t>
+            </a:r>
+          </a:p>
+          <a:p>
+            <a:pPr lvl="1"/>
+            <a:r>
+              <a:rPr lang="en-GB" dirty="0" smtClean="0"/>
+              <a:t>McAfee Report</a:t>
+            </a:r>
+          </a:p>
+          <a:p>
+            <a:r>
+              <a:rPr lang="en-GB" dirty="0" smtClean="0"/>
+              <a:t>Build Distributed Framework</a:t>
+            </a:r>
           </a:p>
         </p:txBody>
       </p:sp>
@@ -5391,96 +5414,89 @@
           <a:lstStyle/>
           <a:p>
             <a:r>
-              <a:rPr lang="en-GB" dirty="0"/>
+              <a:rPr lang="en-GB" dirty="0" smtClean="0"/>
               <a:t>SEO: Search Engine Optimization techniques</a:t>
             </a:r>
           </a:p>
           <a:p>
             <a:pPr lvl="1"/>
             <a:r>
-              <a:rPr lang="en-GB" dirty="0"/>
+              <a:rPr lang="en-GB" dirty="0" smtClean="0"/>
               <a:t>Optimization of page rank / Search-result poisoning</a:t>
             </a:r>
           </a:p>
           <a:p>
             <a:pPr lvl="1"/>
             <a:r>
-              <a:rPr lang="en-GB" dirty="0"/>
+              <a:rPr lang="en-GB" dirty="0" smtClean="0"/>
               <a:t>Cloaking techniques from attacker</a:t>
             </a:r>
           </a:p>
           <a:p>
             <a:pPr lvl="1"/>
             <a:r>
-              <a:rPr lang="en-GB" dirty="0"/>
+              <a:rPr lang="en-GB" dirty="0" smtClean="0"/>
               <a:t>Classified into White-hat and Black-hat</a:t>
             </a:r>
           </a:p>
           <a:p>
             <a:r>
-              <a:rPr lang="en-GB" dirty="0"/>
+              <a:rPr lang="en-GB" dirty="0" smtClean="0"/>
               <a:t>Why SEO attack is successful:</a:t>
             </a:r>
           </a:p>
           <a:p>
             <a:pPr lvl="1"/>
             <a:r>
-              <a:rPr lang="en-GB" dirty="0"/>
+              <a:rPr lang="en-GB" dirty="0" smtClean="0"/>
               <a:t>Generation of relevant content</a:t>
             </a:r>
           </a:p>
           <a:p>
             <a:pPr lvl="1"/>
             <a:r>
-              <a:rPr lang="en-GB" dirty="0"/>
+              <a:rPr lang="en-GB" dirty="0" smtClean="0"/>
               <a:t>Targeting multiple trending keywords</a:t>
             </a:r>
           </a:p>
           <a:p>
             <a:pPr lvl="1"/>
             <a:r>
-              <a:rPr lang="en-GB" dirty="0"/>
+              <a:rPr lang="en-GB" dirty="0" smtClean="0"/>
               <a:t>Creating dense link structures to increase page rank</a:t>
             </a:r>
           </a:p>
           <a:p>
             <a:r>
-              <a:rPr lang="en-GB" dirty="0" err="1"/>
+              <a:rPr lang="en-GB" dirty="0" err="1" smtClean="0"/>
               <a:t>deSEO</a:t>
             </a:r>
             <a:r>
-              <a:rPr lang="en-GB" dirty="0"/>
-              <a:t>: automatically </a:t>
-            </a:r>
-            <a:r>
-              <a:rPr lang="en-GB" dirty="0" smtClean="0"/>
-              <a:t>detects </a:t>
-            </a:r>
-            <a:r>
-              <a:rPr lang="en-GB" dirty="0"/>
-              <a:t>SEO attacks and campaigns</a:t>
+              <a:rPr lang="en-GB" dirty="0" smtClean="0"/>
+              <a:t>: automatically detects SEO attacks and campaigns</a:t>
             </a:r>
           </a:p>
           <a:p>
             <a:pPr lvl="1"/>
             <a:r>
-              <a:rPr lang="en-GB" dirty="0"/>
+              <a:rPr lang="en-GB" dirty="0" smtClean="0"/>
               <a:t>History-based detection</a:t>
             </a:r>
           </a:p>
           <a:p>
             <a:pPr lvl="1"/>
             <a:r>
-              <a:rPr lang="en-GB" dirty="0"/>
+              <a:rPr lang="en-GB" dirty="0" smtClean="0"/>
               <a:t>Clustering of suspicious domains</a:t>
             </a:r>
           </a:p>
           <a:p>
             <a:pPr lvl="1"/>
             <a:r>
-              <a:rPr lang="en-GB" dirty="0"/>
+              <a:rPr lang="en-GB" dirty="0" smtClean="0"/>
               <a:t>Group analysis</a:t>
             </a:r>
+            <a:endParaRPr lang="en-GB" dirty="0"/>
           </a:p>
         </p:txBody>
       </p:sp>
@@ -5608,15 +5624,7 @@
             </a:r>
             <a:r>
               <a:rPr lang="en-GB" dirty="0" smtClean="0"/>
-              <a:t>(</a:t>
-            </a:r>
-            <a:r>
-              <a:rPr lang="en-GB" dirty="0" smtClean="0"/>
-              <a:t>Passive</a:t>
-            </a:r>
-            <a:r>
-              <a:rPr lang="en-GB" dirty="0" smtClean="0"/>
-              <a:t>)</a:t>
+              <a:t>(Passive)</a:t>
             </a:r>
             <a:endParaRPr lang="en-GB" dirty="0"/>
           </a:p>
@@ -5628,15 +5636,7 @@
             </a:r>
             <a:r>
               <a:rPr lang="en-GB" dirty="0" smtClean="0"/>
-              <a:t>(Active - </a:t>
-            </a:r>
-            <a:r>
-              <a:rPr lang="en-GB" dirty="0" smtClean="0"/>
-              <a:t>Low</a:t>
-            </a:r>
-            <a:r>
-              <a:rPr lang="en-GB" dirty="0" smtClean="0"/>
-              <a:t> </a:t>
+              <a:t>(Active - Low </a:t>
             </a:r>
             <a:r>
               <a:rPr lang="en-GB" dirty="0"/>
@@ -5860,8 +5860,88 @@
         </p:nvSpPr>
         <p:spPr/>
         <p:txBody>
-          <a:bodyPr/>
-          <a:lstStyle/>
+          <a:bodyPr>
+            <a:normAutofit fontScale="85000" lnSpcReduction="10000"/>
+          </a:bodyPr>
+          <a:lstStyle/>
+          <a:p>
+            <a:r>
+              <a:rPr lang="en-GB" dirty="0"/>
+              <a:t>Time cost for data collection in the previous reports:</a:t>
+            </a:r>
+          </a:p>
+          <a:p>
+            <a:pPr lvl="1"/>
+            <a:r>
+              <a:rPr lang="en-GB" dirty="0" err="1"/>
+              <a:t>deSEO</a:t>
+            </a:r>
+            <a:r>
+              <a:rPr lang="en-GB" dirty="0"/>
+              <a:t>:  28th May 2010 --- 3rd Feb 2011     (~7 months)</a:t>
+            </a:r>
+          </a:p>
+          <a:p>
+            <a:pPr lvl="1"/>
+            <a:r>
+              <a:rPr lang="en-GB" dirty="0"/>
+              <a:t>Automatic Malware Collecting System:  22nd Nov 2010 --- 11th Jan 2011     (~2 months)</a:t>
+            </a:r>
+          </a:p>
+          <a:p>
+            <a:pPr lvl="1"/>
+            <a:r>
+              <a:rPr lang="en-GB" dirty="0"/>
+              <a:t>Trending-term Exploitation:  24th Jul 2010 --- 24 Apr 2011     (9 months)</a:t>
+            </a:r>
+          </a:p>
+          <a:p>
+            <a:pPr marL="0" indent="0">
+              <a:buNone/>
+            </a:pPr>
+            <a:endParaRPr lang="en-GB" dirty="0" smtClean="0"/>
+          </a:p>
+          <a:p>
+            <a:pPr marL="0" indent="0">
+              <a:buNone/>
+            </a:pPr>
+            <a:r>
+              <a:rPr lang="en-GB" dirty="0" smtClean="0"/>
+              <a:t>The </a:t>
+            </a:r>
+            <a:r>
+              <a:rPr lang="en-GB" dirty="0"/>
+              <a:t>time we have: 1st Oct 2012 </a:t>
+            </a:r>
+            <a:r>
+              <a:rPr lang="en-GB" dirty="0" smtClean="0"/>
+              <a:t>- </a:t>
+            </a:r>
+            <a:r>
+              <a:rPr lang="en-GB" dirty="0"/>
+              <a:t>13th Dec 2012  </a:t>
+            </a:r>
+            <a:r>
+              <a:rPr lang="en-GB" dirty="0" smtClean="0"/>
+              <a:t>(~2 </a:t>
+            </a:r>
+            <a:r>
+              <a:rPr lang="en-GB" dirty="0"/>
+              <a:t>month)</a:t>
+            </a:r>
+          </a:p>
+          <a:p>
+            <a:r>
+              <a:rPr lang="en-GB" dirty="0"/>
+              <a:t>Start the project from scratch</a:t>
+            </a:r>
+          </a:p>
+          <a:p>
+            <a:r>
+              <a:rPr lang="en-GB" dirty="0"/>
+              <a:t>2 presentations</a:t>
+            </a:r>
+          </a:p>
           <a:p>
             <a:endParaRPr lang="en-GB" dirty="0"/>
           </a:p>
@@ -5951,34 +6031,12 @@
           <a:p>
             <a:pPr lvl="1"/>
             <a:r>
-              <a:rPr lang="en-GB" dirty="0" smtClean="0">
-                <a:hlinkClick r:id="rId2"/>
-              </a:rPr>
+              <a:rPr lang="en-GB" dirty="0" smtClean="0"/>
               <a:t>Celery</a:t>
             </a:r>
             <a:r>
               <a:rPr lang="en-GB" dirty="0"/>
-              <a:t> with </a:t>
-            </a:r>
-            <a:r>
-              <a:rPr lang="en-GB" dirty="0" err="1">
-                <a:hlinkClick r:id="rId3"/>
-              </a:rPr>
-              <a:t>RabbitMQ</a:t>
-            </a:r>
-            <a:r>
-              <a:rPr lang="en-GB" dirty="0"/>
-              <a:t> for message passing and </a:t>
-            </a:r>
-            <a:r>
-              <a:rPr lang="en-GB" dirty="0" err="1">
-                <a:hlinkClick r:id="rId4"/>
-              </a:rPr>
-              <a:t>Redis</a:t>
-            </a:r>
-            <a:r>
-              <a:rPr lang="en-GB" dirty="0"/>
-              <a:t> to store results</a:t>
+              <a:t> with RabbitMQ for message passing and Redis to store results</a:t>
             </a:r>
           </a:p>
           <a:p>
@@ -6056,11 +6114,7 @@
           <a:p>
             <a:r>
               <a:rPr lang="en-GB" dirty="0" smtClean="0"/>
-              <a:t>Arch. Design: Task </a:t>
-            </a:r>
-            <a:r>
-              <a:rPr lang="en-GB" dirty="0" smtClean="0"/>
-              <a:t>Type Breakdown</a:t>
+              <a:t>Arch. Design: Task Type Breakdown</a:t>
             </a:r>
             <a:endParaRPr lang="en-GB" dirty="0"/>
           </a:p>
@@ -6095,9 +6149,7 @@
               <a:t>Find trends on </a:t>
             </a:r>
             <a:r>
-              <a:rPr lang="en-GB" dirty="0">
-                <a:hlinkClick r:id="rId2"/>
-              </a:rPr>
+              <a:rPr lang="en-GB" dirty="0"/>
               <a:t>Twitter</a:t>
             </a:r>
             <a:r>
@@ -6105,9 +6157,7 @@
               <a:t>, or news feeds like </a:t>
             </a:r>
             <a:r>
-              <a:rPr lang="en-GB" dirty="0">
-                <a:hlinkClick r:id="rId3"/>
-              </a:rPr>
+              <a:rPr lang="en-GB" dirty="0"/>
               <a:t>The Sun</a:t>
             </a:r>
             <a:r>
@@ -6115,40 +6165,19 @@
               <a:t>, </a:t>
             </a:r>
             <a:r>
-              <a:rPr lang="en-GB" dirty="0">
-                <a:hlinkClick r:id="rId4"/>
-              </a:rPr>
+              <a:rPr lang="en-GB" dirty="0"/>
               <a:t>BBC News</a:t>
             </a:r>
             <a:r>
               <a:rPr lang="en-GB" dirty="0" smtClean="0"/>
-              <a:t> and </a:t>
-            </a:r>
-            <a:r>
-              <a:rPr lang="en-GB" dirty="0" smtClean="0">
-                <a:hlinkClick r:id="rId5"/>
-              </a:rPr>
-              <a:t>The Register</a:t>
-            </a:r>
-            <a:endParaRPr lang="en-GB" dirty="0" smtClean="0"/>
+              <a:t> and The Register</a:t>
+            </a:r>
           </a:p>
           <a:p>
             <a:pPr lvl="1"/>
             <a:r>
               <a:rPr lang="en-GB" dirty="0" smtClean="0"/>
-              <a:t>Takes no input, </a:t>
-            </a:r>
-            <a:r>
-              <a:rPr lang="en-GB" dirty="0" smtClean="0"/>
-              <a:t>returns</a:t>
-            </a:r>
-            <a:r>
-              <a:rPr lang="en-GB" dirty="0" smtClean="0"/>
-              <a:t> </a:t>
-            </a:r>
-            <a:r>
-              <a:rPr lang="en-GB" dirty="0" smtClean="0"/>
-              <a:t>a list of keywords</a:t>
+              <a:t>Takes no input, returns a list of keywords</a:t>
             </a:r>
           </a:p>
           <a:p>
@@ -6161,34 +6190,14 @@
             <a:pPr lvl="1"/>
             <a:r>
               <a:rPr lang="en-GB" dirty="0" smtClean="0"/>
-              <a:t>Searches for a keyword in a Search Engine such as Google or </a:t>
-            </a:r>
-            <a:r>
-              <a:rPr lang="en-GB" dirty="0" err="1" smtClean="0"/>
-              <a:t>Dogpile</a:t>
-            </a:r>
-            <a:r>
-              <a:rPr lang="en-GB" dirty="0" smtClean="0"/>
-              <a:t>.</a:t>
+              <a:t>Searches for a keyword in a Search Engine such as Google or Dogpile.</a:t>
             </a:r>
           </a:p>
           <a:p>
             <a:pPr lvl="1"/>
             <a:r>
               <a:rPr lang="en-GB" dirty="0" smtClean="0"/>
-              <a:t>Takes a keyword as input, </a:t>
-            </a:r>
-            <a:r>
-              <a:rPr lang="en-GB" dirty="0" smtClean="0"/>
-              <a:t>returns</a:t>
-            </a:r>
-            <a:r>
-              <a:rPr lang="en-GB" dirty="0" smtClean="0"/>
-              <a:t> </a:t>
-            </a:r>
-            <a:r>
-              <a:rPr lang="en-GB" dirty="0" smtClean="0"/>
-              <a:t>a list of URLs</a:t>
+              <a:t>Takes a keyword as input, returns a list of URLs</a:t>
             </a:r>
           </a:p>
           <a:p>
@@ -6201,35 +6210,14 @@
             <a:pPr lvl="1"/>
             <a:r>
               <a:rPr lang="en-GB" dirty="0" smtClean="0"/>
-              <a:t>Queues a </a:t>
-            </a:r>
-            <a:r>
-              <a:rPr lang="en-GB" dirty="0" smtClean="0"/>
-              <a:t>page to be scanned for malware</a:t>
-            </a:r>
-            <a:r>
-              <a:rPr lang="en-GB" dirty="0" smtClean="0"/>
-              <a:t>.</a:t>
-            </a:r>
-            <a:endParaRPr lang="en-GB" dirty="0" smtClean="0"/>
+              <a:t>Queues a page to be scanned for malware.</a:t>
+            </a:r>
           </a:p>
           <a:p>
             <a:pPr lvl="1"/>
             <a:r>
               <a:rPr lang="en-GB" dirty="0" smtClean="0"/>
-              <a:t>Takes a URL as input, </a:t>
-            </a:r>
-            <a:r>
-              <a:rPr lang="en-GB" dirty="0" smtClean="0"/>
-              <a:t>returns</a:t>
-            </a:r>
-            <a:r>
-              <a:rPr lang="en-GB" dirty="0" smtClean="0"/>
-              <a:t> </a:t>
-            </a:r>
-            <a:r>
-              <a:rPr lang="en-GB" dirty="0" smtClean="0"/>
-              <a:t>a malware report.</a:t>
+              <a:t>Takes a URL as input, returns a malware report.</a:t>
             </a:r>
             <a:endParaRPr lang="en-GB" dirty="0"/>
           </a:p>
@@ -6376,7 +6364,7 @@
 <file path=ppt/theme/theme1.xml><?xml version="1.0" encoding="utf-8"?>
 <a:theme xmlns:a="http://schemas.openxmlformats.org/drawingml/2006/main" name="Office Theme">
   <a:themeElements>
-    <a:clrScheme name="Office">
+    <a:clrScheme name="Custom 1">
       <a:dk1>
         <a:sysClr val="windowText" lastClr="000000"/>
       </a:dk1>
@@ -6408,7 +6396,7 @@
         <a:srgbClr val="F79646"/>
       </a:accent6>
       <a:hlink>
-        <a:srgbClr val="0000FF"/>
+        <a:srgbClr val="EBF1DD"/>
       </a:hlink>
       <a:folHlink>
         <a:srgbClr val="800080"/>

</xml_diff>

<commit_message>
remove the duplicated sentences.
</commit_message>
<xml_diff>
--- a/doc/pres1/wk4-progress.pptx
+++ b/doc/pres1/wk4-progress.pptx
@@ -1,12 +1,15 @@
 
 <file path=ppt/presentation.xml><?xml version="1.0" encoding="utf-8"?>
-<p:presentation xmlns:a="http://schemas.openxmlformats.org/drawingml/2006/main" xmlns:r="http://schemas.openxmlformats.org/officeDocument/2006/relationships" xmlns:p="http://schemas.openxmlformats.org/presentationml/2006/main" saveSubsetFonts="1">
+<p:presentation xmlns:a="http://schemas.openxmlformats.org/drawingml/2006/main" xmlns:r="http://schemas.openxmlformats.org/officeDocument/2006/relationships" xmlns:mc="http://schemas.openxmlformats.org/markup-compatibility/2006" xmlns:mv="urn:schemas-microsoft-com:mac:vml" xmlns:p="http://schemas.openxmlformats.org/presentationml/2006/main" mc:Ignorable="mv" mc:PreserveAttributes="mv:*" saveSubsetFonts="1">
   <p:sldMasterIdLst>
     <p:sldMasterId id="2147483648" r:id="rId1"/>
   </p:sldMasterIdLst>
   <p:notesMasterIdLst>
     <p:notesMasterId r:id="rId21"/>
   </p:notesMasterIdLst>
+  <p:handoutMasterIdLst>
+    <p:handoutMasterId r:id="rId22"/>
+  </p:handoutMasterIdLst>
   <p:sldIdLst>
     <p:sldId id="256" r:id="rId2"/>
     <p:sldId id="257" r:id="rId3"/>
@@ -129,13 +132,13 @@
 </file>
 
 <file path=ppt/commentAuthors.xml><?xml version="1.0" encoding="utf-8"?>
-<p:cmAuthorLst xmlns:a="http://schemas.openxmlformats.org/drawingml/2006/main" xmlns:r="http://schemas.openxmlformats.org/officeDocument/2006/relationships" xmlns:p="http://schemas.openxmlformats.org/presentationml/2006/main">
+<p:cmAuthorLst xmlns:a="http://schemas.openxmlformats.org/drawingml/2006/main" xmlns:r="http://schemas.openxmlformats.org/officeDocument/2006/relationships" xmlns:mc="http://schemas.openxmlformats.org/markup-compatibility/2006" xmlns:mv="urn:schemas-microsoft-com:mac:vml" xmlns:p="http://schemas.openxmlformats.org/presentationml/2006/main" mc:Ignorable="mv" mc:PreserveAttributes="mv:*">
   <p:cmAuthor id="0" name="tag1g09" initials="t" lastIdx="4" clrIdx="0"/>
 </p:cmAuthorLst>
 </file>
 
 <file path=ppt/comments/comment1.xml><?xml version="1.0" encoding="utf-8"?>
-<p:cmLst xmlns:a="http://schemas.openxmlformats.org/drawingml/2006/main" xmlns:r="http://schemas.openxmlformats.org/officeDocument/2006/relationships" xmlns:p="http://schemas.openxmlformats.org/presentationml/2006/main">
+<p:cmLst xmlns:a="http://schemas.openxmlformats.org/drawingml/2006/main" xmlns:r="http://schemas.openxmlformats.org/officeDocument/2006/relationships" xmlns:mc="http://schemas.openxmlformats.org/markup-compatibility/2006" xmlns:mv="urn:schemas-microsoft-com:mac:vml" xmlns:p="http://schemas.openxmlformats.org/presentationml/2006/main" mc:Ignorable="mv" mc:PreserveAttributes="mv:*">
   <p:cm authorId="0" dt="2012-10-23T13:09:23.805" idx="1">
     <p:pos x="3290" y="1437"/>
     <p:text>Not sure what this means</p:text>
@@ -148,7 +151,7 @@
 </file>
 
 <file path=ppt/comments/comment2.xml><?xml version="1.0" encoding="utf-8"?>
-<p:cmLst xmlns:a="http://schemas.openxmlformats.org/drawingml/2006/main" xmlns:r="http://schemas.openxmlformats.org/officeDocument/2006/relationships" xmlns:p="http://schemas.openxmlformats.org/presentationml/2006/main">
+<p:cmLst xmlns:a="http://schemas.openxmlformats.org/drawingml/2006/main" xmlns:r="http://schemas.openxmlformats.org/officeDocument/2006/relationships" xmlns:mc="http://schemas.openxmlformats.org/markup-compatibility/2006" xmlns:mv="urn:schemas-microsoft-com:mac:vml" xmlns:p="http://schemas.openxmlformats.org/presentationml/2006/main" mc:Ignorable="mv" mc:PreserveAttributes="mv:*">
   <p:cm authorId="0" dt="2012-10-23T13:13:15.533" idx="3">
     <p:pos x="4661" y="3064"/>
     <p:text>I thought it reduced the occurance of malicious pages on google. I didn't think they calculated the revenue</p:text>
@@ -157,7 +160,7 @@
 </file>
 
 <file path=ppt/comments/comment3.xml><?xml version="1.0" encoding="utf-8"?>
-<p:cmLst xmlns:a="http://schemas.openxmlformats.org/drawingml/2006/main" xmlns:r="http://schemas.openxmlformats.org/officeDocument/2006/relationships" xmlns:p="http://schemas.openxmlformats.org/presentationml/2006/main">
+<p:cmLst xmlns:a="http://schemas.openxmlformats.org/drawingml/2006/main" xmlns:r="http://schemas.openxmlformats.org/officeDocument/2006/relationships" xmlns:mc="http://schemas.openxmlformats.org/markup-compatibility/2006" xmlns:mv="urn:schemas-microsoft-com:mac:vml" xmlns:p="http://schemas.openxmlformats.org/presentationml/2006/main" mc:Ignorable="mv" mc:PreserveAttributes="mv:*">
   <p:cm authorId="0" dt="2012-10-23T13:15:13.711" idx="4">
     <p:pos x="10" y="10"/>
     <p:text>This digram does seem to work, It needs finishing.</p:text>
@@ -165,8 +168,8 @@
 </p:cmLst>
 </file>
 
-<file path=ppt/notesMasters/notesMaster1.xml><?xml version="1.0" encoding="utf-8"?>
-<p:notesMaster xmlns:a="http://schemas.openxmlformats.org/drawingml/2006/main" xmlns:r="http://schemas.openxmlformats.org/officeDocument/2006/relationships" xmlns:p="http://schemas.openxmlformats.org/presentationml/2006/main">
+<file path=ppt/handoutMasters/handoutMaster1.xml><?xml version="1.0" encoding="utf-8"?>
+<p:handoutMaster xmlns:a="http://schemas.openxmlformats.org/drawingml/2006/main" xmlns:r="http://schemas.openxmlformats.org/officeDocument/2006/relationships" xmlns:mc="http://schemas.openxmlformats.org/markup-compatibility/2006" xmlns:mv="urn:schemas-microsoft-com:mac:vml" xmlns:p="http://schemas.openxmlformats.org/presentationml/2006/main" mc:Ignorable="mv" mc:PreserveAttributes="mv:*">
   <p:cSld>
     <p:bg>
       <p:bgRef idx="1001">
@@ -214,7 +217,7 @@
             </a:lvl1pPr>
           </a:lstStyle>
           <a:p>
-            <a:endParaRPr lang="en-GB"/>
+            <a:endParaRPr lang="en-US"/>
           </a:p>
         </p:txBody>
       </p:sp>
@@ -225,7 +228,7 @@
             <a:spLocks noGrp="1"/>
           </p:cNvSpPr>
           <p:nvPr>
-            <p:ph type="dt" idx="1"/>
+            <p:ph type="dt" sz="quarter" idx="1"/>
           </p:nvPr>
         </p:nvSpPr>
         <p:spPr>
@@ -245,10 +248,170 @@
             </a:lvl1pPr>
           </a:lstStyle>
           <a:p>
+            <a:fld id="{18F98EB7-082C-9949-BFCA-B4BAD2D6FDBD}" type="datetimeFigureOut">
+              <a:rPr lang="en-US" smtClean="0"/>
+              <a:t>10/23/12</a:t>
+            </a:fld>
+            <a:endParaRPr lang="en-US"/>
+          </a:p>
+        </p:txBody>
+      </p:sp>
+      <p:sp>
+        <p:nvSpPr>
+          <p:cNvPr id="4" name="Footer Placeholder 3"/>
+          <p:cNvSpPr>
+            <a:spLocks noGrp="1"/>
+          </p:cNvSpPr>
+          <p:nvPr>
+            <p:ph type="ftr" sz="quarter" idx="2"/>
+          </p:nvPr>
+        </p:nvSpPr>
+        <p:spPr>
+          <a:xfrm>
+            <a:off x="0" y="8685213"/>
+            <a:ext cx="2971800" cy="457200"/>
+          </a:xfrm>
+          <a:prstGeom prst="rect">
+            <a:avLst/>
+          </a:prstGeom>
+        </p:spPr>
+        <p:txBody>
+          <a:bodyPr vert="horz" lIns="91440" tIns="45720" rIns="91440" bIns="45720" rtlCol="0" anchor="b"/>
+          <a:lstStyle>
+            <a:lvl1pPr algn="l">
+              <a:defRPr sz="1200"/>
+            </a:lvl1pPr>
+          </a:lstStyle>
+          <a:p>
+            <a:endParaRPr lang="en-US"/>
+          </a:p>
+        </p:txBody>
+      </p:sp>
+      <p:sp>
+        <p:nvSpPr>
+          <p:cNvPr id="5" name="Slide Number Placeholder 4"/>
+          <p:cNvSpPr>
+            <a:spLocks noGrp="1"/>
+          </p:cNvSpPr>
+          <p:nvPr>
+            <p:ph type="sldNum" sz="quarter" idx="3"/>
+          </p:nvPr>
+        </p:nvSpPr>
+        <p:spPr>
+          <a:xfrm>
+            <a:off x="3884613" y="8685213"/>
+            <a:ext cx="2971800" cy="457200"/>
+          </a:xfrm>
+          <a:prstGeom prst="rect">
+            <a:avLst/>
+          </a:prstGeom>
+        </p:spPr>
+        <p:txBody>
+          <a:bodyPr vert="horz" lIns="91440" tIns="45720" rIns="91440" bIns="45720" rtlCol="0" anchor="b"/>
+          <a:lstStyle>
+            <a:lvl1pPr algn="r">
+              <a:defRPr sz="1200"/>
+            </a:lvl1pPr>
+          </a:lstStyle>
+          <a:p>
+            <a:fld id="{E04A4919-99E7-6D4E-8297-7B2819B26390}" type="slidenum">
+              <a:rPr lang="en-US" smtClean="0"/>
+              <a:t>‹#›</a:t>
+            </a:fld>
+            <a:endParaRPr lang="en-US"/>
+          </a:p>
+        </p:txBody>
+      </p:sp>
+    </p:spTree>
+  </p:cSld>
+  <p:clrMap bg1="lt1" tx1="dk1" bg2="lt2" tx2="dk2" accent1="accent1" accent2="accent2" accent3="accent3" accent4="accent4" accent5="accent5" accent6="accent6" hlink="hlink" folHlink="folHlink"/>
+</p:handoutMaster>
+</file>
+
+<file path=ppt/notesMasters/notesMaster1.xml><?xml version="1.0" encoding="utf-8"?>
+<p:notesMaster xmlns:a="http://schemas.openxmlformats.org/drawingml/2006/main" xmlns:r="http://schemas.openxmlformats.org/officeDocument/2006/relationships" xmlns:mc="http://schemas.openxmlformats.org/markup-compatibility/2006" xmlns:mv="urn:schemas-microsoft-com:mac:vml" xmlns:p="http://schemas.openxmlformats.org/presentationml/2006/main" mc:Ignorable="mv" mc:PreserveAttributes="mv:*">
+  <p:cSld>
+    <p:bg>
+      <p:bgRef idx="1001">
+        <a:schemeClr val="bg1"/>
+      </p:bgRef>
+    </p:bg>
+    <p:spTree>
+      <p:nvGrpSpPr>
+        <p:cNvPr id="1" name=""/>
+        <p:cNvGrpSpPr/>
+        <p:nvPr/>
+      </p:nvGrpSpPr>
+      <p:grpSpPr>
+        <a:xfrm>
+          <a:off x="0" y="0"/>
+          <a:ext cx="0" cy="0"/>
+          <a:chOff x="0" y="0"/>
+          <a:chExt cx="0" cy="0"/>
+        </a:xfrm>
+      </p:grpSpPr>
+      <p:sp>
+        <p:nvSpPr>
+          <p:cNvPr id="2" name="Header Placeholder 1"/>
+          <p:cNvSpPr>
+            <a:spLocks noGrp="1"/>
+          </p:cNvSpPr>
+          <p:nvPr>
+            <p:ph type="hdr" sz="quarter"/>
+          </p:nvPr>
+        </p:nvSpPr>
+        <p:spPr>
+          <a:xfrm>
+            <a:off x="0" y="0"/>
+            <a:ext cx="2971800" cy="457200"/>
+          </a:xfrm>
+          <a:prstGeom prst="rect">
+            <a:avLst/>
+          </a:prstGeom>
+        </p:spPr>
+        <p:txBody>
+          <a:bodyPr vert="horz" lIns="91440" tIns="45720" rIns="91440" bIns="45720" rtlCol="0"/>
+          <a:lstStyle>
+            <a:lvl1pPr algn="l">
+              <a:defRPr sz="1200"/>
+            </a:lvl1pPr>
+          </a:lstStyle>
+          <a:p>
+            <a:endParaRPr lang="en-GB"/>
+          </a:p>
+        </p:txBody>
+      </p:sp>
+      <p:sp>
+        <p:nvSpPr>
+          <p:cNvPr id="3" name="Date Placeholder 2"/>
+          <p:cNvSpPr>
+            <a:spLocks noGrp="1"/>
+          </p:cNvSpPr>
+          <p:nvPr>
+            <p:ph type="dt" idx="1"/>
+          </p:nvPr>
+        </p:nvSpPr>
+        <p:spPr>
+          <a:xfrm>
+            <a:off x="3884613" y="0"/>
+            <a:ext cx="2971800" cy="457200"/>
+          </a:xfrm>
+          <a:prstGeom prst="rect">
+            <a:avLst/>
+          </a:prstGeom>
+        </p:spPr>
+        <p:txBody>
+          <a:bodyPr vert="horz" lIns="91440" tIns="45720" rIns="91440" bIns="45720" rtlCol="0"/>
+          <a:lstStyle>
+            <a:lvl1pPr algn="r">
+              <a:defRPr sz="1200"/>
+            </a:lvl1pPr>
+          </a:lstStyle>
+          <a:p>
             <a:fld id="{5C465251-34BA-484B-BD29-7371F8FBFAE2}" type="datetimeFigureOut">
               <a:rPr lang="en-GB" smtClean="0"/>
               <a:pPr/>
-              <a:t>23/10/2012</a:t>
+              <a:t>10/23/12</a:t>
             </a:fld>
             <a:endParaRPr lang="en-GB"/>
           </a:p>
@@ -419,7 +582,7 @@
     </p:spTree>
     <p:extLst>
       <p:ext uri="{BB962C8B-B14F-4D97-AF65-F5344CB8AC3E}">
-        <p14:creationId xmlns:p14="http://schemas.microsoft.com/office/powerpoint/2010/main" val="1219798393"/>
+        <p14:creationId xmlns:p14="http://schemas.microsoft.com/office/powerpoint/2010/main" xmlns:p="http://schemas.openxmlformats.org/presentationml/2006/main" xmlns:r="http://schemas.openxmlformats.org/officeDocument/2006/relationships" xmlns:a="http://schemas.openxmlformats.org/drawingml/2006/main" xmlns="" val="1219798393"/>
       </p:ext>
     </p:extLst>
   </p:cSld>
@@ -520,7 +683,7 @@
 </file>
 
 <file path=ppt/notesSlides/notesSlide1.xml><?xml version="1.0" encoding="utf-8"?>
-<p:notes xmlns:a="http://schemas.openxmlformats.org/drawingml/2006/main" xmlns:r="http://schemas.openxmlformats.org/officeDocument/2006/relationships" xmlns:p="http://schemas.openxmlformats.org/presentationml/2006/main">
+<p:notes xmlns:a="http://schemas.openxmlformats.org/drawingml/2006/main" xmlns:r="http://schemas.openxmlformats.org/officeDocument/2006/relationships" xmlns:mc="http://schemas.openxmlformats.org/markup-compatibility/2006" xmlns:mv="urn:schemas-microsoft-com:mac:vml" xmlns:p="http://schemas.openxmlformats.org/presentationml/2006/main" mc:Ignorable="mv" mc:PreserveAttributes="mv:*">
   <p:cSld>
     <p:spTree>
       <p:nvGrpSpPr>
@@ -602,7 +765,7 @@
 </file>
 
 <file path=ppt/slideLayouts/slideLayout1.xml><?xml version="1.0" encoding="utf-8"?>
-<p:sldLayout xmlns:a="http://schemas.openxmlformats.org/drawingml/2006/main" xmlns:r="http://schemas.openxmlformats.org/officeDocument/2006/relationships" xmlns:p="http://schemas.openxmlformats.org/presentationml/2006/main" type="title" preserve="1">
+<p:sldLayout xmlns:a="http://schemas.openxmlformats.org/drawingml/2006/main" xmlns:r="http://schemas.openxmlformats.org/officeDocument/2006/relationships" xmlns:mc="http://schemas.openxmlformats.org/markup-compatibility/2006" xmlns:mv="urn:schemas-microsoft-com:mac:vml" xmlns:p="http://schemas.openxmlformats.org/presentationml/2006/main" mc:Ignorable="mv" mc:PreserveAttributes="mv:*" type="title" preserve="1">
   <p:cSld name="Title Slide">
     <p:spTree>
       <p:nvGrpSpPr>
@@ -783,7 +946,7 @@
             <a:fld id="{9B2BCD74-F7F5-4BD6-83D7-1EBC56D75222}" type="datetimeFigureOut">
               <a:rPr lang="en-GB" smtClean="0"/>
               <a:pPr/>
-              <a:t>23/10/2012</a:t>
+              <a:t>10/23/12</a:t>
             </a:fld>
             <a:endParaRPr lang="en-GB"/>
           </a:p>
@@ -848,7 +1011,7 @@
 </file>
 
 <file path=ppt/slideLayouts/slideLayout10.xml><?xml version="1.0" encoding="utf-8"?>
-<p:sldLayout xmlns:a="http://schemas.openxmlformats.org/drawingml/2006/main" xmlns:r="http://schemas.openxmlformats.org/officeDocument/2006/relationships" xmlns:p="http://schemas.openxmlformats.org/presentationml/2006/main" type="vertTx" preserve="1">
+<p:sldLayout xmlns:a="http://schemas.openxmlformats.org/drawingml/2006/main" xmlns:r="http://schemas.openxmlformats.org/officeDocument/2006/relationships" xmlns:mc="http://schemas.openxmlformats.org/markup-compatibility/2006" xmlns:mv="urn:schemas-microsoft-com:mac:vml" xmlns:p="http://schemas.openxmlformats.org/presentationml/2006/main" mc:Ignorable="mv" mc:PreserveAttributes="mv:*" type="vertTx" preserve="1">
   <p:cSld name="Title and Vertical Text">
     <p:spTree>
       <p:nvGrpSpPr>
@@ -957,7 +1120,7 @@
             <a:fld id="{9B2BCD74-F7F5-4BD6-83D7-1EBC56D75222}" type="datetimeFigureOut">
               <a:rPr lang="en-GB" smtClean="0"/>
               <a:pPr/>
-              <a:t>23/10/2012</a:t>
+              <a:t>10/23/12</a:t>
             </a:fld>
             <a:endParaRPr lang="en-GB"/>
           </a:p>
@@ -1015,7 +1178,7 @@
 </file>
 
 <file path=ppt/slideLayouts/slideLayout11.xml><?xml version="1.0" encoding="utf-8"?>
-<p:sldLayout xmlns:a="http://schemas.openxmlformats.org/drawingml/2006/main" xmlns:r="http://schemas.openxmlformats.org/officeDocument/2006/relationships" xmlns:p="http://schemas.openxmlformats.org/presentationml/2006/main" type="vertTitleAndTx" preserve="1">
+<p:sldLayout xmlns:a="http://schemas.openxmlformats.org/drawingml/2006/main" xmlns:r="http://schemas.openxmlformats.org/officeDocument/2006/relationships" xmlns:mc="http://schemas.openxmlformats.org/markup-compatibility/2006" xmlns:mv="urn:schemas-microsoft-com:mac:vml" xmlns:p="http://schemas.openxmlformats.org/presentationml/2006/main" mc:Ignorable="mv" mc:PreserveAttributes="mv:*" type="vertTitleAndTx" preserve="1">
   <p:cSld name="Vertical Title and Text">
     <p:spTree>
       <p:nvGrpSpPr>
@@ -1134,7 +1297,7 @@
             <a:fld id="{9B2BCD74-F7F5-4BD6-83D7-1EBC56D75222}" type="datetimeFigureOut">
               <a:rPr lang="en-GB" smtClean="0"/>
               <a:pPr/>
-              <a:t>23/10/2012</a:t>
+              <a:t>10/23/12</a:t>
             </a:fld>
             <a:endParaRPr lang="en-GB"/>
           </a:p>
@@ -1192,7 +1355,7 @@
 </file>
 
 <file path=ppt/slideLayouts/slideLayout2.xml><?xml version="1.0" encoding="utf-8"?>
-<p:sldLayout xmlns:a="http://schemas.openxmlformats.org/drawingml/2006/main" xmlns:r="http://schemas.openxmlformats.org/officeDocument/2006/relationships" xmlns:p="http://schemas.openxmlformats.org/presentationml/2006/main" type="obj" preserve="1">
+<p:sldLayout xmlns:a="http://schemas.openxmlformats.org/drawingml/2006/main" xmlns:r="http://schemas.openxmlformats.org/officeDocument/2006/relationships" xmlns:mc="http://schemas.openxmlformats.org/markup-compatibility/2006" xmlns:mv="urn:schemas-microsoft-com:mac:vml" xmlns:p="http://schemas.openxmlformats.org/presentationml/2006/main" mc:Ignorable="mv" mc:PreserveAttributes="mv:*" type="obj" preserve="1">
   <p:cSld name="Title and Content">
     <p:spTree>
       <p:nvGrpSpPr>
@@ -1301,7 +1464,7 @@
             <a:fld id="{9B2BCD74-F7F5-4BD6-83D7-1EBC56D75222}" type="datetimeFigureOut">
               <a:rPr lang="en-GB" smtClean="0"/>
               <a:pPr/>
-              <a:t>23/10/2012</a:t>
+              <a:t>10/23/12</a:t>
             </a:fld>
             <a:endParaRPr lang="en-GB"/>
           </a:p>
@@ -1359,7 +1522,7 @@
 </file>
 
 <file path=ppt/slideLayouts/slideLayout3.xml><?xml version="1.0" encoding="utf-8"?>
-<p:sldLayout xmlns:a="http://schemas.openxmlformats.org/drawingml/2006/main" xmlns:r="http://schemas.openxmlformats.org/officeDocument/2006/relationships" xmlns:p="http://schemas.openxmlformats.org/presentationml/2006/main" type="secHead" preserve="1">
+<p:sldLayout xmlns:a="http://schemas.openxmlformats.org/drawingml/2006/main" xmlns:r="http://schemas.openxmlformats.org/officeDocument/2006/relationships" xmlns:mc="http://schemas.openxmlformats.org/markup-compatibility/2006" xmlns:mv="urn:schemas-microsoft-com:mac:vml" xmlns:p="http://schemas.openxmlformats.org/presentationml/2006/main" mc:Ignorable="mv" mc:PreserveAttributes="mv:*" type="secHead" preserve="1">
   <p:cSld name="Section Header">
     <p:spTree>
       <p:nvGrpSpPr>
@@ -1544,7 +1707,7 @@
             <a:fld id="{9B2BCD74-F7F5-4BD6-83D7-1EBC56D75222}" type="datetimeFigureOut">
               <a:rPr lang="en-GB" smtClean="0"/>
               <a:pPr/>
-              <a:t>23/10/2012</a:t>
+              <a:t>10/23/12</a:t>
             </a:fld>
             <a:endParaRPr lang="en-GB"/>
           </a:p>
@@ -1602,7 +1765,7 @@
 </file>
 
 <file path=ppt/slideLayouts/slideLayout4.xml><?xml version="1.0" encoding="utf-8"?>
-<p:sldLayout xmlns:a="http://schemas.openxmlformats.org/drawingml/2006/main" xmlns:r="http://schemas.openxmlformats.org/officeDocument/2006/relationships" xmlns:p="http://schemas.openxmlformats.org/presentationml/2006/main" type="twoObj" preserve="1">
+<p:sldLayout xmlns:a="http://schemas.openxmlformats.org/drawingml/2006/main" xmlns:r="http://schemas.openxmlformats.org/officeDocument/2006/relationships" xmlns:mc="http://schemas.openxmlformats.org/markup-compatibility/2006" xmlns:mv="urn:schemas-microsoft-com:mac:vml" xmlns:p="http://schemas.openxmlformats.org/presentationml/2006/main" mc:Ignorable="mv" mc:PreserveAttributes="mv:*" type="twoObj" preserve="1">
   <p:cSld name="Two Content">
     <p:spTree>
       <p:nvGrpSpPr>
@@ -1829,7 +1992,7 @@
             <a:fld id="{9B2BCD74-F7F5-4BD6-83D7-1EBC56D75222}" type="datetimeFigureOut">
               <a:rPr lang="en-GB" smtClean="0"/>
               <a:pPr/>
-              <a:t>23/10/2012</a:t>
+              <a:t>10/23/12</a:t>
             </a:fld>
             <a:endParaRPr lang="en-GB"/>
           </a:p>
@@ -1887,7 +2050,7 @@
 </file>
 
 <file path=ppt/slideLayouts/slideLayout5.xml><?xml version="1.0" encoding="utf-8"?>
-<p:sldLayout xmlns:a="http://schemas.openxmlformats.org/drawingml/2006/main" xmlns:r="http://schemas.openxmlformats.org/officeDocument/2006/relationships" xmlns:p="http://schemas.openxmlformats.org/presentationml/2006/main" type="twoTxTwoObj" preserve="1">
+<p:sldLayout xmlns:a="http://schemas.openxmlformats.org/drawingml/2006/main" xmlns:r="http://schemas.openxmlformats.org/officeDocument/2006/relationships" xmlns:mc="http://schemas.openxmlformats.org/markup-compatibility/2006" xmlns:mv="urn:schemas-microsoft-com:mac:vml" xmlns:p="http://schemas.openxmlformats.org/presentationml/2006/main" mc:Ignorable="mv" mc:PreserveAttributes="mv:*" type="twoTxTwoObj" preserve="1">
   <p:cSld name="Comparison">
     <p:spTree>
       <p:nvGrpSpPr>
@@ -2248,7 +2411,7 @@
             <a:fld id="{9B2BCD74-F7F5-4BD6-83D7-1EBC56D75222}" type="datetimeFigureOut">
               <a:rPr lang="en-GB" smtClean="0"/>
               <a:pPr/>
-              <a:t>23/10/2012</a:t>
+              <a:t>10/23/12</a:t>
             </a:fld>
             <a:endParaRPr lang="en-GB"/>
           </a:p>
@@ -2306,7 +2469,7 @@
 </file>
 
 <file path=ppt/slideLayouts/slideLayout6.xml><?xml version="1.0" encoding="utf-8"?>
-<p:sldLayout xmlns:a="http://schemas.openxmlformats.org/drawingml/2006/main" xmlns:r="http://schemas.openxmlformats.org/officeDocument/2006/relationships" xmlns:p="http://schemas.openxmlformats.org/presentationml/2006/main" type="titleOnly" preserve="1">
+<p:sldLayout xmlns:a="http://schemas.openxmlformats.org/drawingml/2006/main" xmlns:r="http://schemas.openxmlformats.org/officeDocument/2006/relationships" xmlns:mc="http://schemas.openxmlformats.org/markup-compatibility/2006" xmlns:mv="urn:schemas-microsoft-com:mac:vml" xmlns:p="http://schemas.openxmlformats.org/presentationml/2006/main" mc:Ignorable="mv" mc:PreserveAttributes="mv:*" type="titleOnly" preserve="1">
   <p:cSld name="Title Only">
     <p:spTree>
       <p:nvGrpSpPr>
@@ -2363,7 +2526,7 @@
             <a:fld id="{9B2BCD74-F7F5-4BD6-83D7-1EBC56D75222}" type="datetimeFigureOut">
               <a:rPr lang="en-GB" smtClean="0"/>
               <a:pPr/>
-              <a:t>23/10/2012</a:t>
+              <a:t>10/23/12</a:t>
             </a:fld>
             <a:endParaRPr lang="en-GB"/>
           </a:p>
@@ -2421,7 +2584,7 @@
 </file>
 
 <file path=ppt/slideLayouts/slideLayout7.xml><?xml version="1.0" encoding="utf-8"?>
-<p:sldLayout xmlns:a="http://schemas.openxmlformats.org/drawingml/2006/main" xmlns:r="http://schemas.openxmlformats.org/officeDocument/2006/relationships" xmlns:p="http://schemas.openxmlformats.org/presentationml/2006/main" type="blank" preserve="1">
+<p:sldLayout xmlns:a="http://schemas.openxmlformats.org/drawingml/2006/main" xmlns:r="http://schemas.openxmlformats.org/officeDocument/2006/relationships" xmlns:mc="http://schemas.openxmlformats.org/markup-compatibility/2006" xmlns:mv="urn:schemas-microsoft-com:mac:vml" xmlns:p="http://schemas.openxmlformats.org/presentationml/2006/main" mc:Ignorable="mv" mc:PreserveAttributes="mv:*" type="blank" preserve="1">
   <p:cSld name="Blank">
     <p:spTree>
       <p:nvGrpSpPr>
@@ -2455,7 +2618,7 @@
             <a:fld id="{9B2BCD74-F7F5-4BD6-83D7-1EBC56D75222}" type="datetimeFigureOut">
               <a:rPr lang="en-GB" smtClean="0"/>
               <a:pPr/>
-              <a:t>23/10/2012</a:t>
+              <a:t>10/23/12</a:t>
             </a:fld>
             <a:endParaRPr lang="en-GB"/>
           </a:p>
@@ -2513,7 +2676,7 @@
 </file>
 
 <file path=ppt/slideLayouts/slideLayout8.xml><?xml version="1.0" encoding="utf-8"?>
-<p:sldLayout xmlns:a="http://schemas.openxmlformats.org/drawingml/2006/main" xmlns:r="http://schemas.openxmlformats.org/officeDocument/2006/relationships" xmlns:p="http://schemas.openxmlformats.org/presentationml/2006/main" type="objTx" preserve="1">
+<p:sldLayout xmlns:a="http://schemas.openxmlformats.org/drawingml/2006/main" xmlns:r="http://schemas.openxmlformats.org/officeDocument/2006/relationships" xmlns:mc="http://schemas.openxmlformats.org/markup-compatibility/2006" xmlns:mv="urn:schemas-microsoft-com:mac:vml" xmlns:p="http://schemas.openxmlformats.org/presentationml/2006/main" mc:Ignorable="mv" mc:PreserveAttributes="mv:*" type="objTx" preserve="1">
   <p:cSld name="Content with Caption">
     <p:spTree>
       <p:nvGrpSpPr>
@@ -2729,7 +2892,7 @@
             <a:fld id="{9B2BCD74-F7F5-4BD6-83D7-1EBC56D75222}" type="datetimeFigureOut">
               <a:rPr lang="en-GB" smtClean="0"/>
               <a:pPr/>
-              <a:t>23/10/2012</a:t>
+              <a:t>10/23/12</a:t>
             </a:fld>
             <a:endParaRPr lang="en-GB"/>
           </a:p>
@@ -2787,7 +2950,7 @@
 </file>
 
 <file path=ppt/slideLayouts/slideLayout9.xml><?xml version="1.0" encoding="utf-8"?>
-<p:sldLayout xmlns:a="http://schemas.openxmlformats.org/drawingml/2006/main" xmlns:r="http://schemas.openxmlformats.org/officeDocument/2006/relationships" xmlns:p="http://schemas.openxmlformats.org/presentationml/2006/main" type="picTx" preserve="1">
+<p:sldLayout xmlns:a="http://schemas.openxmlformats.org/drawingml/2006/main" xmlns:r="http://schemas.openxmlformats.org/officeDocument/2006/relationships" xmlns:mc="http://schemas.openxmlformats.org/markup-compatibility/2006" xmlns:mv="urn:schemas-microsoft-com:mac:vml" xmlns:p="http://schemas.openxmlformats.org/presentationml/2006/main" mc:Ignorable="mv" mc:PreserveAttributes="mv:*" type="picTx" preserve="1">
   <p:cSld name="Picture with Caption">
     <p:spTree>
       <p:nvGrpSpPr>
@@ -2979,7 +3142,7 @@
             <a:fld id="{9B2BCD74-F7F5-4BD6-83D7-1EBC56D75222}" type="datetimeFigureOut">
               <a:rPr lang="en-GB" smtClean="0"/>
               <a:pPr/>
-              <a:t>23/10/2012</a:t>
+              <a:t>10/23/12</a:t>
             </a:fld>
             <a:endParaRPr lang="en-GB"/>
           </a:p>
@@ -3037,7 +3200,7 @@
 </file>
 
 <file path=ppt/slideMasters/slideMaster1.xml><?xml version="1.0" encoding="utf-8"?>
-<p:sldMaster xmlns:a="http://schemas.openxmlformats.org/drawingml/2006/main" xmlns:r="http://schemas.openxmlformats.org/officeDocument/2006/relationships" xmlns:p="http://schemas.openxmlformats.org/presentationml/2006/main">
+<p:sldMaster xmlns:a="http://schemas.openxmlformats.org/drawingml/2006/main" xmlns:r="http://schemas.openxmlformats.org/officeDocument/2006/relationships" xmlns:mc="http://schemas.openxmlformats.org/markup-compatibility/2006" xmlns:mv="urn:schemas-microsoft-com:mac:vml" xmlns:p="http://schemas.openxmlformats.org/presentationml/2006/main" mc:Ignorable="mv" mc:PreserveAttributes="mv:*">
   <p:cSld>
     <p:bg>
       <p:bgPr>
@@ -3204,7 +3367,7 @@
             <a:fld id="{9B2BCD74-F7F5-4BD6-83D7-1EBC56D75222}" type="datetimeFigureOut">
               <a:rPr lang="en-GB" smtClean="0"/>
               <a:pPr/>
-              <a:t>23/10/2012</a:t>
+              <a:t>10/23/12</a:t>
             </a:fld>
             <a:endParaRPr lang="en-GB"/>
           </a:p>
@@ -3566,7 +3729,7 @@
 </file>
 
 <file path=ppt/slides/slide1.xml><?xml version="1.0" encoding="utf-8"?>
-<p:sld xmlns:a="http://schemas.openxmlformats.org/drawingml/2006/main" xmlns:r="http://schemas.openxmlformats.org/officeDocument/2006/relationships" xmlns:p="http://schemas.openxmlformats.org/presentationml/2006/main">
+<p:sld xmlns:a="http://schemas.openxmlformats.org/drawingml/2006/main" xmlns:r="http://schemas.openxmlformats.org/officeDocument/2006/relationships" xmlns:mc="http://schemas.openxmlformats.org/markup-compatibility/2006" xmlns:mv="urn:schemas-microsoft-com:mac:vml" xmlns:p="http://schemas.openxmlformats.org/presentationml/2006/main" mc:Ignorable="mv" mc:PreserveAttributes="mv:*">
   <p:cSld>
     <p:spTree>
       <p:nvGrpSpPr>
@@ -3631,11 +3794,7 @@
           <a:p>
             <a:r>
               <a:rPr lang="en-GB" dirty="0" smtClean="0"/>
-              <a:t>Week 4 Progress </a:t>
-            </a:r>
-            <a:r>
-              <a:rPr lang="en-GB" dirty="0" smtClean="0"/>
-              <a:t>Seminar</a:t>
+              <a:t>Week 4 Progress Seminar</a:t>
             </a:r>
             <a:endParaRPr lang="en-GB" dirty="0"/>
           </a:p>
@@ -3657,7 +3816,7 @@
 </file>
 
 <file path=ppt/slides/slide10.xml><?xml version="1.0" encoding="utf-8"?>
-<p:sld xmlns:a="http://schemas.openxmlformats.org/drawingml/2006/main" xmlns:r="http://schemas.openxmlformats.org/officeDocument/2006/relationships" xmlns:p="http://schemas.openxmlformats.org/presentationml/2006/main">
+<p:sld xmlns:a="http://schemas.openxmlformats.org/drawingml/2006/main" xmlns:r="http://schemas.openxmlformats.org/officeDocument/2006/relationships" xmlns:mc="http://schemas.openxmlformats.org/markup-compatibility/2006" xmlns:mv="urn:schemas-microsoft-com:mac:vml" xmlns:p="http://schemas.openxmlformats.org/presentationml/2006/main" mc:Ignorable="mv" mc:PreserveAttributes="mv:*">
   <p:cSld>
     <p:spTree>
       <p:nvGrpSpPr>
@@ -4166,7 +4325,7 @@
 </file>
 
 <file path=ppt/slides/slide11.xml><?xml version="1.0" encoding="utf-8"?>
-<p:sld xmlns:a="http://schemas.openxmlformats.org/drawingml/2006/main" xmlns:r="http://schemas.openxmlformats.org/officeDocument/2006/relationships" xmlns:p="http://schemas.openxmlformats.org/presentationml/2006/main">
+<p:sld xmlns:a="http://schemas.openxmlformats.org/drawingml/2006/main" xmlns:r="http://schemas.openxmlformats.org/officeDocument/2006/relationships" xmlns:mc="http://schemas.openxmlformats.org/markup-compatibility/2006" xmlns:mv="urn:schemas-microsoft-com:mac:vml" xmlns:p="http://schemas.openxmlformats.org/presentationml/2006/main" mc:Ignorable="mv" mc:PreserveAttributes="mv:*">
   <p:cSld>
     <p:spTree>
       <p:nvGrpSpPr>
@@ -4290,7 +4449,7 @@
 </file>
 
 <file path=ppt/slides/slide12.xml><?xml version="1.0" encoding="utf-8"?>
-<p:sld xmlns:a="http://schemas.openxmlformats.org/drawingml/2006/main" xmlns:r="http://schemas.openxmlformats.org/officeDocument/2006/relationships" xmlns:p="http://schemas.openxmlformats.org/presentationml/2006/main">
+<p:sld xmlns:a="http://schemas.openxmlformats.org/drawingml/2006/main" xmlns:r="http://schemas.openxmlformats.org/officeDocument/2006/relationships" xmlns:mc="http://schemas.openxmlformats.org/markup-compatibility/2006" xmlns:mv="urn:schemas-microsoft-com:mac:vml" xmlns:p="http://schemas.openxmlformats.org/presentationml/2006/main" mc:Ignorable="mv" mc:PreserveAttributes="mv:*">
   <p:cSld>
     <p:spTree>
       <p:nvGrpSpPr>
@@ -4438,7 +4597,7 @@
 </file>
 
 <file path=ppt/slides/slide13.xml><?xml version="1.0" encoding="utf-8"?>
-<p:sld xmlns:a="http://schemas.openxmlformats.org/drawingml/2006/main" xmlns:r="http://schemas.openxmlformats.org/officeDocument/2006/relationships" xmlns:p="http://schemas.openxmlformats.org/presentationml/2006/main">
+<p:sld xmlns:a="http://schemas.openxmlformats.org/drawingml/2006/main" xmlns:r="http://schemas.openxmlformats.org/officeDocument/2006/relationships" xmlns:mc="http://schemas.openxmlformats.org/markup-compatibility/2006" xmlns:mv="urn:schemas-microsoft-com:mac:vml" xmlns:p="http://schemas.openxmlformats.org/presentationml/2006/main" mc:Ignorable="mv" mc:PreserveAttributes="mv:*">
   <p:cSld>
     <p:spTree>
       <p:nvGrpSpPr>
@@ -4490,7 +4649,7 @@
         <p:spPr/>
         <p:txBody>
           <a:bodyPr>
-            <a:normAutofit fontScale="70000" lnSpcReduction="20000"/>
+            <a:normAutofit fontScale="77500" lnSpcReduction="20000"/>
           </a:bodyPr>
           <a:lstStyle/>
           <a:p>
@@ -4524,13 +4683,6 @@
             <a:pPr lvl="1"/>
             <a:r>
               <a:rPr lang="en-GB" dirty="0"/>
-              <a:t>Low interaction client honey pot</a:t>
-            </a:r>
-          </a:p>
-          <a:p>
-            <a:pPr lvl="1"/>
-            <a:r>
-              <a:rPr lang="en-GB" dirty="0"/>
               <a:t>Determined what is a malicious website</a:t>
             </a:r>
           </a:p>
@@ -4593,7 +4745,7 @@
     </p:spTree>
     <p:extLst>
       <p:ext uri="{BB962C8B-B14F-4D97-AF65-F5344CB8AC3E}">
-        <p14:creationId xmlns:p14="http://schemas.microsoft.com/office/powerpoint/2010/main" val="3521878626"/>
+        <p14:creationId xmlns:p14="http://schemas.microsoft.com/office/powerpoint/2010/main" xmlns:p="http://schemas.openxmlformats.org/presentationml/2006/main" xmlns:r="http://schemas.openxmlformats.org/officeDocument/2006/relationships" xmlns:a="http://schemas.openxmlformats.org/drawingml/2006/main" xmlns="" val="3521878626"/>
       </p:ext>
     </p:extLst>
   </p:cSld>
@@ -4611,7 +4763,7 @@
 </file>
 
 <file path=ppt/slides/slide14.xml><?xml version="1.0" encoding="utf-8"?>
-<p:sld xmlns:a="http://schemas.openxmlformats.org/drawingml/2006/main" xmlns:r="http://schemas.openxmlformats.org/officeDocument/2006/relationships" xmlns:p="http://schemas.openxmlformats.org/presentationml/2006/main">
+<p:sld xmlns:a="http://schemas.openxmlformats.org/drawingml/2006/main" xmlns:r="http://schemas.openxmlformats.org/officeDocument/2006/relationships" xmlns:mc="http://schemas.openxmlformats.org/markup-compatibility/2006" xmlns:mv="urn:schemas-microsoft-com:mac:vml" xmlns:p="http://schemas.openxmlformats.org/presentationml/2006/main" mc:Ignorable="mv" mc:PreserveAttributes="mv:*">
   <p:cSld>
     <p:spTree>
       <p:nvGrpSpPr>
@@ -4736,7 +4888,7 @@
     </p:spTree>
     <p:extLst>
       <p:ext uri="{BB962C8B-B14F-4D97-AF65-F5344CB8AC3E}">
-        <p14:creationId xmlns:p14="http://schemas.microsoft.com/office/powerpoint/2010/main" val="514011514"/>
+        <p14:creationId xmlns:p14="http://schemas.microsoft.com/office/powerpoint/2010/main" xmlns:p="http://schemas.openxmlformats.org/presentationml/2006/main" xmlns:r="http://schemas.openxmlformats.org/officeDocument/2006/relationships" xmlns:a="http://schemas.openxmlformats.org/drawingml/2006/main" xmlns="" val="514011514"/>
       </p:ext>
     </p:extLst>
   </p:cSld>
@@ -4754,7 +4906,7 @@
 </file>
 
 <file path=ppt/slides/slide15.xml><?xml version="1.0" encoding="utf-8"?>
-<p:sld xmlns:a="http://schemas.openxmlformats.org/drawingml/2006/main" xmlns:r="http://schemas.openxmlformats.org/officeDocument/2006/relationships" xmlns:p="http://schemas.openxmlformats.org/presentationml/2006/main">
+<p:sld xmlns:a="http://schemas.openxmlformats.org/drawingml/2006/main" xmlns:r="http://schemas.openxmlformats.org/officeDocument/2006/relationships" xmlns:mc="http://schemas.openxmlformats.org/markup-compatibility/2006" xmlns:mv="urn:schemas-microsoft-com:mac:vml" xmlns:p="http://schemas.openxmlformats.org/presentationml/2006/main" mc:Ignorable="mv" mc:PreserveAttributes="mv:*">
   <p:cSld>
     <p:spTree>
       <p:nvGrpSpPr>
@@ -4796,9 +4948,7 @@
       <p:pic>
         <p:nvPicPr>
           <p:cNvPr id="8" name="F1_BY9V8YTo?version=3&amp;hl=en_US&amp;rel=0"/>
-          <p:cNvPicPr>
-            <a:picLocks noGrp="1" noRot="1" noChangeAspect="1"/>
-          </p:cNvPicPr>
+          <p:cNvPicPr/>
           <p:nvPr>
             <p:ph idx="1"/>
             <a:videoFile r:link="rId1"/>
@@ -4909,7 +5059,7 @@
 </file>
 
 <file path=ppt/slides/slide16.xml><?xml version="1.0" encoding="utf-8"?>
-<p:sld xmlns:a="http://schemas.openxmlformats.org/drawingml/2006/main" xmlns:r="http://schemas.openxmlformats.org/officeDocument/2006/relationships" xmlns:p="http://schemas.openxmlformats.org/presentationml/2006/main">
+<p:sld xmlns:a="http://schemas.openxmlformats.org/drawingml/2006/main" xmlns:r="http://schemas.openxmlformats.org/officeDocument/2006/relationships" xmlns:mc="http://schemas.openxmlformats.org/markup-compatibility/2006" xmlns:mv="urn:schemas-microsoft-com:mac:vml" xmlns:p="http://schemas.openxmlformats.org/presentationml/2006/main" mc:Ignorable="mv" mc:PreserveAttributes="mv:*">
   <p:cSld>
     <p:spTree>
       <p:nvGrpSpPr>
@@ -4983,7 +5133,7 @@
 </file>
 
 <file path=ppt/slides/slide17.xml><?xml version="1.0" encoding="utf-8"?>
-<p:sld xmlns:a="http://schemas.openxmlformats.org/drawingml/2006/main" xmlns:r="http://schemas.openxmlformats.org/officeDocument/2006/relationships" xmlns:p="http://schemas.openxmlformats.org/presentationml/2006/main">
+<p:sld xmlns:a="http://schemas.openxmlformats.org/drawingml/2006/main" xmlns:r="http://schemas.openxmlformats.org/officeDocument/2006/relationships" xmlns:mc="http://schemas.openxmlformats.org/markup-compatibility/2006" xmlns:mv="urn:schemas-microsoft-com:mac:vml" xmlns:p="http://schemas.openxmlformats.org/presentationml/2006/main" mc:Ignorable="mv" mc:PreserveAttributes="mv:*">
   <p:cSld>
     <p:spTree>
       <p:nvGrpSpPr>
@@ -5057,7 +5207,7 @@
 </file>
 
 <file path=ppt/slides/slide18.xml><?xml version="1.0" encoding="utf-8"?>
-<p:sld xmlns:a="http://schemas.openxmlformats.org/drawingml/2006/main" xmlns:r="http://schemas.openxmlformats.org/officeDocument/2006/relationships" xmlns:p="http://schemas.openxmlformats.org/presentationml/2006/main">
+<p:sld xmlns:a="http://schemas.openxmlformats.org/drawingml/2006/main" xmlns:r="http://schemas.openxmlformats.org/officeDocument/2006/relationships" xmlns:mc="http://schemas.openxmlformats.org/markup-compatibility/2006" xmlns:mv="urn:schemas-microsoft-com:mac:vml" xmlns:p="http://schemas.openxmlformats.org/presentationml/2006/main" mc:Ignorable="mv" mc:PreserveAttributes="mv:*">
   <p:cSld>
     <p:spTree>
       <p:nvGrpSpPr>
@@ -5131,7 +5281,7 @@
 </file>
 
 <file path=ppt/slides/slide19.xml><?xml version="1.0" encoding="utf-8"?>
-<p:sld xmlns:a="http://schemas.openxmlformats.org/drawingml/2006/main" xmlns:r="http://schemas.openxmlformats.org/officeDocument/2006/relationships" xmlns:p="http://schemas.openxmlformats.org/presentationml/2006/main">
+<p:sld xmlns:a="http://schemas.openxmlformats.org/drawingml/2006/main" xmlns:r="http://schemas.openxmlformats.org/officeDocument/2006/relationships" xmlns:mc="http://schemas.openxmlformats.org/markup-compatibility/2006" xmlns:mv="urn:schemas-microsoft-com:mac:vml" xmlns:p="http://schemas.openxmlformats.org/presentationml/2006/main" mc:Ignorable="mv" mc:PreserveAttributes="mv:*">
   <p:cSld>
     <p:spTree>
       <p:nvGrpSpPr>
@@ -5228,7 +5378,7 @@
 </file>
 
 <file path=ppt/slides/slide2.xml><?xml version="1.0" encoding="utf-8"?>
-<p:sld xmlns:a="http://schemas.openxmlformats.org/drawingml/2006/main" xmlns:r="http://schemas.openxmlformats.org/officeDocument/2006/relationships" xmlns:p="http://schemas.openxmlformats.org/presentationml/2006/main">
+<p:sld xmlns:a="http://schemas.openxmlformats.org/drawingml/2006/main" xmlns:r="http://schemas.openxmlformats.org/officeDocument/2006/relationships" xmlns:mc="http://schemas.openxmlformats.org/markup-compatibility/2006" xmlns:mv="urn:schemas-microsoft-com:mac:vml" xmlns:p="http://schemas.openxmlformats.org/presentationml/2006/main" mc:Ignorable="mv" mc:PreserveAttributes="mv:*">
   <p:cSld>
     <p:spTree>
       <p:nvGrpSpPr>
@@ -5353,7 +5503,7 @@
 </file>
 
 <file path=ppt/slides/slide3.xml><?xml version="1.0" encoding="utf-8"?>
-<p:sld xmlns:a="http://schemas.openxmlformats.org/drawingml/2006/main" xmlns:r="http://schemas.openxmlformats.org/officeDocument/2006/relationships" xmlns:p="http://schemas.openxmlformats.org/presentationml/2006/main">
+<p:sld xmlns:a="http://schemas.openxmlformats.org/drawingml/2006/main" xmlns:r="http://schemas.openxmlformats.org/officeDocument/2006/relationships" xmlns:mc="http://schemas.openxmlformats.org/markup-compatibility/2006" xmlns:mv="urn:schemas-microsoft-com:mac:vml" xmlns:p="http://schemas.openxmlformats.org/presentationml/2006/main" mc:Ignorable="mv" mc:PreserveAttributes="mv:*">
   <p:cSld>
     <p:spTree>
       <p:nvGrpSpPr>
@@ -5516,7 +5666,7 @@
 </file>
 
 <file path=ppt/slides/slide4.xml><?xml version="1.0" encoding="utf-8"?>
-<p:sld xmlns:a="http://schemas.openxmlformats.org/drawingml/2006/main" xmlns:r="http://schemas.openxmlformats.org/officeDocument/2006/relationships" xmlns:p="http://schemas.openxmlformats.org/presentationml/2006/main">
+<p:sld xmlns:a="http://schemas.openxmlformats.org/drawingml/2006/main" xmlns:r="http://schemas.openxmlformats.org/officeDocument/2006/relationships" xmlns:mc="http://schemas.openxmlformats.org/markup-compatibility/2006" xmlns:mv="urn:schemas-microsoft-com:mac:vml" xmlns:p="http://schemas.openxmlformats.org/presentationml/2006/main" mc:Ignorable="mv" mc:PreserveAttributes="mv:*">
   <p:cSld>
     <p:spTree>
       <p:nvGrpSpPr>
@@ -5684,7 +5834,7 @@
 </file>
 
 <file path=ppt/slides/slide5.xml><?xml version="1.0" encoding="utf-8"?>
-<p:sld xmlns:a="http://schemas.openxmlformats.org/drawingml/2006/main" xmlns:r="http://schemas.openxmlformats.org/officeDocument/2006/relationships" xmlns:p="http://schemas.openxmlformats.org/presentationml/2006/main">
+<p:sld xmlns:a="http://schemas.openxmlformats.org/drawingml/2006/main" xmlns:r="http://schemas.openxmlformats.org/officeDocument/2006/relationships" xmlns:mc="http://schemas.openxmlformats.org/markup-compatibility/2006" xmlns:mv="urn:schemas-microsoft-com:mac:vml" xmlns:p="http://schemas.openxmlformats.org/presentationml/2006/main" mc:Ignorable="mv" mc:PreserveAttributes="mv:*">
   <p:cSld>
     <p:spTree>
       <p:nvGrpSpPr>
@@ -5809,7 +5959,7 @@
 </file>
 
 <file path=ppt/slides/slide6.xml><?xml version="1.0" encoding="utf-8"?>
-<p:sld xmlns:a="http://schemas.openxmlformats.org/drawingml/2006/main" xmlns:r="http://schemas.openxmlformats.org/officeDocument/2006/relationships" xmlns:p="http://schemas.openxmlformats.org/presentationml/2006/main">
+<p:sld xmlns:a="http://schemas.openxmlformats.org/drawingml/2006/main" xmlns:r="http://schemas.openxmlformats.org/officeDocument/2006/relationships" xmlns:mc="http://schemas.openxmlformats.org/markup-compatibility/2006" xmlns:mv="urn:schemas-microsoft-com:mac:vml" xmlns:p="http://schemas.openxmlformats.org/presentationml/2006/main" mc:Ignorable="mv" mc:PreserveAttributes="mv:*">
   <p:cSld>
     <p:spTree>
       <p:nvGrpSpPr>
@@ -5963,7 +6113,7 @@
 </file>
 
 <file path=ppt/slides/slide7.xml><?xml version="1.0" encoding="utf-8"?>
-<p:sld xmlns:a="http://schemas.openxmlformats.org/drawingml/2006/main" xmlns:r="http://schemas.openxmlformats.org/officeDocument/2006/relationships" xmlns:p="http://schemas.openxmlformats.org/presentationml/2006/main">
+<p:sld xmlns:a="http://schemas.openxmlformats.org/drawingml/2006/main" xmlns:r="http://schemas.openxmlformats.org/officeDocument/2006/relationships" xmlns:mc="http://schemas.openxmlformats.org/markup-compatibility/2006" xmlns:mv="urn:schemas-microsoft-com:mac:vml" xmlns:p="http://schemas.openxmlformats.org/presentationml/2006/main" mc:Ignorable="mv" mc:PreserveAttributes="mv:*">
   <p:cSld>
     <p:spTree>
       <p:nvGrpSpPr>
@@ -6081,7 +6231,7 @@
 </file>
 
 <file path=ppt/slides/slide8.xml><?xml version="1.0" encoding="utf-8"?>
-<p:sld xmlns:a="http://schemas.openxmlformats.org/drawingml/2006/main" xmlns:r="http://schemas.openxmlformats.org/officeDocument/2006/relationships" xmlns:p="http://schemas.openxmlformats.org/presentationml/2006/main">
+<p:sld xmlns:a="http://schemas.openxmlformats.org/drawingml/2006/main" xmlns:r="http://schemas.openxmlformats.org/officeDocument/2006/relationships" xmlns:mc="http://schemas.openxmlformats.org/markup-compatibility/2006" xmlns:mv="urn:schemas-microsoft-com:mac:vml" xmlns:p="http://schemas.openxmlformats.org/presentationml/2006/main" mc:Ignorable="mv" mc:PreserveAttributes="mv:*">
   <p:cSld>
     <p:spTree>
       <p:nvGrpSpPr>
@@ -6239,7 +6389,7 @@
 </file>
 
 <file path=ppt/slides/slide9.xml><?xml version="1.0" encoding="utf-8"?>
-<p:sld xmlns:a="http://schemas.openxmlformats.org/drawingml/2006/main" xmlns:r="http://schemas.openxmlformats.org/officeDocument/2006/relationships" xmlns:p="http://schemas.openxmlformats.org/presentationml/2006/main">
+<p:sld xmlns:a="http://schemas.openxmlformats.org/drawingml/2006/main" xmlns:r="http://schemas.openxmlformats.org/officeDocument/2006/relationships" xmlns:mc="http://schemas.openxmlformats.org/markup-compatibility/2006" xmlns:mv="urn:schemas-microsoft-com:mac:vml" xmlns:p="http://schemas.openxmlformats.org/presentationml/2006/main" mc:Ignorable="mv" mc:PreserveAttributes="mv:*">
   <p:cSld>
     <p:spTree>
       <p:nvGrpSpPr>
@@ -6925,4 +7075,322 @@
   <a:objectDefaults/>
   <a:extraClrSchemeLst/>
 </a:theme>
+</file>
+
+<file path=ppt/theme/theme3.xml><?xml version="1.0" encoding="utf-8"?>
+<a:theme xmlns:a="http://schemas.openxmlformats.org/drawingml/2006/main" name="Office Theme">
+  <a:themeElements>
+    <a:clrScheme name="Office">
+      <a:dk1>
+        <a:sysClr val="windowText" lastClr="000000"/>
+      </a:dk1>
+      <a:lt1>
+        <a:sysClr val="window" lastClr="FFFFFF"/>
+      </a:lt1>
+      <a:dk2>
+        <a:srgbClr val="1F497D"/>
+      </a:dk2>
+      <a:lt2>
+        <a:srgbClr val="EEECE1"/>
+      </a:lt2>
+      <a:accent1>
+        <a:srgbClr val="4F81BD"/>
+      </a:accent1>
+      <a:accent2>
+        <a:srgbClr val="C0504D"/>
+      </a:accent2>
+      <a:accent3>
+        <a:srgbClr val="9BBB59"/>
+      </a:accent3>
+      <a:accent4>
+        <a:srgbClr val="8064A2"/>
+      </a:accent4>
+      <a:accent5>
+        <a:srgbClr val="4BACC6"/>
+      </a:accent5>
+      <a:accent6>
+        <a:srgbClr val="F79646"/>
+      </a:accent6>
+      <a:hlink>
+        <a:srgbClr val="0000FF"/>
+      </a:hlink>
+      <a:folHlink>
+        <a:srgbClr val="800080"/>
+      </a:folHlink>
+    </a:clrScheme>
+    <a:fontScheme name="Office">
+      <a:majorFont>
+        <a:latin typeface="Calibri"/>
+        <a:ea typeface=""/>
+        <a:cs typeface=""/>
+        <a:font script="Jpan" typeface="ＭＳ Ｐゴシック"/>
+        <a:font script="Hang" typeface="맑은 고딕"/>
+        <a:font script="Hans" typeface="宋体"/>
+        <a:font script="Hant" typeface="新細明體"/>
+        <a:font script="Arab" typeface="Times New Roman"/>
+        <a:font script="Hebr" typeface="Times New Roman"/>
+        <a:font script="Thai" typeface="Angsana New"/>
+        <a:font script="Ethi" typeface="Nyala"/>
+        <a:font script="Beng" typeface="Vrinda"/>
+        <a:font script="Gujr" typeface="Shruti"/>
+        <a:font script="Khmr" typeface="MoolBoran"/>
+        <a:font script="Knda" typeface="Tunga"/>
+        <a:font script="Guru" typeface="Raavi"/>
+        <a:font script="Cans" typeface="Euphemia"/>
+        <a:font script="Cher" typeface="Plantagenet Cherokee"/>
+        <a:font script="Yiii" typeface="Microsoft Yi Baiti"/>
+        <a:font script="Tibt" typeface="Microsoft Himalaya"/>
+        <a:font script="Thaa" typeface="MV Boli"/>
+        <a:font script="Deva" typeface="Mangal"/>
+        <a:font script="Telu" typeface="Gautami"/>
+        <a:font script="Taml" typeface="Latha"/>
+        <a:font script="Syrc" typeface="Estrangelo Edessa"/>
+        <a:font script="Orya" typeface="Kalinga"/>
+        <a:font script="Mlym" typeface="Kartika"/>
+        <a:font script="Laoo" typeface="DokChampa"/>
+        <a:font script="Sinh" typeface="Iskoola Pota"/>
+        <a:font script="Mong" typeface="Mongolian Baiti"/>
+        <a:font script="Viet" typeface="Times New Roman"/>
+        <a:font script="Uigh" typeface="Microsoft Uighur"/>
+      </a:majorFont>
+      <a:minorFont>
+        <a:latin typeface="Calibri"/>
+        <a:ea typeface=""/>
+        <a:cs typeface=""/>
+        <a:font script="Jpan" typeface="ＭＳ Ｐゴシック"/>
+        <a:font script="Hang" typeface="맑은 고딕"/>
+        <a:font script="Hans" typeface="宋体"/>
+        <a:font script="Hant" typeface="新細明體"/>
+        <a:font script="Arab" typeface="Arial"/>
+        <a:font script="Hebr" typeface="Arial"/>
+        <a:font script="Thai" typeface="Cordia New"/>
+        <a:font script="Ethi" typeface="Nyala"/>
+        <a:font script="Beng" typeface="Vrinda"/>
+        <a:font script="Gujr" typeface="Shruti"/>
+        <a:font script="Khmr" typeface="DaunPenh"/>
+        <a:font script="Knda" typeface="Tunga"/>
+        <a:font script="Guru" typeface="Raavi"/>
+        <a:font script="Cans" typeface="Euphemia"/>
+        <a:font script="Cher" typeface="Plantagenet Cherokee"/>
+        <a:font script="Yiii" typeface="Microsoft Yi Baiti"/>
+        <a:font script="Tibt" typeface="Microsoft Himalaya"/>
+        <a:font script="Thaa" typeface="MV Boli"/>
+        <a:font script="Deva" typeface="Mangal"/>
+        <a:font script="Telu" typeface="Gautami"/>
+        <a:font script="Taml" typeface="Latha"/>
+        <a:font script="Syrc" typeface="Estrangelo Edessa"/>
+        <a:font script="Orya" typeface="Kalinga"/>
+        <a:font script="Mlym" typeface="Kartika"/>
+        <a:font script="Laoo" typeface="DokChampa"/>
+        <a:font script="Sinh" typeface="Iskoola Pota"/>
+        <a:font script="Mong" typeface="Mongolian Baiti"/>
+        <a:font script="Viet" typeface="Arial"/>
+        <a:font script="Uigh" typeface="Microsoft Uighur"/>
+      </a:minorFont>
+    </a:fontScheme>
+    <a:fmtScheme name="Office">
+      <a:fillStyleLst>
+        <a:solidFill>
+          <a:schemeClr val="phClr"/>
+        </a:solidFill>
+        <a:gradFill rotWithShape="1">
+          <a:gsLst>
+            <a:gs pos="0">
+              <a:schemeClr val="phClr">
+                <a:tint val="50000"/>
+                <a:satMod val="300000"/>
+              </a:schemeClr>
+            </a:gs>
+            <a:gs pos="35000">
+              <a:schemeClr val="phClr">
+                <a:tint val="37000"/>
+                <a:satMod val="300000"/>
+              </a:schemeClr>
+            </a:gs>
+            <a:gs pos="100000">
+              <a:schemeClr val="phClr">
+                <a:tint val="15000"/>
+                <a:satMod val="350000"/>
+              </a:schemeClr>
+            </a:gs>
+          </a:gsLst>
+          <a:lin ang="16200000" scaled="1"/>
+        </a:gradFill>
+        <a:gradFill rotWithShape="1">
+          <a:gsLst>
+            <a:gs pos="0">
+              <a:schemeClr val="phClr">
+                <a:tint val="100000"/>
+                <a:shade val="100000"/>
+                <a:satMod val="130000"/>
+              </a:schemeClr>
+            </a:gs>
+            <a:gs pos="100000">
+              <a:schemeClr val="phClr">
+                <a:tint val="50000"/>
+                <a:shade val="100000"/>
+                <a:satMod val="350000"/>
+              </a:schemeClr>
+            </a:gs>
+          </a:gsLst>
+          <a:lin ang="16200000" scaled="0"/>
+        </a:gradFill>
+      </a:fillStyleLst>
+      <a:lnStyleLst>
+        <a:ln w="9525" cap="flat" cmpd="sng" algn="ctr">
+          <a:solidFill>
+            <a:schemeClr val="phClr">
+              <a:shade val="95000"/>
+              <a:satMod val="105000"/>
+            </a:schemeClr>
+          </a:solidFill>
+          <a:prstDash val="solid"/>
+        </a:ln>
+        <a:ln w="25400" cap="flat" cmpd="sng" algn="ctr">
+          <a:solidFill>
+            <a:schemeClr val="phClr"/>
+          </a:solidFill>
+          <a:prstDash val="solid"/>
+        </a:ln>
+        <a:ln w="38100" cap="flat" cmpd="sng" algn="ctr">
+          <a:solidFill>
+            <a:schemeClr val="phClr"/>
+          </a:solidFill>
+          <a:prstDash val="solid"/>
+        </a:ln>
+      </a:lnStyleLst>
+      <a:effectStyleLst>
+        <a:effectStyle>
+          <a:effectLst>
+            <a:outerShdw blurRad="40000" dist="20000" dir="5400000" rotWithShape="0">
+              <a:srgbClr val="000000">
+                <a:alpha val="38000"/>
+              </a:srgbClr>
+            </a:outerShdw>
+          </a:effectLst>
+        </a:effectStyle>
+        <a:effectStyle>
+          <a:effectLst>
+            <a:outerShdw blurRad="40000" dist="23000" dir="5400000" rotWithShape="0">
+              <a:srgbClr val="000000">
+                <a:alpha val="35000"/>
+              </a:srgbClr>
+            </a:outerShdw>
+          </a:effectLst>
+        </a:effectStyle>
+        <a:effectStyle>
+          <a:effectLst>
+            <a:outerShdw blurRad="40000" dist="23000" dir="5400000" rotWithShape="0">
+              <a:srgbClr val="000000">
+                <a:alpha val="35000"/>
+              </a:srgbClr>
+            </a:outerShdw>
+          </a:effectLst>
+          <a:scene3d>
+            <a:camera prst="orthographicFront">
+              <a:rot lat="0" lon="0" rev="0"/>
+            </a:camera>
+            <a:lightRig rig="threePt" dir="t">
+              <a:rot lat="0" lon="0" rev="1200000"/>
+            </a:lightRig>
+          </a:scene3d>
+          <a:sp3d>
+            <a:bevelT w="63500" h="25400"/>
+          </a:sp3d>
+        </a:effectStyle>
+      </a:effectStyleLst>
+      <a:bgFillStyleLst>
+        <a:solidFill>
+          <a:schemeClr val="phClr"/>
+        </a:solidFill>
+        <a:gradFill rotWithShape="1">
+          <a:gsLst>
+            <a:gs pos="0">
+              <a:schemeClr val="phClr">
+                <a:tint val="40000"/>
+                <a:satMod val="350000"/>
+              </a:schemeClr>
+            </a:gs>
+            <a:gs pos="40000">
+              <a:schemeClr val="phClr">
+                <a:tint val="45000"/>
+                <a:shade val="99000"/>
+                <a:satMod val="350000"/>
+              </a:schemeClr>
+            </a:gs>
+            <a:gs pos="100000">
+              <a:schemeClr val="phClr">
+                <a:shade val="20000"/>
+                <a:satMod val="255000"/>
+              </a:schemeClr>
+            </a:gs>
+          </a:gsLst>
+          <a:path path="circle">
+            <a:fillToRect l="50000" t="-80000" r="50000" b="180000"/>
+          </a:path>
+        </a:gradFill>
+        <a:gradFill rotWithShape="1">
+          <a:gsLst>
+            <a:gs pos="0">
+              <a:schemeClr val="phClr">
+                <a:tint val="80000"/>
+                <a:satMod val="300000"/>
+              </a:schemeClr>
+            </a:gs>
+            <a:gs pos="100000">
+              <a:schemeClr val="phClr">
+                <a:shade val="30000"/>
+                <a:satMod val="200000"/>
+              </a:schemeClr>
+            </a:gs>
+          </a:gsLst>
+          <a:path path="circle">
+            <a:fillToRect l="50000" t="50000" r="50000" b="50000"/>
+          </a:path>
+        </a:gradFill>
+      </a:bgFillStyleLst>
+    </a:fmtScheme>
+  </a:themeElements>
+  <a:objectDefaults>
+    <a:spDef>
+      <a:spPr/>
+      <a:bodyPr/>
+      <a:lstStyle/>
+      <a:style>
+        <a:lnRef idx="1">
+          <a:schemeClr val="accent1"/>
+        </a:lnRef>
+        <a:fillRef idx="3">
+          <a:schemeClr val="accent1"/>
+        </a:fillRef>
+        <a:effectRef idx="2">
+          <a:schemeClr val="accent1"/>
+        </a:effectRef>
+        <a:fontRef idx="minor">
+          <a:schemeClr val="lt1"/>
+        </a:fontRef>
+      </a:style>
+    </a:spDef>
+    <a:lnDef>
+      <a:spPr/>
+      <a:bodyPr/>
+      <a:lstStyle/>
+      <a:style>
+        <a:lnRef idx="2">
+          <a:schemeClr val="accent1"/>
+        </a:lnRef>
+        <a:fillRef idx="0">
+          <a:schemeClr val="accent1"/>
+        </a:fillRef>
+        <a:effectRef idx="1">
+          <a:schemeClr val="accent1"/>
+        </a:effectRef>
+        <a:fontRef idx="minor">
+          <a:schemeClr val="tx1"/>
+        </a:fontRef>
+      </a:style>
+    </a:lnDef>
+  </a:objectDefaults>
+  <a:extraClrSchemeLst/>
+</a:theme>
 </file>
</xml_diff>

<commit_message>
website -> webpage, language from paper changed
</commit_message>
<xml_diff>
--- a/doc/pres1/wk4-progress.pptx
+++ b/doc/pres1/wk4-progress.pptx
@@ -4649,7 +4649,7 @@
         <p:spPr/>
         <p:txBody>
           <a:bodyPr>
-            <a:normAutofit fontScale="77500" lnSpcReduction="20000"/>
+            <a:normAutofit fontScale="85000" lnSpcReduction="20000"/>
           </a:bodyPr>
           <a:lstStyle/>
           <a:p>
@@ -4683,28 +4683,70 @@
             <a:pPr lvl="1"/>
             <a:r>
               <a:rPr lang="en-GB" dirty="0"/>
-              <a:t>Determined what is a malicious website</a:t>
+              <a:t>Determined what is a malicious</a:t>
+            </a:r>
+            <a:r>
+              <a:rPr lang="en-GB" dirty="0" smtClean="0"/>
+              <a:t> webpage</a:t>
             </a:r>
           </a:p>
           <a:p>
             <a:pPr lvl="1"/>
             <a:r>
               <a:rPr lang="en-GB" dirty="0"/>
-              <a:t>The actual website is not visited</a:t>
-            </a:r>
+              <a:t>The</a:t>
+            </a:r>
+            <a:r>
+              <a:rPr lang="en-GB" dirty="0" smtClean="0"/>
+              <a:t> </a:t>
+            </a:r>
+            <a:r>
+              <a:rPr lang="en-GB" dirty="0" smtClean="0"/>
+              <a:t>webpage </a:t>
+            </a:r>
+            <a:r>
+              <a:rPr lang="en-GB" dirty="0" smtClean="0"/>
+              <a:t>is </a:t>
+            </a:r>
+            <a:r>
+              <a:rPr lang="en-GB" dirty="0"/>
+              <a:t>not</a:t>
+            </a:r>
+            <a:r>
+              <a:rPr lang="en-GB" dirty="0" smtClean="0"/>
+              <a:t> </a:t>
+            </a:r>
+            <a:r>
+              <a:rPr lang="en-GB" dirty="0" smtClean="0"/>
+              <a:t>rendered and code is not executed</a:t>
+            </a:r>
+            <a:endParaRPr lang="en-GB" dirty="0" smtClean="0"/>
           </a:p>
           <a:p>
             <a:pPr lvl="1"/>
             <a:r>
               <a:rPr lang="en-GB" dirty="0"/>
-              <a:t>The source code of target website is crawled</a:t>
-            </a:r>
+              <a:t>The source code of target</a:t>
+            </a:r>
+            <a:r>
+              <a:rPr lang="en-GB" dirty="0" smtClean="0"/>
+              <a:t> </a:t>
+            </a:r>
+            <a:r>
+              <a:rPr lang="en-GB" dirty="0" smtClean="0"/>
+              <a:t>webpage is downloaded </a:t>
+            </a:r>
+            <a:endParaRPr lang="en-GB" dirty="0" smtClean="0"/>
           </a:p>
           <a:p>
             <a:pPr lvl="1"/>
             <a:r>
+              <a:rPr lang="en-GB" dirty="0" smtClean="0"/>
+              <a:t>Compare </a:t>
+            </a:r>
+            <a:r>
               <a:rPr lang="en-GB" dirty="0"/>
-              <a:t>Comparing website source with the malicious action pattern of the system</a:t>
+              <a:t>website source with the malicious action pattern of the system</a:t>
             </a:r>
             <a:endParaRPr lang="en-GB" dirty="0" smtClean="0"/>
           </a:p>
@@ -4717,19 +4759,28 @@
               <a:rPr lang="en-GB" dirty="0" smtClean="0"/>
               <a:t>pot</a:t>
             </a:r>
+            <a:endParaRPr lang="en-GB" dirty="0" smtClean="0"/>
           </a:p>
           <a:p>
             <a:pPr lvl="1"/>
             <a:r>
+              <a:rPr lang="en-GB" dirty="0" smtClean="0"/>
+              <a:t>Render webpage using a web </a:t>
+            </a:r>
+            <a:r>
               <a:rPr lang="en-GB" dirty="0"/>
-              <a:t>Visit the website to check by using the web browser </a:t>
+              <a:t>browser </a:t>
             </a:r>
           </a:p>
           <a:p>
             <a:pPr lvl="1"/>
             <a:r>
+              <a:rPr lang="en-GB" dirty="0" smtClean="0"/>
+              <a:t>Analyse webpage </a:t>
+            </a:r>
+            <a:r>
               <a:rPr lang="en-GB" dirty="0"/>
-              <a:t>Analyse the malicious website by monitoring malicious behaviour</a:t>
+              <a:t>by monitoring malicious behaviour</a:t>
             </a:r>
           </a:p>
           <a:p>
@@ -4866,14 +4917,22 @@
             </a:r>
             <a:r>
               <a:rPr lang="en-GB" dirty="0"/>
-              <a:t>suspicious websites </a:t>
+              <a:t>suspicious </a:t>
+            </a:r>
+            <a:r>
+              <a:rPr lang="en-GB" dirty="0" smtClean="0"/>
+              <a:t>webpage</a:t>
             </a:r>
           </a:p>
           <a:p>
             <a:pPr lvl="2"/>
             <a:r>
               <a:rPr lang="en-GB" dirty="0"/>
-              <a:t>Derive lexical features for each suspicious websites</a:t>
+              <a:t>Derive lexical features for each suspicious</a:t>
+            </a:r>
+            <a:r>
+              <a:rPr lang="en-GB" dirty="0" smtClean="0"/>
+              <a:t> webpage</a:t>
             </a:r>
           </a:p>
           <a:p>

</xml_diff>

<commit_message>
Finished presentation (first draft)
</commit_message>
<xml_diff>
--- a/doc/pres1/wk4-progress.pptx
+++ b/doc/pres1/wk4-progress.pptx
@@ -1,35 +1,37 @@
 
 <file path=ppt/presentation.xml><?xml version="1.0" encoding="utf-8"?>
-<p:presentation xmlns:a="http://schemas.openxmlformats.org/drawingml/2006/main" xmlns:r="http://schemas.openxmlformats.org/officeDocument/2006/relationships" xmlns:mc="http://schemas.openxmlformats.org/markup-compatibility/2006" xmlns:mv="urn:schemas-microsoft-com:mac:vml" xmlns:p="http://schemas.openxmlformats.org/presentationml/2006/main" mc:Ignorable="mv" mc:PreserveAttributes="mv:*" saveSubsetFonts="1">
+<p:presentation xmlns:a="http://schemas.openxmlformats.org/drawingml/2006/main" xmlns:r="http://schemas.openxmlformats.org/officeDocument/2006/relationships" xmlns:p="http://schemas.openxmlformats.org/presentationml/2006/main" saveSubsetFonts="1">
   <p:sldMasterIdLst>
     <p:sldMasterId id="2147483648" r:id="rId1"/>
   </p:sldMasterIdLst>
   <p:notesMasterIdLst>
-    <p:notesMasterId r:id="rId21"/>
+    <p:notesMasterId r:id="rId23"/>
   </p:notesMasterIdLst>
   <p:handoutMasterIdLst>
-    <p:handoutMasterId r:id="rId22"/>
+    <p:handoutMasterId r:id="rId24"/>
   </p:handoutMasterIdLst>
   <p:sldIdLst>
     <p:sldId id="256" r:id="rId2"/>
     <p:sldId id="257" r:id="rId3"/>
     <p:sldId id="258" r:id="rId4"/>
-    <p:sldId id="259" r:id="rId5"/>
-    <p:sldId id="260" r:id="rId6"/>
-    <p:sldId id="267" r:id="rId7"/>
-    <p:sldId id="261" r:id="rId8"/>
-    <p:sldId id="262" r:id="rId9"/>
-    <p:sldId id="263" r:id="rId10"/>
+    <p:sldId id="277" r:id="rId5"/>
+    <p:sldId id="259" r:id="rId6"/>
+    <p:sldId id="260" r:id="rId7"/>
+    <p:sldId id="267" r:id="rId8"/>
+    <p:sldId id="261" r:id="rId9"/>
+    <p:sldId id="262" r:id="rId10"/>
     <p:sldId id="264" r:id="rId11"/>
-    <p:sldId id="268" r:id="rId12"/>
-    <p:sldId id="269" r:id="rId13"/>
-    <p:sldId id="274" r:id="rId14"/>
-    <p:sldId id="275" r:id="rId15"/>
-    <p:sldId id="265" r:id="rId16"/>
-    <p:sldId id="266" r:id="rId17"/>
-    <p:sldId id="270" r:id="rId18"/>
-    <p:sldId id="272" r:id="rId19"/>
-    <p:sldId id="273" r:id="rId20"/>
+    <p:sldId id="263" r:id="rId12"/>
+    <p:sldId id="268" r:id="rId13"/>
+    <p:sldId id="276" r:id="rId14"/>
+    <p:sldId id="269" r:id="rId15"/>
+    <p:sldId id="274" r:id="rId16"/>
+    <p:sldId id="275" r:id="rId17"/>
+    <p:sldId id="265" r:id="rId18"/>
+    <p:sldId id="266" r:id="rId19"/>
+    <p:sldId id="270" r:id="rId20"/>
+    <p:sldId id="272" r:id="rId21"/>
+    <p:sldId id="273" r:id="rId22"/>
   </p:sldIdLst>
   <p:sldSz cx="9144000" cy="6858000" type="screen4x3"/>
   <p:notesSz cx="6858000" cy="9144000"/>
@@ -132,15 +134,15 @@
 </file>
 
 <file path=ppt/commentAuthors.xml><?xml version="1.0" encoding="utf-8"?>
-<p:cmAuthorLst xmlns:a="http://schemas.openxmlformats.org/drawingml/2006/main" xmlns:r="http://schemas.openxmlformats.org/officeDocument/2006/relationships" xmlns:mc="http://schemas.openxmlformats.org/markup-compatibility/2006" xmlns:mv="urn:schemas-microsoft-com:mac:vml" xmlns:p="http://schemas.openxmlformats.org/presentationml/2006/main" mc:Ignorable="mv" mc:PreserveAttributes="mv:*">
+<p:cmAuthorLst xmlns:a="http://schemas.openxmlformats.org/drawingml/2006/main" xmlns:r="http://schemas.openxmlformats.org/officeDocument/2006/relationships" xmlns:p="http://schemas.openxmlformats.org/presentationml/2006/main">
   <p:cmAuthor id="0" name="tag1g09" initials="t" lastIdx="4" clrIdx="0"/>
 </p:cmAuthorLst>
 </file>
 
 <file path=ppt/comments/comment1.xml><?xml version="1.0" encoding="utf-8"?>
-<p:cmLst xmlns:a="http://schemas.openxmlformats.org/drawingml/2006/main" xmlns:r="http://schemas.openxmlformats.org/officeDocument/2006/relationships" xmlns:mc="http://schemas.openxmlformats.org/markup-compatibility/2006" xmlns:mv="urn:schemas-microsoft-com:mac:vml" xmlns:p="http://schemas.openxmlformats.org/presentationml/2006/main" mc:Ignorable="mv" mc:PreserveAttributes="mv:*">
+<p:cmLst xmlns:a="http://schemas.openxmlformats.org/drawingml/2006/main" xmlns:r="http://schemas.openxmlformats.org/officeDocument/2006/relationships" xmlns:p="http://schemas.openxmlformats.org/presentationml/2006/main">
   <p:cm authorId="0" dt="2012-10-23T13:09:23.805" idx="1">
-    <p:pos x="3290" y="1437"/>
+    <p:pos x="3308" y="1419"/>
     <p:text>Not sure what this means</p:text>
   </p:cm>
   <p:cm authorId="0" dt="2012-10-23T13:10:21.004" idx="2">
@@ -151,16 +153,7 @@
 </file>
 
 <file path=ppt/comments/comment2.xml><?xml version="1.0" encoding="utf-8"?>
-<p:cmLst xmlns:a="http://schemas.openxmlformats.org/drawingml/2006/main" xmlns:r="http://schemas.openxmlformats.org/officeDocument/2006/relationships" xmlns:mc="http://schemas.openxmlformats.org/markup-compatibility/2006" xmlns:mv="urn:schemas-microsoft-com:mac:vml" xmlns:p="http://schemas.openxmlformats.org/presentationml/2006/main" mc:Ignorable="mv" mc:PreserveAttributes="mv:*">
-  <p:cm authorId="0" dt="2012-10-23T13:13:15.533" idx="3">
-    <p:pos x="4661" y="3064"/>
-    <p:text>I thought it reduced the occurance of malicious pages on google. I didn't think they calculated the revenue</p:text>
-  </p:cm>
-</p:cmLst>
-</file>
-
-<file path=ppt/comments/comment3.xml><?xml version="1.0" encoding="utf-8"?>
-<p:cmLst xmlns:a="http://schemas.openxmlformats.org/drawingml/2006/main" xmlns:r="http://schemas.openxmlformats.org/officeDocument/2006/relationships" xmlns:mc="http://schemas.openxmlformats.org/markup-compatibility/2006" xmlns:mv="urn:schemas-microsoft-com:mac:vml" xmlns:p="http://schemas.openxmlformats.org/presentationml/2006/main" mc:Ignorable="mv" mc:PreserveAttributes="mv:*">
+<p:cmLst xmlns:a="http://schemas.openxmlformats.org/drawingml/2006/main" xmlns:r="http://schemas.openxmlformats.org/officeDocument/2006/relationships" xmlns:p="http://schemas.openxmlformats.org/presentationml/2006/main">
   <p:cm authorId="0" dt="2012-10-23T13:15:13.711" idx="4">
     <p:pos x="10" y="10"/>
     <p:text>This digram does seem to work, It needs finishing.</p:text>
@@ -169,7 +162,7 @@
 </file>
 
 <file path=ppt/handoutMasters/handoutMaster1.xml><?xml version="1.0" encoding="utf-8"?>
-<p:handoutMaster xmlns:a="http://schemas.openxmlformats.org/drawingml/2006/main" xmlns:r="http://schemas.openxmlformats.org/officeDocument/2006/relationships" xmlns:mc="http://schemas.openxmlformats.org/markup-compatibility/2006" xmlns:mv="urn:schemas-microsoft-com:mac:vml" xmlns:p="http://schemas.openxmlformats.org/presentationml/2006/main" mc:Ignorable="mv" mc:PreserveAttributes="mv:*">
+<p:handoutMaster xmlns:a="http://schemas.openxmlformats.org/drawingml/2006/main" xmlns:r="http://schemas.openxmlformats.org/officeDocument/2006/relationships" xmlns:p="http://schemas.openxmlformats.org/presentationml/2006/main">
   <p:cSld>
     <p:bg>
       <p:bgRef idx="1001">
@@ -250,7 +243,7 @@
           <a:p>
             <a:fld id="{18F98EB7-082C-9949-BFCA-B4BAD2D6FDBD}" type="datetimeFigureOut">
               <a:rPr lang="en-US" smtClean="0"/>
-              <a:t>10/23/12</a:t>
+              <a:t>10/23/2012</a:t>
             </a:fld>
             <a:endParaRPr lang="en-US"/>
           </a:p>
@@ -323,13 +316,18 @@
         </p:txBody>
       </p:sp>
     </p:spTree>
+    <p:extLst>
+      <p:ext uri="{BB962C8B-B14F-4D97-AF65-F5344CB8AC3E}">
+        <p14:creationId xmlns:p14="http://schemas.microsoft.com/office/powerpoint/2010/main" val="1901348598"/>
+      </p:ext>
+    </p:extLst>
   </p:cSld>
   <p:clrMap bg1="lt1" tx1="dk1" bg2="lt2" tx2="dk2" accent1="accent1" accent2="accent2" accent3="accent3" accent4="accent4" accent5="accent5" accent6="accent6" hlink="hlink" folHlink="folHlink"/>
 </p:handoutMaster>
 </file>
 
 <file path=ppt/notesMasters/notesMaster1.xml><?xml version="1.0" encoding="utf-8"?>
-<p:notesMaster xmlns:a="http://schemas.openxmlformats.org/drawingml/2006/main" xmlns:r="http://schemas.openxmlformats.org/officeDocument/2006/relationships" xmlns:mc="http://schemas.openxmlformats.org/markup-compatibility/2006" xmlns:mv="urn:schemas-microsoft-com:mac:vml" xmlns:p="http://schemas.openxmlformats.org/presentationml/2006/main" mc:Ignorable="mv" mc:PreserveAttributes="mv:*">
+<p:notesMaster xmlns:a="http://schemas.openxmlformats.org/drawingml/2006/main" xmlns:r="http://schemas.openxmlformats.org/officeDocument/2006/relationships" xmlns:p="http://schemas.openxmlformats.org/presentationml/2006/main">
   <p:cSld>
     <p:bg>
       <p:bgRef idx="1001">
@@ -411,7 +409,7 @@
             <a:fld id="{5C465251-34BA-484B-BD29-7371F8FBFAE2}" type="datetimeFigureOut">
               <a:rPr lang="en-GB" smtClean="0"/>
               <a:pPr/>
-              <a:t>10/23/12</a:t>
+              <a:t>23/10/2012</a:t>
             </a:fld>
             <a:endParaRPr lang="en-GB"/>
           </a:p>
@@ -582,7 +580,7 @@
     </p:spTree>
     <p:extLst>
       <p:ext uri="{BB962C8B-B14F-4D97-AF65-F5344CB8AC3E}">
-        <p14:creationId xmlns:p14="http://schemas.microsoft.com/office/powerpoint/2010/main" xmlns:p="http://schemas.openxmlformats.org/presentationml/2006/main" xmlns:r="http://schemas.openxmlformats.org/officeDocument/2006/relationships" xmlns:a="http://schemas.openxmlformats.org/drawingml/2006/main" xmlns="" val="1219798393"/>
+        <p14:creationId xmlns:p14="http://schemas.microsoft.com/office/powerpoint/2010/main" val="1219798393"/>
       </p:ext>
     </p:extLst>
   </p:cSld>
@@ -683,7 +681,7 @@
 </file>
 
 <file path=ppt/notesSlides/notesSlide1.xml><?xml version="1.0" encoding="utf-8"?>
-<p:notes xmlns:a="http://schemas.openxmlformats.org/drawingml/2006/main" xmlns:r="http://schemas.openxmlformats.org/officeDocument/2006/relationships" xmlns:mc="http://schemas.openxmlformats.org/markup-compatibility/2006" xmlns:mv="urn:schemas-microsoft-com:mac:vml" xmlns:p="http://schemas.openxmlformats.org/presentationml/2006/main" mc:Ignorable="mv" mc:PreserveAttributes="mv:*">
+<p:notes xmlns:a="http://schemas.openxmlformats.org/drawingml/2006/main" xmlns:r="http://schemas.openxmlformats.org/officeDocument/2006/relationships" xmlns:p="http://schemas.openxmlformats.org/presentationml/2006/main">
   <p:cSld>
     <p:spTree>
       <p:nvGrpSpPr>
@@ -765,7 +763,7 @@
 </file>
 
 <file path=ppt/slideLayouts/slideLayout1.xml><?xml version="1.0" encoding="utf-8"?>
-<p:sldLayout xmlns:a="http://schemas.openxmlformats.org/drawingml/2006/main" xmlns:r="http://schemas.openxmlformats.org/officeDocument/2006/relationships" xmlns:mc="http://schemas.openxmlformats.org/markup-compatibility/2006" xmlns:mv="urn:schemas-microsoft-com:mac:vml" xmlns:p="http://schemas.openxmlformats.org/presentationml/2006/main" mc:Ignorable="mv" mc:PreserveAttributes="mv:*" type="title" preserve="1">
+<p:sldLayout xmlns:a="http://schemas.openxmlformats.org/drawingml/2006/main" xmlns:r="http://schemas.openxmlformats.org/officeDocument/2006/relationships" xmlns:p="http://schemas.openxmlformats.org/presentationml/2006/main" type="title" preserve="1">
   <p:cSld name="Title Slide">
     <p:spTree>
       <p:nvGrpSpPr>
@@ -946,7 +944,7 @@
             <a:fld id="{9B2BCD74-F7F5-4BD6-83D7-1EBC56D75222}" type="datetimeFigureOut">
               <a:rPr lang="en-GB" smtClean="0"/>
               <a:pPr/>
-              <a:t>10/23/12</a:t>
+              <a:t>23/10/2012</a:t>
             </a:fld>
             <a:endParaRPr lang="en-GB"/>
           </a:p>
@@ -1011,7 +1009,7 @@
 </file>
 
 <file path=ppt/slideLayouts/slideLayout10.xml><?xml version="1.0" encoding="utf-8"?>
-<p:sldLayout xmlns:a="http://schemas.openxmlformats.org/drawingml/2006/main" xmlns:r="http://schemas.openxmlformats.org/officeDocument/2006/relationships" xmlns:mc="http://schemas.openxmlformats.org/markup-compatibility/2006" xmlns:mv="urn:schemas-microsoft-com:mac:vml" xmlns:p="http://schemas.openxmlformats.org/presentationml/2006/main" mc:Ignorable="mv" mc:PreserveAttributes="mv:*" type="vertTx" preserve="1">
+<p:sldLayout xmlns:a="http://schemas.openxmlformats.org/drawingml/2006/main" xmlns:r="http://schemas.openxmlformats.org/officeDocument/2006/relationships" xmlns:p="http://schemas.openxmlformats.org/presentationml/2006/main" type="vertTx" preserve="1">
   <p:cSld name="Title and Vertical Text">
     <p:spTree>
       <p:nvGrpSpPr>
@@ -1120,7 +1118,7 @@
             <a:fld id="{9B2BCD74-F7F5-4BD6-83D7-1EBC56D75222}" type="datetimeFigureOut">
               <a:rPr lang="en-GB" smtClean="0"/>
               <a:pPr/>
-              <a:t>10/23/12</a:t>
+              <a:t>23/10/2012</a:t>
             </a:fld>
             <a:endParaRPr lang="en-GB"/>
           </a:p>
@@ -1178,7 +1176,7 @@
 </file>
 
 <file path=ppt/slideLayouts/slideLayout11.xml><?xml version="1.0" encoding="utf-8"?>
-<p:sldLayout xmlns:a="http://schemas.openxmlformats.org/drawingml/2006/main" xmlns:r="http://schemas.openxmlformats.org/officeDocument/2006/relationships" xmlns:mc="http://schemas.openxmlformats.org/markup-compatibility/2006" xmlns:mv="urn:schemas-microsoft-com:mac:vml" xmlns:p="http://schemas.openxmlformats.org/presentationml/2006/main" mc:Ignorable="mv" mc:PreserveAttributes="mv:*" type="vertTitleAndTx" preserve="1">
+<p:sldLayout xmlns:a="http://schemas.openxmlformats.org/drawingml/2006/main" xmlns:r="http://schemas.openxmlformats.org/officeDocument/2006/relationships" xmlns:p="http://schemas.openxmlformats.org/presentationml/2006/main" type="vertTitleAndTx" preserve="1">
   <p:cSld name="Vertical Title and Text">
     <p:spTree>
       <p:nvGrpSpPr>
@@ -1297,7 +1295,7 @@
             <a:fld id="{9B2BCD74-F7F5-4BD6-83D7-1EBC56D75222}" type="datetimeFigureOut">
               <a:rPr lang="en-GB" smtClean="0"/>
               <a:pPr/>
-              <a:t>10/23/12</a:t>
+              <a:t>23/10/2012</a:t>
             </a:fld>
             <a:endParaRPr lang="en-GB"/>
           </a:p>
@@ -1355,7 +1353,7 @@
 </file>
 
 <file path=ppt/slideLayouts/slideLayout2.xml><?xml version="1.0" encoding="utf-8"?>
-<p:sldLayout xmlns:a="http://schemas.openxmlformats.org/drawingml/2006/main" xmlns:r="http://schemas.openxmlformats.org/officeDocument/2006/relationships" xmlns:mc="http://schemas.openxmlformats.org/markup-compatibility/2006" xmlns:mv="urn:schemas-microsoft-com:mac:vml" xmlns:p="http://schemas.openxmlformats.org/presentationml/2006/main" mc:Ignorable="mv" mc:PreserveAttributes="mv:*" type="obj" preserve="1">
+<p:sldLayout xmlns:a="http://schemas.openxmlformats.org/drawingml/2006/main" xmlns:r="http://schemas.openxmlformats.org/officeDocument/2006/relationships" xmlns:p="http://schemas.openxmlformats.org/presentationml/2006/main" type="obj" preserve="1">
   <p:cSld name="Title and Content">
     <p:spTree>
       <p:nvGrpSpPr>
@@ -1464,7 +1462,7 @@
             <a:fld id="{9B2BCD74-F7F5-4BD6-83D7-1EBC56D75222}" type="datetimeFigureOut">
               <a:rPr lang="en-GB" smtClean="0"/>
               <a:pPr/>
-              <a:t>10/23/12</a:t>
+              <a:t>23/10/2012</a:t>
             </a:fld>
             <a:endParaRPr lang="en-GB"/>
           </a:p>
@@ -1522,7 +1520,7 @@
 </file>
 
 <file path=ppt/slideLayouts/slideLayout3.xml><?xml version="1.0" encoding="utf-8"?>
-<p:sldLayout xmlns:a="http://schemas.openxmlformats.org/drawingml/2006/main" xmlns:r="http://schemas.openxmlformats.org/officeDocument/2006/relationships" xmlns:mc="http://schemas.openxmlformats.org/markup-compatibility/2006" xmlns:mv="urn:schemas-microsoft-com:mac:vml" xmlns:p="http://schemas.openxmlformats.org/presentationml/2006/main" mc:Ignorable="mv" mc:PreserveAttributes="mv:*" type="secHead" preserve="1">
+<p:sldLayout xmlns:a="http://schemas.openxmlformats.org/drawingml/2006/main" xmlns:r="http://schemas.openxmlformats.org/officeDocument/2006/relationships" xmlns:p="http://schemas.openxmlformats.org/presentationml/2006/main" type="secHead" preserve="1">
   <p:cSld name="Section Header">
     <p:spTree>
       <p:nvGrpSpPr>
@@ -1707,7 +1705,7 @@
             <a:fld id="{9B2BCD74-F7F5-4BD6-83D7-1EBC56D75222}" type="datetimeFigureOut">
               <a:rPr lang="en-GB" smtClean="0"/>
               <a:pPr/>
-              <a:t>10/23/12</a:t>
+              <a:t>23/10/2012</a:t>
             </a:fld>
             <a:endParaRPr lang="en-GB"/>
           </a:p>
@@ -1765,7 +1763,7 @@
 </file>
 
 <file path=ppt/slideLayouts/slideLayout4.xml><?xml version="1.0" encoding="utf-8"?>
-<p:sldLayout xmlns:a="http://schemas.openxmlformats.org/drawingml/2006/main" xmlns:r="http://schemas.openxmlformats.org/officeDocument/2006/relationships" xmlns:mc="http://schemas.openxmlformats.org/markup-compatibility/2006" xmlns:mv="urn:schemas-microsoft-com:mac:vml" xmlns:p="http://schemas.openxmlformats.org/presentationml/2006/main" mc:Ignorable="mv" mc:PreserveAttributes="mv:*" type="twoObj" preserve="1">
+<p:sldLayout xmlns:a="http://schemas.openxmlformats.org/drawingml/2006/main" xmlns:r="http://schemas.openxmlformats.org/officeDocument/2006/relationships" xmlns:p="http://schemas.openxmlformats.org/presentationml/2006/main" type="twoObj" preserve="1">
   <p:cSld name="Two Content">
     <p:spTree>
       <p:nvGrpSpPr>
@@ -1992,7 +1990,7 @@
             <a:fld id="{9B2BCD74-F7F5-4BD6-83D7-1EBC56D75222}" type="datetimeFigureOut">
               <a:rPr lang="en-GB" smtClean="0"/>
               <a:pPr/>
-              <a:t>10/23/12</a:t>
+              <a:t>23/10/2012</a:t>
             </a:fld>
             <a:endParaRPr lang="en-GB"/>
           </a:p>
@@ -2050,7 +2048,7 @@
 </file>
 
 <file path=ppt/slideLayouts/slideLayout5.xml><?xml version="1.0" encoding="utf-8"?>
-<p:sldLayout xmlns:a="http://schemas.openxmlformats.org/drawingml/2006/main" xmlns:r="http://schemas.openxmlformats.org/officeDocument/2006/relationships" xmlns:mc="http://schemas.openxmlformats.org/markup-compatibility/2006" xmlns:mv="urn:schemas-microsoft-com:mac:vml" xmlns:p="http://schemas.openxmlformats.org/presentationml/2006/main" mc:Ignorable="mv" mc:PreserveAttributes="mv:*" type="twoTxTwoObj" preserve="1">
+<p:sldLayout xmlns:a="http://schemas.openxmlformats.org/drawingml/2006/main" xmlns:r="http://schemas.openxmlformats.org/officeDocument/2006/relationships" xmlns:p="http://schemas.openxmlformats.org/presentationml/2006/main" type="twoTxTwoObj" preserve="1">
   <p:cSld name="Comparison">
     <p:spTree>
       <p:nvGrpSpPr>
@@ -2411,7 +2409,7 @@
             <a:fld id="{9B2BCD74-F7F5-4BD6-83D7-1EBC56D75222}" type="datetimeFigureOut">
               <a:rPr lang="en-GB" smtClean="0"/>
               <a:pPr/>
-              <a:t>10/23/12</a:t>
+              <a:t>23/10/2012</a:t>
             </a:fld>
             <a:endParaRPr lang="en-GB"/>
           </a:p>
@@ -2469,7 +2467,7 @@
 </file>
 
 <file path=ppt/slideLayouts/slideLayout6.xml><?xml version="1.0" encoding="utf-8"?>
-<p:sldLayout xmlns:a="http://schemas.openxmlformats.org/drawingml/2006/main" xmlns:r="http://schemas.openxmlformats.org/officeDocument/2006/relationships" xmlns:mc="http://schemas.openxmlformats.org/markup-compatibility/2006" xmlns:mv="urn:schemas-microsoft-com:mac:vml" xmlns:p="http://schemas.openxmlformats.org/presentationml/2006/main" mc:Ignorable="mv" mc:PreserveAttributes="mv:*" type="titleOnly" preserve="1">
+<p:sldLayout xmlns:a="http://schemas.openxmlformats.org/drawingml/2006/main" xmlns:r="http://schemas.openxmlformats.org/officeDocument/2006/relationships" xmlns:p="http://schemas.openxmlformats.org/presentationml/2006/main" type="titleOnly" preserve="1">
   <p:cSld name="Title Only">
     <p:spTree>
       <p:nvGrpSpPr>
@@ -2526,7 +2524,7 @@
             <a:fld id="{9B2BCD74-F7F5-4BD6-83D7-1EBC56D75222}" type="datetimeFigureOut">
               <a:rPr lang="en-GB" smtClean="0"/>
               <a:pPr/>
-              <a:t>10/23/12</a:t>
+              <a:t>23/10/2012</a:t>
             </a:fld>
             <a:endParaRPr lang="en-GB"/>
           </a:p>
@@ -2584,7 +2582,7 @@
 </file>
 
 <file path=ppt/slideLayouts/slideLayout7.xml><?xml version="1.0" encoding="utf-8"?>
-<p:sldLayout xmlns:a="http://schemas.openxmlformats.org/drawingml/2006/main" xmlns:r="http://schemas.openxmlformats.org/officeDocument/2006/relationships" xmlns:mc="http://schemas.openxmlformats.org/markup-compatibility/2006" xmlns:mv="urn:schemas-microsoft-com:mac:vml" xmlns:p="http://schemas.openxmlformats.org/presentationml/2006/main" mc:Ignorable="mv" mc:PreserveAttributes="mv:*" type="blank" preserve="1">
+<p:sldLayout xmlns:a="http://schemas.openxmlformats.org/drawingml/2006/main" xmlns:r="http://schemas.openxmlformats.org/officeDocument/2006/relationships" xmlns:p="http://schemas.openxmlformats.org/presentationml/2006/main" type="blank" preserve="1">
   <p:cSld name="Blank">
     <p:spTree>
       <p:nvGrpSpPr>
@@ -2618,7 +2616,7 @@
             <a:fld id="{9B2BCD74-F7F5-4BD6-83D7-1EBC56D75222}" type="datetimeFigureOut">
               <a:rPr lang="en-GB" smtClean="0"/>
               <a:pPr/>
-              <a:t>10/23/12</a:t>
+              <a:t>23/10/2012</a:t>
             </a:fld>
             <a:endParaRPr lang="en-GB"/>
           </a:p>
@@ -2676,7 +2674,7 @@
 </file>
 
 <file path=ppt/slideLayouts/slideLayout8.xml><?xml version="1.0" encoding="utf-8"?>
-<p:sldLayout xmlns:a="http://schemas.openxmlformats.org/drawingml/2006/main" xmlns:r="http://schemas.openxmlformats.org/officeDocument/2006/relationships" xmlns:mc="http://schemas.openxmlformats.org/markup-compatibility/2006" xmlns:mv="urn:schemas-microsoft-com:mac:vml" xmlns:p="http://schemas.openxmlformats.org/presentationml/2006/main" mc:Ignorable="mv" mc:PreserveAttributes="mv:*" type="objTx" preserve="1">
+<p:sldLayout xmlns:a="http://schemas.openxmlformats.org/drawingml/2006/main" xmlns:r="http://schemas.openxmlformats.org/officeDocument/2006/relationships" xmlns:p="http://schemas.openxmlformats.org/presentationml/2006/main" type="objTx" preserve="1">
   <p:cSld name="Content with Caption">
     <p:spTree>
       <p:nvGrpSpPr>
@@ -2892,7 +2890,7 @@
             <a:fld id="{9B2BCD74-F7F5-4BD6-83D7-1EBC56D75222}" type="datetimeFigureOut">
               <a:rPr lang="en-GB" smtClean="0"/>
               <a:pPr/>
-              <a:t>10/23/12</a:t>
+              <a:t>23/10/2012</a:t>
             </a:fld>
             <a:endParaRPr lang="en-GB"/>
           </a:p>
@@ -2950,7 +2948,7 @@
 </file>
 
 <file path=ppt/slideLayouts/slideLayout9.xml><?xml version="1.0" encoding="utf-8"?>
-<p:sldLayout xmlns:a="http://schemas.openxmlformats.org/drawingml/2006/main" xmlns:r="http://schemas.openxmlformats.org/officeDocument/2006/relationships" xmlns:mc="http://schemas.openxmlformats.org/markup-compatibility/2006" xmlns:mv="urn:schemas-microsoft-com:mac:vml" xmlns:p="http://schemas.openxmlformats.org/presentationml/2006/main" mc:Ignorable="mv" mc:PreserveAttributes="mv:*" type="picTx" preserve="1">
+<p:sldLayout xmlns:a="http://schemas.openxmlformats.org/drawingml/2006/main" xmlns:r="http://schemas.openxmlformats.org/officeDocument/2006/relationships" xmlns:p="http://schemas.openxmlformats.org/presentationml/2006/main" type="picTx" preserve="1">
   <p:cSld name="Picture with Caption">
     <p:spTree>
       <p:nvGrpSpPr>
@@ -3142,7 +3140,7 @@
             <a:fld id="{9B2BCD74-F7F5-4BD6-83D7-1EBC56D75222}" type="datetimeFigureOut">
               <a:rPr lang="en-GB" smtClean="0"/>
               <a:pPr/>
-              <a:t>10/23/12</a:t>
+              <a:t>23/10/2012</a:t>
             </a:fld>
             <a:endParaRPr lang="en-GB"/>
           </a:p>
@@ -3200,7 +3198,7 @@
 </file>
 
 <file path=ppt/slideMasters/slideMaster1.xml><?xml version="1.0" encoding="utf-8"?>
-<p:sldMaster xmlns:a="http://schemas.openxmlformats.org/drawingml/2006/main" xmlns:r="http://schemas.openxmlformats.org/officeDocument/2006/relationships" xmlns:mc="http://schemas.openxmlformats.org/markup-compatibility/2006" xmlns:mv="urn:schemas-microsoft-com:mac:vml" xmlns:p="http://schemas.openxmlformats.org/presentationml/2006/main" mc:Ignorable="mv" mc:PreserveAttributes="mv:*">
+<p:sldMaster xmlns:a="http://schemas.openxmlformats.org/drawingml/2006/main" xmlns:r="http://schemas.openxmlformats.org/officeDocument/2006/relationships" xmlns:p="http://schemas.openxmlformats.org/presentationml/2006/main">
   <p:cSld>
     <p:bg>
       <p:bgPr>
@@ -3367,7 +3365,7 @@
             <a:fld id="{9B2BCD74-F7F5-4BD6-83D7-1EBC56D75222}" type="datetimeFigureOut">
               <a:rPr lang="en-GB" smtClean="0"/>
               <a:pPr/>
-              <a:t>10/23/12</a:t>
+              <a:t>23/10/2012</a:t>
             </a:fld>
             <a:endParaRPr lang="en-GB"/>
           </a:p>
@@ -3729,7 +3727,7 @@
 </file>
 
 <file path=ppt/slides/slide1.xml><?xml version="1.0" encoding="utf-8"?>
-<p:sld xmlns:a="http://schemas.openxmlformats.org/drawingml/2006/main" xmlns:r="http://schemas.openxmlformats.org/officeDocument/2006/relationships" xmlns:mc="http://schemas.openxmlformats.org/markup-compatibility/2006" xmlns:mv="urn:schemas-microsoft-com:mac:vml" xmlns:p="http://schemas.openxmlformats.org/presentationml/2006/main" mc:Ignorable="mv" mc:PreserveAttributes="mv:*">
+<p:sld xmlns:a="http://schemas.openxmlformats.org/drawingml/2006/main" xmlns:r="http://schemas.openxmlformats.org/officeDocument/2006/relationships" xmlns:p="http://schemas.openxmlformats.org/presentationml/2006/main">
   <p:cSld>
     <p:spTree>
       <p:nvGrpSpPr>
@@ -3816,7 +3814,7 @@
 </file>
 
 <file path=ppt/slides/slide10.xml><?xml version="1.0" encoding="utf-8"?>
-<p:sld xmlns:a="http://schemas.openxmlformats.org/drawingml/2006/main" xmlns:r="http://schemas.openxmlformats.org/officeDocument/2006/relationships" xmlns:mc="http://schemas.openxmlformats.org/markup-compatibility/2006" xmlns:mv="urn:schemas-microsoft-com:mac:vml" xmlns:p="http://schemas.openxmlformats.org/presentationml/2006/main" mc:Ignorable="mv" mc:PreserveAttributes="mv:*">
+<p:sld xmlns:a="http://schemas.openxmlformats.org/drawingml/2006/main" xmlns:r="http://schemas.openxmlformats.org/officeDocument/2006/relationships" xmlns:p="http://schemas.openxmlformats.org/presentationml/2006/main">
   <p:cSld>
     <p:spTree>
       <p:nvGrpSpPr>
@@ -3922,7 +3920,7 @@
         </p:nvSpPr>
         <p:spPr>
           <a:xfrm>
-            <a:off x="3563888" y="3573016"/>
+            <a:off x="3563888" y="3501008"/>
             <a:ext cx="1728192" cy="1080120"/>
           </a:xfrm>
           <a:prstGeom prst="roundRect">
@@ -4270,8 +4268,8 @@
           <p:nvPr/>
         </p:nvSpPr>
         <p:spPr>
-          <a:xfrm>
-            <a:off x="4716016" y="2564904"/>
+          <a:xfrm rot="19531843">
+            <a:off x="4904222" y="2734413"/>
             <a:ext cx="1584176" cy="144016"/>
           </a:xfrm>
           <a:prstGeom prst="rightArrow">
@@ -4325,7 +4323,7 @@
 </file>
 
 <file path=ppt/slides/slide11.xml><?xml version="1.0" encoding="utf-8"?>
-<p:sld xmlns:a="http://schemas.openxmlformats.org/drawingml/2006/main" xmlns:r="http://schemas.openxmlformats.org/officeDocument/2006/relationships" xmlns:mc="http://schemas.openxmlformats.org/markup-compatibility/2006" xmlns:mv="urn:schemas-microsoft-com:mac:vml" xmlns:p="http://schemas.openxmlformats.org/presentationml/2006/main" mc:Ignorable="mv" mc:PreserveAttributes="mv:*">
+<p:sld xmlns:a="http://schemas.openxmlformats.org/drawingml/2006/main" xmlns:r="http://schemas.openxmlformats.org/officeDocument/2006/relationships" xmlns:p="http://schemas.openxmlformats.org/presentationml/2006/main">
   <p:cSld>
     <p:spTree>
       <p:nvGrpSpPr>
@@ -4358,7 +4356,7 @@
           <a:p>
             <a:r>
               <a:rPr lang="en-GB" dirty="0" smtClean="0"/>
-              <a:t>Storage &amp; Reporting</a:t>
+              <a:t>Arch. Design: Periodic Tasks</a:t>
             </a:r>
             <a:endParaRPr lang="en-GB" dirty="0"/>
           </a:p>
@@ -4376,59 +4374,58 @@
         </p:nvSpPr>
         <p:spPr/>
         <p:txBody>
-          <a:bodyPr/>
-          <a:lstStyle/>
-          <a:p>
-            <a:r>
-              <a:rPr lang="en-GB" dirty="0" smtClean="0"/>
-              <a:t>Technologies:</a:t>
+          <a:bodyPr>
+            <a:normAutofit fontScale="92500" lnSpcReduction="20000"/>
+          </a:bodyPr>
+          <a:lstStyle/>
+          <a:p>
+            <a:r>
+              <a:rPr lang="en-GB" dirty="0"/>
+              <a:t>Each period run each Trend </a:t>
+            </a:r>
+            <a:r>
+              <a:rPr lang="en-GB" dirty="0" smtClean="0"/>
+              <a:t>Discovery, </a:t>
+            </a:r>
+            <a:r>
+              <a:rPr lang="en-GB" dirty="0"/>
+              <a:t>launching Search and Malware Scanning tasks as required.</a:t>
+            </a:r>
+          </a:p>
+          <a:p>
+            <a:r>
+              <a:rPr lang="en-GB" dirty="0"/>
+              <a:t>Also run a new set of Search and Malware Scanning tasks for each Trend Discovery task that has been run historically.</a:t>
+            </a:r>
+          </a:p>
+          <a:p>
+            <a:r>
+              <a:rPr lang="en-GB" dirty="0"/>
+              <a:t>So as to investigate malware incidence over time for each trend source</a:t>
             </a:r>
           </a:p>
           <a:p>
             <a:pPr lvl="1"/>
             <a:r>
-              <a:rPr lang="en-GB" dirty="0" smtClean="0"/>
-              <a:t>Django Web framework</a:t>
+              <a:rPr lang="en-GB" dirty="0"/>
+              <a:t>How long does it take on average for topics to be targeted by malware?</a:t>
             </a:r>
           </a:p>
           <a:p>
             <a:pPr lvl="1"/>
             <a:r>
-              <a:rPr lang="en-GB" dirty="0" smtClean="0"/>
-              <a:t>Bootstrap Frontend Framework</a:t>
+              <a:rPr lang="en-GB" dirty="0"/>
+              <a:t>How long before malware is removed?</a:t>
             </a:r>
           </a:p>
           <a:p>
             <a:pPr lvl="1"/>
             <a:r>
-              <a:rPr lang="en-GB" dirty="0" smtClean="0"/>
-              <a:t>jQuery, AngularJS, D3.js etc...</a:t>
-            </a:r>
-          </a:p>
-          <a:p>
-            <a:r>
-              <a:rPr lang="en-GB" dirty="0" smtClean="0"/>
-              <a:t>Used to:</a:t>
-            </a:r>
-          </a:p>
-          <a:p>
-            <a:pPr lvl="1"/>
-            <a:r>
-              <a:rPr lang="en-GB" dirty="0" smtClean="0"/>
-              <a:t>Control and display status of workers</a:t>
-            </a:r>
-          </a:p>
-          <a:p>
-            <a:pPr lvl="1"/>
-            <a:r>
-              <a:rPr lang="en-GB" dirty="0" smtClean="0"/>
-              <a:t>Display reports of malware data gathered</a:t>
-            </a:r>
-          </a:p>
-          <a:p>
-            <a:pPr>
-              <a:buNone/>
-            </a:pPr>
+              <a:rPr lang="en-GB" dirty="0"/>
+              <a:t>Which source gets the most malware?</a:t>
+            </a:r>
+          </a:p>
+          <a:p>
             <a:endParaRPr lang="en-GB" dirty="0"/>
           </a:p>
         </p:txBody>
@@ -4449,7 +4446,7 @@
 </file>
 
 <file path=ppt/slides/slide12.xml><?xml version="1.0" encoding="utf-8"?>
-<p:sld xmlns:a="http://schemas.openxmlformats.org/drawingml/2006/main" xmlns:r="http://schemas.openxmlformats.org/officeDocument/2006/relationships" xmlns:mc="http://schemas.openxmlformats.org/markup-compatibility/2006" xmlns:mv="urn:schemas-microsoft-com:mac:vml" xmlns:p="http://schemas.openxmlformats.org/presentationml/2006/main" mc:Ignorable="mv" mc:PreserveAttributes="mv:*">
+<p:sld xmlns:a="http://schemas.openxmlformats.org/drawingml/2006/main" xmlns:r="http://schemas.openxmlformats.org/officeDocument/2006/relationships" xmlns:p="http://schemas.openxmlformats.org/presentationml/2006/main">
   <p:cSld>
     <p:spTree>
       <p:nvGrpSpPr>
@@ -4482,7 +4479,7 @@
           <a:p>
             <a:r>
               <a:rPr lang="en-GB" dirty="0" smtClean="0"/>
-              <a:t>Malware Detection</a:t>
+              <a:t>Storage &amp; Reporting</a:t>
             </a:r>
             <a:endParaRPr lang="en-GB" dirty="0"/>
           </a:p>
@@ -4500,84 +4497,60 @@
         </p:nvSpPr>
         <p:spPr/>
         <p:txBody>
-          <a:bodyPr>
-            <a:normAutofit fontScale="92500" lnSpcReduction="20000"/>
-          </a:bodyPr>
-          <a:lstStyle/>
-          <a:p>
-            <a:r>
-              <a:rPr lang="en-GB" dirty="0"/>
-              <a:t>Two main methods for malware </a:t>
-            </a:r>
-            <a:r>
-              <a:rPr lang="en-GB" dirty="0" smtClean="0"/>
-              <a:t>detection:</a:t>
-            </a:r>
+          <a:bodyPr/>
+          <a:lstStyle/>
+          <a:p>
+            <a:r>
+              <a:rPr lang="en-GB" dirty="0" smtClean="0"/>
+              <a:t>Technologies:</a:t>
+            </a:r>
+          </a:p>
+          <a:p>
+            <a:pPr lvl="1"/>
+            <a:r>
+              <a:rPr lang="en-GB" dirty="0" smtClean="0"/>
+              <a:t>Django Web framework</a:t>
+            </a:r>
+          </a:p>
+          <a:p>
+            <a:pPr lvl="1"/>
+            <a:r>
+              <a:rPr lang="en-GB" dirty="0" smtClean="0"/>
+              <a:t>Bootstrap Frontend Framework</a:t>
+            </a:r>
+          </a:p>
+          <a:p>
+            <a:pPr lvl="1"/>
+            <a:r>
+              <a:rPr lang="en-GB" dirty="0" smtClean="0"/>
+              <a:t>jQuery, AngularJS, D3.js etc...</a:t>
+            </a:r>
+          </a:p>
+          <a:p>
+            <a:r>
+              <a:rPr lang="en-GB" dirty="0" smtClean="0"/>
+              <a:t>Used to:</a:t>
+            </a:r>
+          </a:p>
+          <a:p>
+            <a:pPr lvl="1"/>
+            <a:r>
+              <a:rPr lang="en-GB" dirty="0" smtClean="0"/>
+              <a:t>Control and display status of workers</a:t>
+            </a:r>
+          </a:p>
+          <a:p>
+            <a:pPr lvl="1"/>
+            <a:r>
+              <a:rPr lang="en-GB" dirty="0" smtClean="0"/>
+              <a:t>Display reports of malware data gathered</a:t>
+            </a:r>
+          </a:p>
+          <a:p>
+            <a:pPr>
+              <a:buNone/>
+            </a:pPr>
             <a:endParaRPr lang="en-GB" dirty="0"/>
-          </a:p>
-          <a:p>
-            <a:pPr lvl="1"/>
-            <a:r>
-              <a:rPr lang="en-GB" dirty="0"/>
-              <a:t>Passive malware detection</a:t>
-            </a:r>
-          </a:p>
-          <a:p>
-            <a:pPr lvl="1"/>
-            <a:r>
-              <a:rPr lang="en-GB" dirty="0"/>
-              <a:t>Active malware detection</a:t>
-            </a:r>
-          </a:p>
-          <a:p>
-            <a:r>
-              <a:rPr lang="en-GB" dirty="0"/>
-              <a:t>Passive </a:t>
-            </a:r>
-            <a:r>
-              <a:rPr lang="en-GB" dirty="0" smtClean="0"/>
-              <a:t>method:</a:t>
-            </a:r>
-          </a:p>
-          <a:p>
-            <a:pPr lvl="1"/>
-            <a:r>
-              <a:rPr lang="en-GB" dirty="0" smtClean="0"/>
-              <a:t>A </a:t>
-            </a:r>
-            <a:r>
-              <a:rPr lang="en-GB" dirty="0"/>
-              <a:t>malicious attacker injects a malicious code into a user’s PC.</a:t>
-            </a:r>
-          </a:p>
-          <a:p>
-            <a:r>
-              <a:rPr lang="en-GB" dirty="0"/>
-              <a:t>Active </a:t>
-            </a:r>
-            <a:r>
-              <a:rPr lang="en-GB" dirty="0" smtClean="0"/>
-              <a:t>method:</a:t>
-            </a:r>
-          </a:p>
-          <a:p>
-            <a:pPr lvl="1"/>
-            <a:r>
-              <a:rPr lang="en-GB" dirty="0" smtClean="0"/>
-              <a:t>The </a:t>
-            </a:r>
-            <a:r>
-              <a:rPr lang="en-GB" dirty="0"/>
-              <a:t>malicious code collection system attempt to connect to a particular </a:t>
-            </a:r>
-            <a:r>
-              <a:rPr lang="en-GB" dirty="0" smtClean="0"/>
-              <a:t>website </a:t>
-            </a:r>
-            <a:r>
-              <a:rPr lang="en-GB" dirty="0"/>
-              <a:t>and perform malicious action on the website in question. Called client honey pot.</a:t>
-            </a:r>
           </a:p>
         </p:txBody>
       </p:sp>
@@ -4597,7 +4570,7 @@
 </file>
 
 <file path=ppt/slides/slide13.xml><?xml version="1.0" encoding="utf-8"?>
-<p:sld xmlns:a="http://schemas.openxmlformats.org/drawingml/2006/main" xmlns:r="http://schemas.openxmlformats.org/officeDocument/2006/relationships" xmlns:mc="http://schemas.openxmlformats.org/markup-compatibility/2006" xmlns:mv="urn:schemas-microsoft-com:mac:vml" xmlns:p="http://schemas.openxmlformats.org/presentationml/2006/main" mc:Ignorable="mv" mc:PreserveAttributes="mv:*">
+<p:sld xmlns:a="http://schemas.openxmlformats.org/drawingml/2006/main" xmlns:r="http://schemas.openxmlformats.org/officeDocument/2006/relationships" xmlns:p="http://schemas.openxmlformats.org/presentationml/2006/main">
   <p:cSld>
     <p:spTree>
       <p:nvGrpSpPr>
@@ -4630,173 +4603,45 @@
           <a:p>
             <a:r>
               <a:rPr lang="en-GB" dirty="0" smtClean="0"/>
-              <a:t>Malware Detection</a:t>
+              <a:t>Physical Architecture</a:t>
             </a:r>
             <a:endParaRPr lang="en-GB" dirty="0"/>
           </a:p>
         </p:txBody>
       </p:sp>
-      <p:sp>
-        <p:nvSpPr>
-          <p:cNvPr id="3" name="Content Placeholder 2"/>
-          <p:cNvSpPr>
-            <a:spLocks noGrp="1"/>
-          </p:cNvSpPr>
+      <p:pic>
+        <p:nvPicPr>
+          <p:cNvPr id="4" name="Content Placeholder 3"/>
+          <p:cNvPicPr>
+            <a:picLocks noGrp="1" noChangeAspect="1"/>
+          </p:cNvPicPr>
           <p:nvPr>
             <p:ph idx="1"/>
           </p:nvPr>
-        </p:nvSpPr>
-        <p:spPr/>
-        <p:txBody>
-          <a:bodyPr>
-            <a:normAutofit fontScale="85000" lnSpcReduction="20000"/>
-          </a:bodyPr>
-          <a:lstStyle/>
-          <a:p>
-            <a:pPr marL="0" indent="0">
-              <a:buNone/>
-            </a:pPr>
-            <a:r>
-              <a:rPr lang="en-GB" dirty="0"/>
-              <a:t>The client honey pot or active method divided into two </a:t>
-            </a:r>
-            <a:r>
-              <a:rPr lang="en-GB" dirty="0" smtClean="0"/>
-              <a:t>groups:</a:t>
-            </a:r>
-          </a:p>
-          <a:p>
-            <a:r>
-              <a:rPr lang="en-GB" dirty="0" smtClean="0"/>
-              <a:t>Low </a:t>
-            </a:r>
-            <a:r>
-              <a:rPr lang="en-GB" dirty="0"/>
-              <a:t>interaction client honey </a:t>
-            </a:r>
-            <a:r>
-              <a:rPr lang="en-GB" dirty="0" smtClean="0"/>
-              <a:t>pot</a:t>
-            </a:r>
-          </a:p>
-          <a:p>
-            <a:pPr lvl="1"/>
-            <a:r>
-              <a:rPr lang="en-GB" dirty="0"/>
-              <a:t>Determined what is a malicious</a:t>
-            </a:r>
-            <a:r>
-              <a:rPr lang="en-GB" dirty="0" smtClean="0"/>
-              <a:t> webpage</a:t>
-            </a:r>
-          </a:p>
-          <a:p>
-            <a:pPr lvl="1"/>
-            <a:r>
-              <a:rPr lang="en-GB" dirty="0"/>
-              <a:t>The</a:t>
-            </a:r>
-            <a:r>
-              <a:rPr lang="en-GB" dirty="0" smtClean="0"/>
-              <a:t> </a:t>
-            </a:r>
-            <a:r>
-              <a:rPr lang="en-GB" dirty="0" smtClean="0"/>
-              <a:t>webpage </a:t>
-            </a:r>
-            <a:r>
-              <a:rPr lang="en-GB" dirty="0" smtClean="0"/>
-              <a:t>is </a:t>
-            </a:r>
-            <a:r>
-              <a:rPr lang="en-GB" dirty="0"/>
-              <a:t>not</a:t>
-            </a:r>
-            <a:r>
-              <a:rPr lang="en-GB" dirty="0" smtClean="0"/>
-              <a:t> </a:t>
-            </a:r>
-            <a:r>
-              <a:rPr lang="en-GB" dirty="0" smtClean="0"/>
-              <a:t>rendered and code is not executed</a:t>
-            </a:r>
-            <a:endParaRPr lang="en-GB" dirty="0" smtClean="0"/>
-          </a:p>
-          <a:p>
-            <a:pPr lvl="1"/>
-            <a:r>
-              <a:rPr lang="en-GB" dirty="0"/>
-              <a:t>The source code of target</a:t>
-            </a:r>
-            <a:r>
-              <a:rPr lang="en-GB" dirty="0" smtClean="0"/>
-              <a:t> </a:t>
-            </a:r>
-            <a:r>
-              <a:rPr lang="en-GB" dirty="0" smtClean="0"/>
-              <a:t>webpage is downloaded </a:t>
-            </a:r>
-            <a:endParaRPr lang="en-GB" dirty="0" smtClean="0"/>
-          </a:p>
-          <a:p>
-            <a:pPr lvl="1"/>
-            <a:r>
-              <a:rPr lang="en-GB" dirty="0" smtClean="0"/>
-              <a:t>Compare </a:t>
-            </a:r>
-            <a:r>
-              <a:rPr lang="en-GB" dirty="0"/>
-              <a:t>website source with the malicious action pattern of the system</a:t>
-            </a:r>
-            <a:endParaRPr lang="en-GB" dirty="0" smtClean="0"/>
-          </a:p>
-          <a:p>
-            <a:r>
-              <a:rPr lang="en-GB" dirty="0"/>
-              <a:t>High interaction client honey </a:t>
-            </a:r>
-            <a:r>
-              <a:rPr lang="en-GB" dirty="0" smtClean="0"/>
-              <a:t>pot</a:t>
-            </a:r>
-            <a:endParaRPr lang="en-GB" dirty="0" smtClean="0"/>
-          </a:p>
-          <a:p>
-            <a:pPr lvl="1"/>
-            <a:r>
-              <a:rPr lang="en-GB" dirty="0" smtClean="0"/>
-              <a:t>Render webpage using a web </a:t>
-            </a:r>
-            <a:r>
-              <a:rPr lang="en-GB" dirty="0"/>
-              <a:t>browser </a:t>
-            </a:r>
-          </a:p>
-          <a:p>
-            <a:pPr lvl="1"/>
-            <a:r>
-              <a:rPr lang="en-GB" dirty="0" smtClean="0"/>
-              <a:t>Analyse webpage </a:t>
-            </a:r>
-            <a:r>
-              <a:rPr lang="en-GB" dirty="0"/>
-              <a:t>by monitoring malicious behaviour</a:t>
-            </a:r>
-          </a:p>
-          <a:p>
-            <a:pPr lvl="1"/>
-            <a:r>
-              <a:rPr lang="en-GB" dirty="0"/>
-              <a:t>Monitor files, process creation, and registry modification</a:t>
-            </a:r>
-            <a:endParaRPr lang="en-GB" dirty="0" smtClean="0"/>
-          </a:p>
-        </p:txBody>
-      </p:sp>
+        </p:nvPicPr>
+        <p:blipFill>
+          <a:blip r:embed="rId2">
+            <a:extLst>
+              <a:ext uri="{28A0092B-C50C-407E-A947-70E740481C1C}">
+                <a14:useLocalDpi xmlns:a14="http://schemas.microsoft.com/office/drawing/2010/main" val="0"/>
+              </a:ext>
+            </a:extLst>
+          </a:blip>
+          <a:stretch>
+            <a:fillRect/>
+          </a:stretch>
+        </p:blipFill>
+        <p:spPr>
+          <a:xfrm>
+            <a:off x="1979712" y="1346841"/>
+            <a:ext cx="5184576" cy="5106495"/>
+          </a:xfrm>
+        </p:spPr>
+      </p:pic>
     </p:spTree>
     <p:extLst>
       <p:ext uri="{BB962C8B-B14F-4D97-AF65-F5344CB8AC3E}">
-        <p14:creationId xmlns:p14="http://schemas.microsoft.com/office/powerpoint/2010/main" xmlns:p="http://schemas.openxmlformats.org/presentationml/2006/main" xmlns:r="http://schemas.openxmlformats.org/officeDocument/2006/relationships" xmlns:a="http://schemas.openxmlformats.org/drawingml/2006/main" xmlns="" val="3521878626"/>
+        <p14:creationId xmlns:p14="http://schemas.microsoft.com/office/powerpoint/2010/main" val="3245773167"/>
       </p:ext>
     </p:extLst>
   </p:cSld>
@@ -4814,7 +4659,7 @@
 </file>
 
 <file path=ppt/slides/slide14.xml><?xml version="1.0" encoding="utf-8"?>
-<p:sld xmlns:a="http://schemas.openxmlformats.org/drawingml/2006/main" xmlns:r="http://schemas.openxmlformats.org/officeDocument/2006/relationships" xmlns:mc="http://schemas.openxmlformats.org/markup-compatibility/2006" xmlns:mv="urn:schemas-microsoft-com:mac:vml" xmlns:p="http://schemas.openxmlformats.org/presentationml/2006/main" mc:Ignorable="mv" mc:PreserveAttributes="mv:*">
+<p:sld xmlns:a="http://schemas.openxmlformats.org/drawingml/2006/main" xmlns:r="http://schemas.openxmlformats.org/officeDocument/2006/relationships" xmlns:p="http://schemas.openxmlformats.org/presentationml/2006/main">
   <p:cSld>
     <p:spTree>
       <p:nvGrpSpPr>
@@ -4866,7 +4711,155 @@
         <p:spPr/>
         <p:txBody>
           <a:bodyPr>
-            <a:normAutofit/>
+            <a:normAutofit fontScale="92500" lnSpcReduction="20000"/>
+          </a:bodyPr>
+          <a:lstStyle/>
+          <a:p>
+            <a:r>
+              <a:rPr lang="en-GB" dirty="0"/>
+              <a:t>Two main methods for malware </a:t>
+            </a:r>
+            <a:r>
+              <a:rPr lang="en-GB" dirty="0" smtClean="0"/>
+              <a:t>detection:</a:t>
+            </a:r>
+            <a:endParaRPr lang="en-GB" dirty="0"/>
+          </a:p>
+          <a:p>
+            <a:pPr lvl="1"/>
+            <a:r>
+              <a:rPr lang="en-GB" dirty="0"/>
+              <a:t>Passive malware detection</a:t>
+            </a:r>
+          </a:p>
+          <a:p>
+            <a:pPr lvl="1"/>
+            <a:r>
+              <a:rPr lang="en-GB" dirty="0"/>
+              <a:t>Active malware detection</a:t>
+            </a:r>
+          </a:p>
+          <a:p>
+            <a:r>
+              <a:rPr lang="en-GB" dirty="0"/>
+              <a:t>Passive </a:t>
+            </a:r>
+            <a:r>
+              <a:rPr lang="en-GB" dirty="0" smtClean="0"/>
+              <a:t>method:</a:t>
+            </a:r>
+          </a:p>
+          <a:p>
+            <a:pPr lvl="1"/>
+            <a:r>
+              <a:rPr lang="en-GB" dirty="0" smtClean="0"/>
+              <a:t>A </a:t>
+            </a:r>
+            <a:r>
+              <a:rPr lang="en-GB" dirty="0"/>
+              <a:t>malicious attacker injects a malicious code into a user’s PC.</a:t>
+            </a:r>
+          </a:p>
+          <a:p>
+            <a:r>
+              <a:rPr lang="en-GB" dirty="0"/>
+              <a:t>Active </a:t>
+            </a:r>
+            <a:r>
+              <a:rPr lang="en-GB" dirty="0" smtClean="0"/>
+              <a:t>method:</a:t>
+            </a:r>
+          </a:p>
+          <a:p>
+            <a:pPr lvl="1"/>
+            <a:r>
+              <a:rPr lang="en-GB" dirty="0" smtClean="0"/>
+              <a:t>The </a:t>
+            </a:r>
+            <a:r>
+              <a:rPr lang="en-GB" dirty="0"/>
+              <a:t>malicious code collection system attempt to connect to a particular </a:t>
+            </a:r>
+            <a:r>
+              <a:rPr lang="en-GB" dirty="0" smtClean="0"/>
+              <a:t>website </a:t>
+            </a:r>
+            <a:r>
+              <a:rPr lang="en-GB" dirty="0"/>
+              <a:t>and perform malicious action on the website in question. Called client honey pot.</a:t>
+            </a:r>
+          </a:p>
+        </p:txBody>
+      </p:sp>
+    </p:spTree>
+  </p:cSld>
+  <p:clrMapOvr>
+    <a:masterClrMapping/>
+  </p:clrMapOvr>
+  <p:timing>
+    <p:tnLst>
+      <p:par>
+        <p:cTn id="1" dur="indefinite" restart="never" nodeType="tmRoot"/>
+      </p:par>
+    </p:tnLst>
+  </p:timing>
+</p:sld>
+</file>
+
+<file path=ppt/slides/slide15.xml><?xml version="1.0" encoding="utf-8"?>
+<p:sld xmlns:a="http://schemas.openxmlformats.org/drawingml/2006/main" xmlns:r="http://schemas.openxmlformats.org/officeDocument/2006/relationships" xmlns:p="http://schemas.openxmlformats.org/presentationml/2006/main">
+  <p:cSld>
+    <p:spTree>
+      <p:nvGrpSpPr>
+        <p:cNvPr id="1" name=""/>
+        <p:cNvGrpSpPr/>
+        <p:nvPr/>
+      </p:nvGrpSpPr>
+      <p:grpSpPr>
+        <a:xfrm>
+          <a:off x="0" y="0"/>
+          <a:ext cx="0" cy="0"/>
+          <a:chOff x="0" y="0"/>
+          <a:chExt cx="0" cy="0"/>
+        </a:xfrm>
+      </p:grpSpPr>
+      <p:sp>
+        <p:nvSpPr>
+          <p:cNvPr id="2" name="Title 1"/>
+          <p:cNvSpPr>
+            <a:spLocks noGrp="1"/>
+          </p:cNvSpPr>
+          <p:nvPr>
+            <p:ph type="title"/>
+          </p:nvPr>
+        </p:nvSpPr>
+        <p:spPr/>
+        <p:txBody>
+          <a:bodyPr/>
+          <a:lstStyle/>
+          <a:p>
+            <a:r>
+              <a:rPr lang="en-GB" dirty="0" smtClean="0"/>
+              <a:t>Malware Detection</a:t>
+            </a:r>
+            <a:endParaRPr lang="en-GB" dirty="0"/>
+          </a:p>
+        </p:txBody>
+      </p:sp>
+      <p:sp>
+        <p:nvSpPr>
+          <p:cNvPr id="3" name="Content Placeholder 2"/>
+          <p:cNvSpPr>
+            <a:spLocks noGrp="1"/>
+          </p:cNvSpPr>
+          <p:nvPr>
+            <p:ph idx="1"/>
+          </p:nvPr>
+        </p:nvSpPr>
+        <p:spPr/>
+        <p:txBody>
+          <a:bodyPr>
+            <a:normAutofit fontScale="85000" lnSpcReduction="20000"/>
           </a:bodyPr>
           <a:lstStyle/>
           <a:p>
@@ -4875,60 +4868,32 @@
             </a:pPr>
             <a:r>
               <a:rPr lang="en-GB" dirty="0"/>
-              <a:t>There two possible solution for malware </a:t>
-            </a:r>
-            <a:r>
-              <a:rPr lang="en-GB" dirty="0" smtClean="0"/>
-              <a:t>detection:</a:t>
-            </a:r>
-          </a:p>
-          <a:p>
-            <a:r>
-              <a:rPr lang="en-GB" dirty="0" smtClean="0"/>
-              <a:t>Hybrid client honey pot</a:t>
-            </a:r>
-          </a:p>
-          <a:p>
-            <a:r>
-              <a:rPr lang="en-GB" dirty="0" smtClean="0"/>
-              <a:t>Studying </a:t>
-            </a:r>
-            <a:r>
-              <a:rPr lang="en-GB" dirty="0"/>
-              <a:t>structure of URLs </a:t>
-            </a:r>
-            <a:r>
-              <a:rPr lang="en-GB" dirty="0" smtClean="0"/>
-              <a:t>words</a:t>
+              <a:t>The client honey pot or active method divided into two </a:t>
+            </a:r>
+            <a:r>
+              <a:rPr lang="en-GB" dirty="0" smtClean="0"/>
+              <a:t>groups:</a:t>
+            </a:r>
+          </a:p>
+          <a:p>
+            <a:r>
+              <a:rPr lang="en-GB" dirty="0" smtClean="0"/>
+              <a:t>Low </a:t>
+            </a:r>
+            <a:r>
+              <a:rPr lang="en-GB" dirty="0"/>
+              <a:t>interaction client honey </a:t>
+            </a:r>
+            <a:r>
+              <a:rPr lang="en-GB" dirty="0" smtClean="0"/>
+              <a:t>pot</a:t>
             </a:r>
           </a:p>
           <a:p>
             <a:pPr lvl="1"/>
             <a:r>
               <a:rPr lang="en-GB" dirty="0"/>
-              <a:t>Studying the structure of URLs contains three steps:</a:t>
-            </a:r>
-          </a:p>
-          <a:p>
-            <a:pPr lvl="2"/>
-            <a:r>
-              <a:rPr lang="en-GB" dirty="0" smtClean="0"/>
-              <a:t>Identify </a:t>
-            </a:r>
-            <a:r>
-              <a:rPr lang="en-GB" dirty="0"/>
-              <a:t>suspicious </a:t>
-            </a:r>
-            <a:r>
-              <a:rPr lang="en-GB" dirty="0" smtClean="0"/>
-              <a:t>webpage</a:t>
-            </a:r>
-          </a:p>
-          <a:p>
-            <a:pPr lvl="2"/>
-            <a:r>
-              <a:rPr lang="en-GB" dirty="0"/>
-              <a:t>Derive lexical features for each suspicious</a:t>
+              <a:t>Determined what is a malicious</a:t>
             </a:r>
             <a:r>
               <a:rPr lang="en-GB" dirty="0" smtClean="0"/>
@@ -4936,18 +4901,93 @@
             </a:r>
           </a:p>
           <a:p>
-            <a:pPr lvl="2"/>
-            <a:r>
-              <a:rPr lang="en-GB" dirty="0"/>
-              <a:t>Perform group analysis to pick out suspicious cluster </a:t>
-            </a:r>
+            <a:pPr lvl="1"/>
+            <a:r>
+              <a:rPr lang="en-GB" dirty="0"/>
+              <a:t>The</a:t>
+            </a:r>
+            <a:r>
+              <a:rPr lang="en-GB" dirty="0" smtClean="0"/>
+              <a:t> webpage is </a:t>
+            </a:r>
+            <a:r>
+              <a:rPr lang="en-GB" dirty="0"/>
+              <a:t>not</a:t>
+            </a:r>
+            <a:r>
+              <a:rPr lang="en-GB" dirty="0" smtClean="0"/>
+              <a:t> rendered and code is not executed</a:t>
+            </a:r>
+          </a:p>
+          <a:p>
+            <a:pPr lvl="1"/>
+            <a:r>
+              <a:rPr lang="en-GB" dirty="0"/>
+              <a:t>The source code of target</a:t>
+            </a:r>
+            <a:r>
+              <a:rPr lang="en-GB" dirty="0" smtClean="0"/>
+              <a:t> webpage is downloaded </a:t>
+            </a:r>
+          </a:p>
+          <a:p>
+            <a:pPr lvl="1"/>
+            <a:r>
+              <a:rPr lang="en-GB" dirty="0" smtClean="0"/>
+              <a:t>Compare </a:t>
+            </a:r>
+            <a:r>
+              <a:rPr lang="en-GB" dirty="0"/>
+              <a:t>website source with the malicious action pattern of the system</a:t>
+            </a:r>
+            <a:endParaRPr lang="en-GB" dirty="0" smtClean="0"/>
+          </a:p>
+          <a:p>
+            <a:r>
+              <a:rPr lang="en-GB" dirty="0"/>
+              <a:t>High interaction client honey </a:t>
+            </a:r>
+            <a:r>
+              <a:rPr lang="en-GB" dirty="0" smtClean="0"/>
+              <a:t>pot</a:t>
+            </a:r>
+          </a:p>
+          <a:p>
+            <a:pPr lvl="1"/>
+            <a:r>
+              <a:rPr lang="en-GB" dirty="0" smtClean="0"/>
+              <a:t>Render webpage using a web </a:t>
+            </a:r>
+            <a:r>
+              <a:rPr lang="en-GB" dirty="0"/>
+              <a:t>browser </a:t>
+            </a:r>
+          </a:p>
+          <a:p>
+            <a:pPr lvl="1"/>
+            <a:r>
+              <a:rPr lang="en-GB" dirty="0" smtClean="0"/>
+              <a:t>Analyse webpage </a:t>
+            </a:r>
+            <a:r>
+              <a:rPr lang="en-GB" dirty="0"/>
+              <a:t>by monitoring malicious behaviour</a:t>
+            </a:r>
+          </a:p>
+          <a:p>
+            <a:pPr lvl="1"/>
+            <a:r>
+              <a:rPr lang="en-GB" dirty="0"/>
+              <a:t>Monitor files, process creation, and registry modification</a:t>
+            </a:r>
+            <a:endParaRPr lang="en-GB" dirty="0" smtClean="0"/>
           </a:p>
         </p:txBody>
       </p:sp>
     </p:spTree>
     <p:extLst>
       <p:ext uri="{BB962C8B-B14F-4D97-AF65-F5344CB8AC3E}">
-        <p14:creationId xmlns:p14="http://schemas.microsoft.com/office/powerpoint/2010/main" xmlns:p="http://schemas.openxmlformats.org/presentationml/2006/main" xmlns:r="http://schemas.openxmlformats.org/officeDocument/2006/relationships" xmlns:a="http://schemas.openxmlformats.org/drawingml/2006/main" xmlns="" val="514011514"/>
+        <p14:creationId xmlns:p14="http://schemas.microsoft.com/office/powerpoint/2010/main" val="3521878626"/>
       </p:ext>
     </p:extLst>
   </p:cSld>
@@ -4964,8 +5004,8 @@
 </p:sld>
 </file>
 
-<file path=ppt/slides/slide15.xml><?xml version="1.0" encoding="utf-8"?>
-<p:sld xmlns:a="http://schemas.openxmlformats.org/drawingml/2006/main" xmlns:r="http://schemas.openxmlformats.org/officeDocument/2006/relationships" xmlns:mc="http://schemas.openxmlformats.org/markup-compatibility/2006" xmlns:mv="urn:schemas-microsoft-com:mac:vml" xmlns:p="http://schemas.openxmlformats.org/presentationml/2006/main" mc:Ignorable="mv" mc:PreserveAttributes="mv:*">
+<file path=ppt/slides/slide16.xml><?xml version="1.0" encoding="utf-8"?>
+<p:sld xmlns:a="http://schemas.openxmlformats.org/drawingml/2006/main" xmlns:r="http://schemas.openxmlformats.org/officeDocument/2006/relationships" xmlns:p="http://schemas.openxmlformats.org/presentationml/2006/main">
   <p:cSld>
     <p:spTree>
       <p:nvGrpSpPr>
@@ -4998,6 +5038,157 @@
           <a:p>
             <a:r>
               <a:rPr lang="en-GB" dirty="0" smtClean="0"/>
+              <a:t>Malware Detection</a:t>
+            </a:r>
+            <a:endParaRPr lang="en-GB" dirty="0"/>
+          </a:p>
+        </p:txBody>
+      </p:sp>
+      <p:sp>
+        <p:nvSpPr>
+          <p:cNvPr id="3" name="Content Placeholder 2"/>
+          <p:cNvSpPr>
+            <a:spLocks noGrp="1"/>
+          </p:cNvSpPr>
+          <p:nvPr>
+            <p:ph idx="1"/>
+          </p:nvPr>
+        </p:nvSpPr>
+        <p:spPr/>
+        <p:txBody>
+          <a:bodyPr>
+            <a:normAutofit/>
+          </a:bodyPr>
+          <a:lstStyle/>
+          <a:p>
+            <a:pPr marL="0" indent="0">
+              <a:buNone/>
+            </a:pPr>
+            <a:r>
+              <a:rPr lang="en-GB" dirty="0"/>
+              <a:t>There two possible solution for malware </a:t>
+            </a:r>
+            <a:r>
+              <a:rPr lang="en-GB" dirty="0" smtClean="0"/>
+              <a:t>detection:</a:t>
+            </a:r>
+          </a:p>
+          <a:p>
+            <a:r>
+              <a:rPr lang="en-GB" dirty="0" smtClean="0"/>
+              <a:t>Hybrid client honey pot</a:t>
+            </a:r>
+          </a:p>
+          <a:p>
+            <a:r>
+              <a:rPr lang="en-GB" dirty="0" smtClean="0"/>
+              <a:t>Studying </a:t>
+            </a:r>
+            <a:r>
+              <a:rPr lang="en-GB" dirty="0"/>
+              <a:t>structure of URLs </a:t>
+            </a:r>
+            <a:r>
+              <a:rPr lang="en-GB" dirty="0" smtClean="0"/>
+              <a:t>words</a:t>
+            </a:r>
+          </a:p>
+          <a:p>
+            <a:pPr lvl="1"/>
+            <a:r>
+              <a:rPr lang="en-GB" dirty="0"/>
+              <a:t>Studying the structure of URLs contains three steps:</a:t>
+            </a:r>
+          </a:p>
+          <a:p>
+            <a:pPr lvl="2"/>
+            <a:r>
+              <a:rPr lang="en-GB" dirty="0" smtClean="0"/>
+              <a:t>Identify </a:t>
+            </a:r>
+            <a:r>
+              <a:rPr lang="en-GB" dirty="0"/>
+              <a:t>suspicious </a:t>
+            </a:r>
+            <a:r>
+              <a:rPr lang="en-GB" dirty="0" smtClean="0"/>
+              <a:t>webpage</a:t>
+            </a:r>
+          </a:p>
+          <a:p>
+            <a:pPr lvl="2"/>
+            <a:r>
+              <a:rPr lang="en-GB" dirty="0"/>
+              <a:t>Derive lexical features for each suspicious</a:t>
+            </a:r>
+            <a:r>
+              <a:rPr lang="en-GB" dirty="0" smtClean="0"/>
+              <a:t> webpage</a:t>
+            </a:r>
+          </a:p>
+          <a:p>
+            <a:pPr lvl="2"/>
+            <a:r>
+              <a:rPr lang="en-GB" dirty="0"/>
+              <a:t>Perform group analysis to pick out suspicious cluster </a:t>
+            </a:r>
+          </a:p>
+        </p:txBody>
+      </p:sp>
+    </p:spTree>
+    <p:extLst>
+      <p:ext uri="{BB962C8B-B14F-4D97-AF65-F5344CB8AC3E}">
+        <p14:creationId xmlns:p14="http://schemas.microsoft.com/office/powerpoint/2010/main" val="514011514"/>
+      </p:ext>
+    </p:extLst>
+  </p:cSld>
+  <p:clrMapOvr>
+    <a:masterClrMapping/>
+  </p:clrMapOvr>
+  <p:timing>
+    <p:tnLst>
+      <p:par>
+        <p:cTn id="1" dur="indefinite" restart="never" nodeType="tmRoot"/>
+      </p:par>
+    </p:tnLst>
+  </p:timing>
+</p:sld>
+</file>
+
+<file path=ppt/slides/slide17.xml><?xml version="1.0" encoding="utf-8"?>
+<p:sld xmlns:a="http://schemas.openxmlformats.org/drawingml/2006/main" xmlns:r="http://schemas.openxmlformats.org/officeDocument/2006/relationships" xmlns:p="http://schemas.openxmlformats.org/presentationml/2006/main">
+  <p:cSld>
+    <p:spTree>
+      <p:nvGrpSpPr>
+        <p:cNvPr id="1" name=""/>
+        <p:cNvGrpSpPr/>
+        <p:nvPr/>
+      </p:nvGrpSpPr>
+      <p:grpSpPr>
+        <a:xfrm>
+          <a:off x="0" y="0"/>
+          <a:ext cx="0" cy="0"/>
+          <a:chOff x="0" y="0"/>
+          <a:chExt cx="0" cy="0"/>
+        </a:xfrm>
+      </p:grpSpPr>
+      <p:sp>
+        <p:nvSpPr>
+          <p:cNvPr id="2" name="Title 1"/>
+          <p:cNvSpPr>
+            <a:spLocks noGrp="1"/>
+          </p:cNvSpPr>
+          <p:nvPr>
+            <p:ph type="title"/>
+          </p:nvPr>
+        </p:nvSpPr>
+        <p:spPr/>
+        <p:txBody>
+          <a:bodyPr/>
+          <a:lstStyle/>
+          <a:p>
+            <a:r>
+              <a:rPr lang="en-GB" dirty="0" smtClean="0"/>
               <a:t>Framework Demo</a:t>
             </a:r>
             <a:endParaRPr lang="en-GB" dirty="0"/>
@@ -5007,7 +5198,9 @@
       <p:pic>
         <p:nvPicPr>
           <p:cNvPr id="8" name="F1_BY9V8YTo?version=3&amp;hl=en_US&amp;rel=0"/>
-          <p:cNvPicPr/>
+          <p:cNvPicPr>
+            <a:picLocks noGrp="1"/>
+          </p:cNvPicPr>
           <p:nvPr>
             <p:ph idx="1"/>
             <a:videoFile r:link="rId1"/>
@@ -5117,8 +5310,8 @@
 </p:sld>
 </file>
 
-<file path=ppt/slides/slide16.xml><?xml version="1.0" encoding="utf-8"?>
-<p:sld xmlns:a="http://schemas.openxmlformats.org/drawingml/2006/main" xmlns:r="http://schemas.openxmlformats.org/officeDocument/2006/relationships" xmlns:mc="http://schemas.openxmlformats.org/markup-compatibility/2006" xmlns:mv="urn:schemas-microsoft-com:mac:vml" xmlns:p="http://schemas.openxmlformats.org/presentationml/2006/main" mc:Ignorable="mv" mc:PreserveAttributes="mv:*">
+<file path=ppt/slides/slide18.xml><?xml version="1.0" encoding="utf-8"?>
+<p:sld xmlns:a="http://schemas.openxmlformats.org/drawingml/2006/main" xmlns:r="http://schemas.openxmlformats.org/officeDocument/2006/relationships" xmlns:p="http://schemas.openxmlformats.org/presentationml/2006/main">
   <p:cSld>
     <p:spTree>
       <p:nvGrpSpPr>
@@ -5172,155 +5365,63 @@
           <a:bodyPr/>
           <a:lstStyle/>
           <a:p>
+            <a:r>
+              <a:rPr lang="en-GB" dirty="0" smtClean="0"/>
+              <a:t>Architectural Design</a:t>
+            </a:r>
+          </a:p>
+          <a:p>
+            <a:r>
+              <a:rPr lang="en-GB" dirty="0" smtClean="0"/>
+              <a:t>Literature Review</a:t>
+            </a:r>
+            <a:endParaRPr lang="en-GB" dirty="0" smtClean="0"/>
+          </a:p>
+          <a:p>
+            <a:r>
+              <a:rPr lang="en-GB" dirty="0" smtClean="0"/>
+              <a:t>Development within </a:t>
+            </a:r>
+            <a:r>
+              <a:rPr lang="en-GB" dirty="0" smtClean="0"/>
+              <a:t>Framework</a:t>
+            </a:r>
             <a:endParaRPr lang="en-GB" dirty="0"/>
           </a:p>
-        </p:txBody>
-      </p:sp>
-    </p:spTree>
-  </p:cSld>
-  <p:clrMapOvr>
-    <a:masterClrMapping/>
-  </p:clrMapOvr>
-  <p:timing>
-    <p:tnLst>
-      <p:par>
-        <p:cTn id="1" dur="indefinite" restart="never" nodeType="tmRoot"/>
-      </p:par>
-    </p:tnLst>
-  </p:timing>
-</p:sld>
-</file>
-
-<file path=ppt/slides/slide17.xml><?xml version="1.0" encoding="utf-8"?>
-<p:sld xmlns:a="http://schemas.openxmlformats.org/drawingml/2006/main" xmlns:r="http://schemas.openxmlformats.org/officeDocument/2006/relationships" xmlns:mc="http://schemas.openxmlformats.org/markup-compatibility/2006" xmlns:mv="urn:schemas-microsoft-com:mac:vml" xmlns:p="http://schemas.openxmlformats.org/presentationml/2006/main" mc:Ignorable="mv" mc:PreserveAttributes="mv:*">
-  <p:cSld>
-    <p:spTree>
-      <p:nvGrpSpPr>
-        <p:cNvPr id="1" name=""/>
-        <p:cNvGrpSpPr/>
-        <p:nvPr/>
-      </p:nvGrpSpPr>
-      <p:grpSpPr>
-        <a:xfrm>
-          <a:off x="0" y="0"/>
-          <a:ext cx="0" cy="0"/>
-          <a:chOff x="0" y="0"/>
-          <a:chExt cx="0" cy="0"/>
-        </a:xfrm>
-      </p:grpSpPr>
-      <p:sp>
-        <p:nvSpPr>
-          <p:cNvPr id="2" name="Title 1"/>
-          <p:cNvSpPr>
-            <a:spLocks noGrp="1"/>
-          </p:cNvSpPr>
-          <p:nvPr>
-            <p:ph type="title"/>
-          </p:nvPr>
-        </p:nvSpPr>
-        <p:spPr/>
-        <p:txBody>
-          <a:bodyPr/>
-          <a:lstStyle/>
-          <a:p>
-            <a:r>
-              <a:rPr lang="en-GB" dirty="0" smtClean="0"/>
-              <a:t>Remaining Work</a:t>
-            </a:r>
-            <a:endParaRPr lang="en-GB" dirty="0"/>
-          </a:p>
-        </p:txBody>
-      </p:sp>
-      <p:sp>
-        <p:nvSpPr>
-          <p:cNvPr id="3" name="Content Placeholder 2"/>
-          <p:cNvSpPr>
-            <a:spLocks noGrp="1"/>
-          </p:cNvSpPr>
-          <p:nvPr>
-            <p:ph idx="1"/>
-          </p:nvPr>
-        </p:nvSpPr>
-        <p:spPr/>
-        <p:txBody>
-          <a:bodyPr/>
-          <a:lstStyle/>
-          <a:p>
-            <a:endParaRPr lang="en-GB"/>
-          </a:p>
-        </p:txBody>
-      </p:sp>
-    </p:spTree>
-  </p:cSld>
-  <p:clrMapOvr>
-    <a:masterClrMapping/>
-  </p:clrMapOvr>
-  <p:timing>
-    <p:tnLst>
-      <p:par>
-        <p:cTn id="1" dur="indefinite" restart="never" nodeType="tmRoot"/>
-      </p:par>
-    </p:tnLst>
-  </p:timing>
-</p:sld>
-</file>
-
-<file path=ppt/slides/slide18.xml><?xml version="1.0" encoding="utf-8"?>
-<p:sld xmlns:a="http://schemas.openxmlformats.org/drawingml/2006/main" xmlns:r="http://schemas.openxmlformats.org/officeDocument/2006/relationships" xmlns:mc="http://schemas.openxmlformats.org/markup-compatibility/2006" xmlns:mv="urn:schemas-microsoft-com:mac:vml" xmlns:p="http://schemas.openxmlformats.org/presentationml/2006/main" mc:Ignorable="mv" mc:PreserveAttributes="mv:*">
-  <p:cSld>
-    <p:spTree>
-      <p:nvGrpSpPr>
-        <p:cNvPr id="1" name=""/>
-        <p:cNvGrpSpPr/>
-        <p:nvPr/>
-      </p:nvGrpSpPr>
-      <p:grpSpPr>
-        <a:xfrm>
-          <a:off x="0" y="0"/>
-          <a:ext cx="0" cy="0"/>
-          <a:chOff x="0" y="0"/>
-          <a:chExt cx="0" cy="0"/>
-        </a:xfrm>
-      </p:grpSpPr>
-      <p:sp>
-        <p:nvSpPr>
-          <p:cNvPr id="2" name="Title 1"/>
-          <p:cNvSpPr>
-            <a:spLocks noGrp="1"/>
-          </p:cNvSpPr>
-          <p:nvPr>
-            <p:ph type="ctrTitle"/>
-          </p:nvPr>
-        </p:nvSpPr>
-        <p:spPr/>
-        <p:txBody>
-          <a:bodyPr/>
-          <a:lstStyle/>
-          <a:p>
-            <a:r>
-              <a:rPr lang="en-GB" dirty="0" smtClean="0"/>
-              <a:t>Any Questions?</a:t>
-            </a:r>
-            <a:endParaRPr lang="en-GB" dirty="0"/>
-          </a:p>
-        </p:txBody>
-      </p:sp>
-      <p:sp>
-        <p:nvSpPr>
-          <p:cNvPr id="3" name="Subtitle 2"/>
-          <p:cNvSpPr>
-            <a:spLocks noGrp="1"/>
-          </p:cNvSpPr>
-          <p:nvPr>
-            <p:ph type="subTitle" idx="1"/>
-          </p:nvPr>
-        </p:nvSpPr>
-        <p:spPr/>
-        <p:txBody>
-          <a:bodyPr/>
-          <a:lstStyle/>
-          <a:p>
-            <a:endParaRPr lang="en-GB"/>
+          <a:p>
+            <a:pPr lvl="1"/>
+            <a:r>
+              <a:rPr lang="en-GB" dirty="0" smtClean="0"/>
+              <a:t>Twitter, The Sun, and  RSS Trend sources</a:t>
+            </a:r>
+          </a:p>
+          <a:p>
+            <a:pPr lvl="1"/>
+            <a:r>
+              <a:rPr lang="en-GB" dirty="0" smtClean="0"/>
+              <a:t>Dogpile.co.uk search engine script</a:t>
+            </a:r>
+          </a:p>
+          <a:p>
+            <a:pPr lvl="1"/>
+            <a:r>
+              <a:rPr lang="en-GB" dirty="0" smtClean="0"/>
+              <a:t>Placeholder malware scanner</a:t>
+            </a:r>
+          </a:p>
+          <a:p>
+            <a:pPr lvl="1"/>
+            <a:r>
+              <a:rPr lang="en-GB" dirty="0" smtClean="0"/>
+              <a:t>Work on active malware detection</a:t>
+            </a:r>
+          </a:p>
+          <a:p>
+            <a:pPr lvl="1"/>
+            <a:r>
+              <a:rPr lang="en-GB" dirty="0" smtClean="0"/>
+              <a:t>Data Model</a:t>
+            </a:r>
           </a:p>
         </p:txBody>
       </p:sp>
@@ -5340,7 +5441,7 @@
 </file>
 
 <file path=ppt/slides/slide19.xml><?xml version="1.0" encoding="utf-8"?>
-<p:sld xmlns:a="http://schemas.openxmlformats.org/drawingml/2006/main" xmlns:r="http://schemas.openxmlformats.org/officeDocument/2006/relationships" xmlns:mc="http://schemas.openxmlformats.org/markup-compatibility/2006" xmlns:mv="urn:schemas-microsoft-com:mac:vml" xmlns:p="http://schemas.openxmlformats.org/presentationml/2006/main" mc:Ignorable="mv" mc:PreserveAttributes="mv:*">
+<p:sld xmlns:a="http://schemas.openxmlformats.org/drawingml/2006/main" xmlns:r="http://schemas.openxmlformats.org/officeDocument/2006/relationships" xmlns:p="http://schemas.openxmlformats.org/presentationml/2006/main">
   <p:cSld>
     <p:spTree>
       <p:nvGrpSpPr>
@@ -5373,7 +5474,7 @@
           <a:p>
             <a:r>
               <a:rPr lang="en-GB" dirty="0" smtClean="0"/>
-              <a:t>References</a:t>
+              <a:t>Remaining Work</a:t>
             </a:r>
             <a:endParaRPr lang="en-GB" dirty="0"/>
           </a:p>
@@ -5394,29 +5495,43 @@
           <a:bodyPr/>
           <a:lstStyle/>
           <a:p>
-            <a:pPr marL="971550" lvl="1" indent="-514350">
-              <a:buFont typeface="+mj-lt"/>
-              <a:buAutoNum type="arabicPeriod"/>
-            </a:pPr>
-            <a:r>
-              <a:rPr lang="en-GB" dirty="0">
-                <a:hlinkClick r:id="rId2"/>
-              </a:rPr>
-              <a:t>http://</a:t>
-            </a:r>
-            <a:r>
-              <a:rPr lang="en-GB" dirty="0" smtClean="0">
-                <a:hlinkClick r:id="rId2"/>
-              </a:rPr>
-              <a:t>www.mcafee.com/us/about/news/2012/q3/20120910-01.aspx?cid=110907</a:t>
+            <a:r>
+              <a:rPr lang="en-GB" dirty="0" smtClean="0"/>
+              <a:t>Web Reporting interface</a:t>
+            </a:r>
+          </a:p>
+          <a:p>
+            <a:pPr lvl="1"/>
+            <a:r>
+              <a:rPr lang="en-GB" dirty="0" smtClean="0"/>
+              <a:t>Graphing</a:t>
+            </a:r>
+          </a:p>
+          <a:p>
+            <a:pPr lvl="1"/>
+            <a:r>
+              <a:rPr lang="en-GB" dirty="0" smtClean="0"/>
+              <a:t>Malware analysis result storage</a:t>
+            </a:r>
+          </a:p>
+          <a:p>
+            <a:r>
+              <a:rPr lang="en-GB" dirty="0" smtClean="0"/>
+              <a:t>Complete active malware detection</a:t>
+            </a:r>
+          </a:p>
+          <a:p>
+            <a:r>
+              <a:rPr lang="en-GB" dirty="0" smtClean="0"/>
+              <a:t>Add passive malware detection</a:t>
             </a:r>
             <a:endParaRPr lang="en-GB" dirty="0" smtClean="0"/>
           </a:p>
           <a:p>
-            <a:pPr marL="971550" lvl="1" indent="-514350">
-              <a:buFont typeface="+mj-lt"/>
-              <a:buAutoNum type="arabicPeriod"/>
-            </a:pPr>
+            <a:r>
+              <a:rPr lang="en-GB" dirty="0" smtClean="0"/>
+              <a:t>Collect Data</a:t>
+            </a:r>
             <a:endParaRPr lang="en-GB" dirty="0"/>
           </a:p>
         </p:txBody>
@@ -5437,7 +5552,7 @@
 </file>
 
 <file path=ppt/slides/slide2.xml><?xml version="1.0" encoding="utf-8"?>
-<p:sld xmlns:a="http://schemas.openxmlformats.org/drawingml/2006/main" xmlns:r="http://schemas.openxmlformats.org/officeDocument/2006/relationships" xmlns:mc="http://schemas.openxmlformats.org/markup-compatibility/2006" xmlns:mv="urn:schemas-microsoft-com:mac:vml" xmlns:p="http://schemas.openxmlformats.org/presentationml/2006/main" mc:Ignorable="mv" mc:PreserveAttributes="mv:*">
+<p:sld xmlns:a="http://schemas.openxmlformats.org/drawingml/2006/main" xmlns:r="http://schemas.openxmlformats.org/officeDocument/2006/relationships" xmlns:p="http://schemas.openxmlformats.org/presentationml/2006/main">
   <p:cSld>
     <p:spTree>
       <p:nvGrpSpPr>
@@ -5543,6 +5658,177 @@
               <a:rPr lang="en-GB" dirty="0" smtClean="0"/>
               <a:t>Build Distributed Framework</a:t>
             </a:r>
+          </a:p>
+        </p:txBody>
+      </p:sp>
+    </p:spTree>
+  </p:cSld>
+  <p:clrMapOvr>
+    <a:masterClrMapping/>
+  </p:clrMapOvr>
+  <p:timing>
+    <p:tnLst>
+      <p:par>
+        <p:cTn id="1" dur="indefinite" restart="never" nodeType="tmRoot"/>
+      </p:par>
+    </p:tnLst>
+  </p:timing>
+</p:sld>
+</file>
+
+<file path=ppt/slides/slide20.xml><?xml version="1.0" encoding="utf-8"?>
+<p:sld xmlns:a="http://schemas.openxmlformats.org/drawingml/2006/main" xmlns:r="http://schemas.openxmlformats.org/officeDocument/2006/relationships" xmlns:p="http://schemas.openxmlformats.org/presentationml/2006/main">
+  <p:cSld>
+    <p:spTree>
+      <p:nvGrpSpPr>
+        <p:cNvPr id="1" name=""/>
+        <p:cNvGrpSpPr/>
+        <p:nvPr/>
+      </p:nvGrpSpPr>
+      <p:grpSpPr>
+        <a:xfrm>
+          <a:off x="0" y="0"/>
+          <a:ext cx="0" cy="0"/>
+          <a:chOff x="0" y="0"/>
+          <a:chExt cx="0" cy="0"/>
+        </a:xfrm>
+      </p:grpSpPr>
+      <p:sp>
+        <p:nvSpPr>
+          <p:cNvPr id="2" name="Title 1"/>
+          <p:cNvSpPr>
+            <a:spLocks noGrp="1"/>
+          </p:cNvSpPr>
+          <p:nvPr>
+            <p:ph type="ctrTitle"/>
+          </p:nvPr>
+        </p:nvSpPr>
+        <p:spPr/>
+        <p:txBody>
+          <a:bodyPr/>
+          <a:lstStyle/>
+          <a:p>
+            <a:r>
+              <a:rPr lang="en-GB" dirty="0" smtClean="0"/>
+              <a:t>Any Questions?</a:t>
+            </a:r>
+            <a:endParaRPr lang="en-GB" dirty="0"/>
+          </a:p>
+        </p:txBody>
+      </p:sp>
+      <p:sp>
+        <p:nvSpPr>
+          <p:cNvPr id="3" name="Subtitle 2"/>
+          <p:cNvSpPr>
+            <a:spLocks noGrp="1"/>
+          </p:cNvSpPr>
+          <p:nvPr>
+            <p:ph type="subTitle" idx="1"/>
+          </p:nvPr>
+        </p:nvSpPr>
+        <p:spPr/>
+        <p:txBody>
+          <a:bodyPr/>
+          <a:lstStyle/>
+          <a:p>
+            <a:endParaRPr lang="en-GB"/>
+          </a:p>
+        </p:txBody>
+      </p:sp>
+    </p:spTree>
+  </p:cSld>
+  <p:clrMapOvr>
+    <a:masterClrMapping/>
+  </p:clrMapOvr>
+  <p:timing>
+    <p:tnLst>
+      <p:par>
+        <p:cTn id="1" dur="indefinite" restart="never" nodeType="tmRoot"/>
+      </p:par>
+    </p:tnLst>
+  </p:timing>
+</p:sld>
+</file>
+
+<file path=ppt/slides/slide21.xml><?xml version="1.0" encoding="utf-8"?>
+<p:sld xmlns:a="http://schemas.openxmlformats.org/drawingml/2006/main" xmlns:r="http://schemas.openxmlformats.org/officeDocument/2006/relationships" xmlns:p="http://schemas.openxmlformats.org/presentationml/2006/main">
+  <p:cSld>
+    <p:spTree>
+      <p:nvGrpSpPr>
+        <p:cNvPr id="1" name=""/>
+        <p:cNvGrpSpPr/>
+        <p:nvPr/>
+      </p:nvGrpSpPr>
+      <p:grpSpPr>
+        <a:xfrm>
+          <a:off x="0" y="0"/>
+          <a:ext cx="0" cy="0"/>
+          <a:chOff x="0" y="0"/>
+          <a:chExt cx="0" cy="0"/>
+        </a:xfrm>
+      </p:grpSpPr>
+      <p:sp>
+        <p:nvSpPr>
+          <p:cNvPr id="2" name="Title 1"/>
+          <p:cNvSpPr>
+            <a:spLocks noGrp="1"/>
+          </p:cNvSpPr>
+          <p:nvPr>
+            <p:ph type="title"/>
+          </p:nvPr>
+        </p:nvSpPr>
+        <p:spPr/>
+        <p:txBody>
+          <a:bodyPr/>
+          <a:lstStyle/>
+          <a:p>
+            <a:r>
+              <a:rPr lang="en-GB" dirty="0" smtClean="0"/>
+              <a:t>References</a:t>
+            </a:r>
+            <a:endParaRPr lang="en-GB" dirty="0"/>
+          </a:p>
+        </p:txBody>
+      </p:sp>
+      <p:sp>
+        <p:nvSpPr>
+          <p:cNvPr id="3" name="Content Placeholder 2"/>
+          <p:cNvSpPr>
+            <a:spLocks noGrp="1"/>
+          </p:cNvSpPr>
+          <p:nvPr>
+            <p:ph idx="1"/>
+          </p:nvPr>
+        </p:nvSpPr>
+        <p:spPr/>
+        <p:txBody>
+          <a:bodyPr/>
+          <a:lstStyle/>
+          <a:p>
+            <a:pPr marL="971550" lvl="1" indent="-514350">
+              <a:buFont typeface="+mj-lt"/>
+              <a:buAutoNum type="arabicPeriod"/>
+            </a:pPr>
+            <a:r>
+              <a:rPr lang="en-GB" dirty="0">
+                <a:hlinkClick r:id="rId2"/>
+              </a:rPr>
+              <a:t>http://</a:t>
+            </a:r>
+            <a:r>
+              <a:rPr lang="en-GB" dirty="0" smtClean="0">
+                <a:hlinkClick r:id="rId2"/>
+              </a:rPr>
+              <a:t>www.mcafee.com/us/about/news/2012/q3/20120910-01.aspx?cid=110907</a:t>
+            </a:r>
+            <a:endParaRPr lang="en-GB" dirty="0" smtClean="0"/>
+          </a:p>
+          <a:p>
+            <a:pPr marL="971550" lvl="1" indent="-514350">
+              <a:buFont typeface="+mj-lt"/>
+              <a:buAutoNum type="arabicPeriod"/>
+            </a:pPr>
+            <a:endParaRPr lang="en-GB" dirty="0"/>
           </a:p>
         </p:txBody>
       </p:sp>
@@ -5562,7 +5848,7 @@
 </file>
 
 <file path=ppt/slides/slide3.xml><?xml version="1.0" encoding="utf-8"?>
-<p:sld xmlns:a="http://schemas.openxmlformats.org/drawingml/2006/main" xmlns:r="http://schemas.openxmlformats.org/officeDocument/2006/relationships" xmlns:mc="http://schemas.openxmlformats.org/markup-compatibility/2006" xmlns:mv="urn:schemas-microsoft-com:mac:vml" xmlns:p="http://schemas.openxmlformats.org/presentationml/2006/main" mc:Ignorable="mv" mc:PreserveAttributes="mv:*">
+<p:sld xmlns:a="http://schemas.openxmlformats.org/drawingml/2006/main" xmlns:r="http://schemas.openxmlformats.org/officeDocument/2006/relationships" xmlns:p="http://schemas.openxmlformats.org/presentationml/2006/main">
   <p:cSld>
     <p:spTree>
       <p:nvGrpSpPr>
@@ -5623,89 +5909,87 @@
           <a:lstStyle/>
           <a:p>
             <a:r>
-              <a:rPr lang="en-GB" dirty="0" smtClean="0"/>
-              <a:t>SEO: Search Engine Optimization techniques</a:t>
-            </a:r>
+              <a:rPr lang="en-GB" dirty="0"/>
+              <a:t>First systematic study of search-result poisoning attacks and detection.</a:t>
+            </a:r>
+          </a:p>
+          <a:p>
+            <a:endParaRPr lang="en-GB" dirty="0"/>
+          </a:p>
+          <a:p>
+            <a:r>
+              <a:rPr lang="en-GB" dirty="0"/>
+              <a:t>SEO: Search Engine Optimization </a:t>
+            </a:r>
+            <a:r>
+              <a:rPr lang="en-GB" dirty="0" smtClean="0"/>
+              <a:t>techniques</a:t>
+            </a:r>
+            <a:endParaRPr lang="en-GB" dirty="0"/>
           </a:p>
           <a:p>
             <a:pPr lvl="1"/>
             <a:r>
-              <a:rPr lang="en-GB" dirty="0" smtClean="0"/>
+              <a:rPr lang="en-GB" dirty="0"/>
               <a:t>Optimization of page rank / Search-result poisoning</a:t>
             </a:r>
           </a:p>
           <a:p>
             <a:pPr lvl="1"/>
             <a:r>
-              <a:rPr lang="en-GB" dirty="0" smtClean="0"/>
+              <a:rPr lang="en-GB" dirty="0"/>
               <a:t>Cloaking techniques from attacker</a:t>
             </a:r>
           </a:p>
           <a:p>
             <a:pPr lvl="1"/>
             <a:r>
-              <a:rPr lang="en-GB" dirty="0" smtClean="0"/>
+              <a:rPr lang="en-GB" dirty="0"/>
               <a:t>Classified into White-hat and Black-hat</a:t>
             </a:r>
           </a:p>
           <a:p>
-            <a:r>
-              <a:rPr lang="en-GB" dirty="0" smtClean="0"/>
-              <a:t>Why SEO attack is successful:</a:t>
-            </a:r>
+            <a:endParaRPr lang="en-GB" dirty="0"/>
+          </a:p>
+          <a:p>
+            <a:r>
+              <a:rPr lang="en-GB" dirty="0" smtClean="0"/>
+              <a:t>Components of an SEO attack:</a:t>
+            </a:r>
+            <a:endParaRPr lang="en-GB" dirty="0"/>
           </a:p>
           <a:p>
             <a:pPr lvl="1"/>
             <a:r>
               <a:rPr lang="en-GB" dirty="0" smtClean="0"/>
-              <a:t>Generation of relevant content</a:t>
+              <a:t>Automated generation </a:t>
+            </a:r>
+            <a:r>
+              <a:rPr lang="en-GB" dirty="0"/>
+              <a:t>of </a:t>
+            </a:r>
+            <a:r>
+              <a:rPr lang="en-GB" dirty="0" smtClean="0"/>
+              <a:t>“relevant” </a:t>
+            </a:r>
+            <a:r>
+              <a:rPr lang="en-GB" dirty="0"/>
+              <a:t>content</a:t>
             </a:r>
           </a:p>
           <a:p>
             <a:pPr lvl="1"/>
             <a:r>
-              <a:rPr lang="en-GB" dirty="0" smtClean="0"/>
+              <a:rPr lang="en-GB" dirty="0"/>
               <a:t>Targeting multiple trending keywords</a:t>
             </a:r>
           </a:p>
           <a:p>
             <a:pPr lvl="1"/>
             <a:r>
-              <a:rPr lang="en-GB" dirty="0" smtClean="0"/>
+              <a:rPr lang="en-GB" dirty="0"/>
               <a:t>Creating dense link structures to increase page rank</a:t>
             </a:r>
-          </a:p>
-          <a:p>
-            <a:r>
-              <a:rPr lang="en-GB" dirty="0" err="1" smtClean="0"/>
-              <a:t>deSEO</a:t>
-            </a:r>
-            <a:r>
-              <a:rPr lang="en-GB" dirty="0" smtClean="0"/>
-              <a:t>: automatically detects SEO attacks and campaigns</a:t>
-            </a:r>
-          </a:p>
-          <a:p>
-            <a:pPr lvl="1"/>
-            <a:r>
-              <a:rPr lang="en-GB" dirty="0" smtClean="0"/>
-              <a:t>History-based detection</a:t>
-            </a:r>
-          </a:p>
-          <a:p>
-            <a:pPr lvl="1"/>
-            <a:r>
-              <a:rPr lang="en-GB" dirty="0" smtClean="0"/>
-              <a:t>Clustering of suspicious domains</a:t>
-            </a:r>
-          </a:p>
-          <a:p>
-            <a:pPr lvl="1"/>
-            <a:r>
-              <a:rPr lang="en-GB" dirty="0" smtClean="0"/>
-              <a:t>Group analysis</a:t>
-            </a:r>
-            <a:endParaRPr lang="en-GB" dirty="0"/>
           </a:p>
         </p:txBody>
       </p:sp>
@@ -5725,7 +6009,7 @@
 </file>
 
 <file path=ppt/slides/slide4.xml><?xml version="1.0" encoding="utf-8"?>
-<p:sld xmlns:a="http://schemas.openxmlformats.org/drawingml/2006/main" xmlns:r="http://schemas.openxmlformats.org/officeDocument/2006/relationships" xmlns:mc="http://schemas.openxmlformats.org/markup-compatibility/2006" xmlns:mv="urn:schemas-microsoft-com:mac:vml" xmlns:p="http://schemas.openxmlformats.org/presentationml/2006/main" mc:Ignorable="mv" mc:PreserveAttributes="mv:*">
+<p:sld xmlns:a="http://schemas.openxmlformats.org/drawingml/2006/main" xmlns:r="http://schemas.openxmlformats.org/officeDocument/2006/relationships" xmlns:p="http://schemas.openxmlformats.org/presentationml/2006/main">
   <p:cSld>
     <p:spTree>
       <p:nvGrpSpPr>
@@ -5753,131 +6037,99 @@
         </p:nvSpPr>
         <p:spPr/>
         <p:txBody>
+          <a:bodyPr/>
+          <a:lstStyle/>
+          <a:p>
+            <a:r>
+              <a:rPr lang="en-GB" dirty="0"/>
+              <a:t>Literature Review: </a:t>
+            </a:r>
+            <a:r>
+              <a:rPr lang="en-GB" dirty="0" err="1"/>
+              <a:t>deSEO</a:t>
+            </a:r>
+            <a:endParaRPr lang="en-GB" dirty="0"/>
+          </a:p>
+        </p:txBody>
+      </p:sp>
+      <p:sp>
+        <p:nvSpPr>
+          <p:cNvPr id="3" name="Content Placeholder 2"/>
+          <p:cNvSpPr>
+            <a:spLocks noGrp="1"/>
+          </p:cNvSpPr>
+          <p:nvPr>
+            <p:ph idx="1"/>
+          </p:nvPr>
+        </p:nvSpPr>
+        <p:spPr/>
+        <p:txBody>
           <a:bodyPr>
-            <a:normAutofit fontScale="90000"/>
+            <a:normAutofit fontScale="92500" lnSpcReduction="10000"/>
           </a:bodyPr>
           <a:lstStyle/>
           <a:p>
             <a:r>
-              <a:rPr lang="en-GB" dirty="0" smtClean="0"/>
-              <a:t>Lit. Review: </a:t>
-            </a:r>
-            <a:r>
-              <a:rPr lang="en-GB" dirty="0"/>
-              <a:t>Automatic Malware Collecting System</a:t>
-            </a:r>
-          </a:p>
-        </p:txBody>
-      </p:sp>
-      <p:sp>
-        <p:nvSpPr>
-          <p:cNvPr id="3" name="Content Placeholder 2"/>
-          <p:cNvSpPr>
-            <a:spLocks noGrp="1"/>
-          </p:cNvSpPr>
-          <p:nvPr>
-            <p:ph idx="1"/>
-          </p:nvPr>
-        </p:nvSpPr>
-        <p:spPr/>
-        <p:txBody>
-          <a:bodyPr>
-            <a:normAutofit fontScale="85000" lnSpcReduction="10000"/>
-          </a:bodyPr>
-          <a:lstStyle/>
-          <a:p>
-            <a:r>
-              <a:rPr lang="en-GB" dirty="0"/>
-              <a:t>Malicious code collection approaches:</a:t>
+              <a:rPr lang="en-GB" dirty="0" err="1"/>
+              <a:t>deSEO</a:t>
+            </a:r>
+            <a:r>
+              <a:rPr lang="en-GB" dirty="0"/>
+              <a:t>: automatically detect SEO attacks and campaigns</a:t>
             </a:r>
           </a:p>
           <a:p>
             <a:pPr lvl="1"/>
             <a:r>
               <a:rPr lang="en-GB" dirty="0"/>
-              <a:t>Passive method</a:t>
+              <a:t>History-based detection</a:t>
             </a:r>
           </a:p>
           <a:p>
             <a:pPr lvl="1"/>
             <a:r>
               <a:rPr lang="en-GB" dirty="0"/>
-              <a:t>Active method: Low interaction &amp; High interaction</a:t>
-            </a:r>
-          </a:p>
-          <a:p>
-            <a:r>
-              <a:rPr lang="en-GB" dirty="0"/>
-              <a:t>The automatic malicious code collecting system:</a:t>
+              <a:t>Clustering of suspicious domains</a:t>
             </a:r>
           </a:p>
           <a:p>
             <a:pPr lvl="1"/>
             <a:r>
               <a:rPr lang="en-GB" dirty="0"/>
-              <a:t>Active Hybrid Method</a:t>
+              <a:t>Group analysis</a:t>
+            </a:r>
+          </a:p>
+          <a:p>
+            <a:endParaRPr lang="en-GB" dirty="0"/>
+          </a:p>
+          <a:p>
+            <a:r>
+              <a:rPr lang="en-GB" dirty="0"/>
+              <a:t>Result:</a:t>
             </a:r>
           </a:p>
           <a:p>
             <a:pPr lvl="1"/>
             <a:r>
               <a:rPr lang="en-GB" dirty="0"/>
-              <a:t>Collect search keywords</a:t>
+              <a:t>More than 300 billion URLs dataset</a:t>
             </a:r>
           </a:p>
           <a:p>
             <a:pPr lvl="1"/>
             <a:r>
               <a:rPr lang="en-GB" dirty="0"/>
-              <a:t>Filter search results by reviewing URL components </a:t>
-            </a:r>
-            <a:r>
-              <a:rPr lang="en-GB" dirty="0" smtClean="0"/>
-              <a:t>(Passive)</a:t>
-            </a:r>
-            <a:endParaRPr lang="en-GB" dirty="0"/>
-          </a:p>
-          <a:p>
-            <a:pPr lvl="1"/>
-            <a:r>
-              <a:rPr lang="en-GB" dirty="0"/>
-              <a:t>Suspicious websites are visited with a client honeypot </a:t>
-            </a:r>
-            <a:r>
-              <a:rPr lang="en-GB" dirty="0" smtClean="0"/>
-              <a:t>(Active - Low </a:t>
-            </a:r>
-            <a:r>
-              <a:rPr lang="en-GB" dirty="0"/>
-              <a:t>interaction)</a:t>
-            </a:r>
-          </a:p>
-          <a:p>
-            <a:pPr lvl="1"/>
-            <a:r>
-              <a:rPr lang="en-GB" dirty="0"/>
-              <a:t>A</a:t>
-            </a:r>
-            <a:r>
-              <a:rPr lang="en-GB" dirty="0" smtClean="0"/>
-              <a:t>nalysis </a:t>
-            </a:r>
-            <a:r>
-              <a:rPr lang="en-GB" dirty="0"/>
-              <a:t>with specialised </a:t>
-            </a:r>
-            <a:r>
-              <a:rPr lang="en-GB" dirty="0" smtClean="0"/>
-              <a:t>VM (Active - High Interaction)</a:t>
-            </a:r>
-            <a:endParaRPr lang="en-GB" dirty="0"/>
-          </a:p>
-          <a:p>
-            <a:endParaRPr lang="en-GB" dirty="0"/>
+              <a:t>Result: 957 unique compromised domains, 15,482 malicious URLs. </a:t>
+            </a:r>
           </a:p>
         </p:txBody>
       </p:sp>
     </p:spTree>
+    <p:extLst>
+      <p:ext uri="{BB962C8B-B14F-4D97-AF65-F5344CB8AC3E}">
+        <p14:creationId xmlns:p14="http://schemas.microsoft.com/office/powerpoint/2010/main" val="3818486410"/>
+      </p:ext>
+    </p:extLst>
   </p:cSld>
   <p:clrMapOvr>
     <a:masterClrMapping/>
@@ -5893,7 +6145,7 @@
 </file>
 
 <file path=ppt/slides/slide5.xml><?xml version="1.0" encoding="utf-8"?>
-<p:sld xmlns:a="http://schemas.openxmlformats.org/drawingml/2006/main" xmlns:r="http://schemas.openxmlformats.org/officeDocument/2006/relationships" xmlns:mc="http://schemas.openxmlformats.org/markup-compatibility/2006" xmlns:mv="urn:schemas-microsoft-com:mac:vml" xmlns:p="http://schemas.openxmlformats.org/presentationml/2006/main" mc:Ignorable="mv" mc:PreserveAttributes="mv:*">
+<p:sld xmlns:a="http://schemas.openxmlformats.org/drawingml/2006/main" xmlns:r="http://schemas.openxmlformats.org/officeDocument/2006/relationships" xmlns:p="http://schemas.openxmlformats.org/presentationml/2006/main">
   <p:cSld>
     <p:spTree>
       <p:nvGrpSpPr>
@@ -5922,7 +6174,7 @@
         <p:spPr/>
         <p:txBody>
           <a:bodyPr>
-            <a:normAutofit/>
+            <a:normAutofit fontScale="90000"/>
           </a:bodyPr>
           <a:lstStyle/>
           <a:p>
@@ -5932,72 +6184,117 @@
             </a:r>
             <a:r>
               <a:rPr lang="en-GB" dirty="0"/>
-              <a:t>Fashion </a:t>
-            </a:r>
-            <a:r>
-              <a:rPr lang="en-GB" dirty="0" smtClean="0"/>
-              <a:t>Crimes</a:t>
+              <a:t>Automatic Malware Collecting System</a:t>
+            </a:r>
+          </a:p>
+        </p:txBody>
+      </p:sp>
+      <p:sp>
+        <p:nvSpPr>
+          <p:cNvPr id="3" name="Content Placeholder 2"/>
+          <p:cNvSpPr>
+            <a:spLocks noGrp="1"/>
+          </p:cNvSpPr>
+          <p:nvPr>
+            <p:ph idx="1"/>
+          </p:nvPr>
+        </p:nvSpPr>
+        <p:spPr/>
+        <p:txBody>
+          <a:bodyPr>
+            <a:normAutofit fontScale="70000" lnSpcReduction="20000"/>
+          </a:bodyPr>
+          <a:lstStyle/>
+          <a:p>
+            <a:r>
+              <a:rPr lang="en-GB" dirty="0"/>
+              <a:t>A system collects search keywords and the malicious code which uses the keywords</a:t>
+            </a:r>
+            <a:r>
+              <a:rPr lang="en-GB" dirty="0" smtClean="0"/>
+              <a:t>.</a:t>
             </a:r>
             <a:endParaRPr lang="en-GB" dirty="0"/>
           </a:p>
-        </p:txBody>
-      </p:sp>
-      <p:sp>
-        <p:nvSpPr>
-          <p:cNvPr id="3" name="Content Placeholder 2"/>
-          <p:cNvSpPr>
-            <a:spLocks noGrp="1"/>
-          </p:cNvSpPr>
-          <p:nvPr>
-            <p:ph idx="1"/>
-          </p:nvPr>
-        </p:nvSpPr>
-        <p:spPr/>
-        <p:txBody>
-          <a:bodyPr>
-            <a:normAutofit/>
-          </a:bodyPr>
-          <a:lstStyle/>
-          <a:p>
-            <a:r>
-              <a:rPr lang="en-GB" dirty="0" smtClean="0"/>
-              <a:t>Large-scale </a:t>
-            </a:r>
-            <a:r>
-              <a:rPr lang="en-GB" dirty="0"/>
-              <a:t>measurement and analysis of trending-term exploitation.</a:t>
-            </a:r>
-          </a:p>
-          <a:p>
-            <a:r>
-              <a:rPr lang="en-GB" dirty="0"/>
-              <a:t>Classification of MFA (Made for AdSense) and malware </a:t>
-            </a:r>
-            <a:r>
-              <a:rPr lang="en-GB" dirty="0" smtClean="0"/>
-              <a:t>sites</a:t>
+          <a:p>
+            <a:r>
+              <a:rPr lang="en-GB" dirty="0"/>
+              <a:t>Malicious code collection approaches:</a:t>
+            </a:r>
+          </a:p>
+          <a:p>
+            <a:pPr lvl="1"/>
+            <a:r>
+              <a:rPr lang="en-GB" dirty="0"/>
+              <a:t>Passive method</a:t>
+            </a:r>
+          </a:p>
+          <a:p>
+            <a:pPr lvl="1"/>
+            <a:r>
+              <a:rPr lang="en-GB" dirty="0"/>
+              <a:t>Active method: Low interaction &amp; High </a:t>
+            </a:r>
+            <a:r>
+              <a:rPr lang="en-GB" dirty="0" smtClean="0"/>
+              <a:t>interaction</a:t>
             </a:r>
             <a:endParaRPr lang="en-GB" dirty="0"/>
           </a:p>
           <a:p>
             <a:r>
               <a:rPr lang="en-GB" dirty="0"/>
-              <a:t>Trending-term abuse measurement</a:t>
-            </a:r>
-          </a:p>
-          <a:p>
-            <a:r>
-              <a:rPr lang="en-GB" dirty="0"/>
-              <a:t>Economics of exploitation / Revenue analysis</a:t>
-            </a:r>
-          </a:p>
-          <a:p>
-            <a:r>
-              <a:rPr lang="en-GB" dirty="0"/>
-              <a:t>Google’s intervention reduced revenue by 30%</a:t>
-            </a:r>
-          </a:p>
-          <a:p>
+              <a:t>The automatic malicious code collecting system:</a:t>
+            </a:r>
+          </a:p>
+          <a:p>
+            <a:pPr lvl="1"/>
+            <a:r>
+              <a:rPr lang="en-GB" dirty="0"/>
+              <a:t>Active Hybrid Method</a:t>
+            </a:r>
+          </a:p>
+          <a:p>
+            <a:pPr lvl="1"/>
+            <a:r>
+              <a:rPr lang="en-GB" dirty="0"/>
+              <a:t>Collect search keywords</a:t>
+            </a:r>
+          </a:p>
+          <a:p>
+            <a:pPr lvl="1"/>
+            <a:r>
+              <a:rPr lang="en-GB" dirty="0"/>
+              <a:t>Filter search results by reviewing URL components (Low interaction)</a:t>
+            </a:r>
+          </a:p>
+          <a:p>
+            <a:pPr lvl="1"/>
+            <a:r>
+              <a:rPr lang="en-GB" dirty="0"/>
+              <a:t>Suspicious websites are visited with a client honeypot (High interaction)</a:t>
+            </a:r>
+          </a:p>
+          <a:p>
+            <a:pPr lvl="1"/>
+            <a:r>
+              <a:rPr lang="en-GB" dirty="0"/>
+              <a:t>Source code analysis with specialised </a:t>
+            </a:r>
+            <a:r>
+              <a:rPr lang="en-GB" dirty="0" smtClean="0"/>
+              <a:t>VM</a:t>
+            </a:r>
+          </a:p>
+          <a:p>
+            <a:r>
+              <a:rPr lang="en-GB" dirty="0"/>
+              <a:t>Result: 1,287 unique suspicious codes collected, 986 determined to be malicious</a:t>
+            </a:r>
+            <a:r>
+              <a:rPr lang="en-GB" dirty="0" smtClean="0"/>
+              <a:t>.</a:t>
+            </a:r>
             <a:endParaRPr lang="en-GB" dirty="0"/>
           </a:p>
         </p:txBody>
@@ -6018,7 +6315,7 @@
 </file>
 
 <file path=ppt/slides/slide6.xml><?xml version="1.0" encoding="utf-8"?>
-<p:sld xmlns:a="http://schemas.openxmlformats.org/drawingml/2006/main" xmlns:r="http://schemas.openxmlformats.org/officeDocument/2006/relationships" xmlns:mc="http://schemas.openxmlformats.org/markup-compatibility/2006" xmlns:mv="urn:schemas-microsoft-com:mac:vml" xmlns:p="http://schemas.openxmlformats.org/presentationml/2006/main" mc:Ignorable="mv" mc:PreserveAttributes="mv:*">
+<p:sld xmlns:a="http://schemas.openxmlformats.org/drawingml/2006/main" xmlns:r="http://schemas.openxmlformats.org/officeDocument/2006/relationships" xmlns:p="http://schemas.openxmlformats.org/presentationml/2006/main">
   <p:cSld>
     <p:spTree>
       <p:nvGrpSpPr>
@@ -6046,12 +6343,22 @@
         </p:nvSpPr>
         <p:spPr/>
         <p:txBody>
-          <a:bodyPr/>
-          <a:lstStyle/>
-          <a:p>
-            <a:r>
-              <a:rPr lang="en-GB" dirty="0" smtClean="0"/>
-              <a:t>Time Issues</a:t>
+          <a:bodyPr>
+            <a:normAutofit/>
+          </a:bodyPr>
+          <a:lstStyle/>
+          <a:p>
+            <a:r>
+              <a:rPr lang="en-GB" dirty="0" smtClean="0"/>
+              <a:t>Lit. Review: </a:t>
+            </a:r>
+            <a:r>
+              <a:rPr lang="en-GB" dirty="0"/>
+              <a:t>Fashion </a:t>
+            </a:r>
+            <a:r>
+              <a:rPr lang="en-GB" dirty="0" smtClean="0"/>
+              <a:t>Crimes</a:t>
             </a:r>
             <a:endParaRPr lang="en-GB" dirty="0"/>
           </a:p>
@@ -6070,88 +6377,87 @@
         <p:spPr/>
         <p:txBody>
           <a:bodyPr>
-            <a:normAutofit fontScale="85000" lnSpcReduction="10000"/>
+            <a:normAutofit fontScale="70000" lnSpcReduction="20000"/>
           </a:bodyPr>
           <a:lstStyle/>
           <a:p>
             <a:r>
               <a:rPr lang="en-GB" dirty="0"/>
-              <a:t>Time cost for data collection in the previous reports:</a:t>
-            </a:r>
-          </a:p>
-          <a:p>
-            <a:pPr lvl="1"/>
-            <a:r>
-              <a:rPr lang="en-GB" dirty="0" err="1"/>
-              <a:t>deSEO</a:t>
-            </a:r>
-            <a:r>
-              <a:rPr lang="en-GB" dirty="0"/>
-              <a:t>:  28th May 2010 --- 3rd Feb 2011     (~7 months)</a:t>
-            </a:r>
-          </a:p>
-          <a:p>
-            <a:pPr lvl="1"/>
-            <a:r>
-              <a:rPr lang="en-GB" dirty="0"/>
-              <a:t>Automatic Malware Collecting System:  22nd Nov 2010 --- 11th Jan 2011     (~2 months)</a:t>
-            </a:r>
-          </a:p>
-          <a:p>
-            <a:pPr lvl="1"/>
-            <a:r>
-              <a:rPr lang="en-GB" dirty="0"/>
-              <a:t>Trending-term Exploitation:  24th Jul 2010 --- 24 Apr 2011     (9 months)</a:t>
-            </a:r>
-          </a:p>
-          <a:p>
-            <a:pPr marL="0" indent="0">
-              <a:buNone/>
-            </a:pPr>
-            <a:endParaRPr lang="en-GB" dirty="0" smtClean="0"/>
-          </a:p>
-          <a:p>
-            <a:pPr marL="0" indent="0">
-              <a:buNone/>
-            </a:pPr>
-            <a:r>
-              <a:rPr lang="en-GB" dirty="0" smtClean="0"/>
-              <a:t>The </a:t>
-            </a:r>
-            <a:r>
-              <a:rPr lang="en-GB" dirty="0"/>
-              <a:t>time we have: 1st Oct 2012 </a:t>
-            </a:r>
-            <a:r>
-              <a:rPr lang="en-GB" dirty="0" smtClean="0"/>
-              <a:t>- </a:t>
-            </a:r>
-            <a:r>
-              <a:rPr lang="en-GB" dirty="0"/>
-              <a:t>13th Dec 2012  </a:t>
-            </a:r>
-            <a:r>
-              <a:rPr lang="en-GB" dirty="0" smtClean="0"/>
-              <a:t>(~2 </a:t>
-            </a:r>
-            <a:r>
-              <a:rPr lang="en-GB" dirty="0"/>
-              <a:t>month)</a:t>
-            </a:r>
-          </a:p>
-          <a:p>
-            <a:r>
-              <a:rPr lang="en-GB" dirty="0"/>
-              <a:t>Start the project from scratch</a:t>
-            </a:r>
-          </a:p>
-          <a:p>
-            <a:r>
-              <a:rPr lang="en-GB" dirty="0"/>
-              <a:t>2 presentations</a:t>
-            </a:r>
-          </a:p>
-          <a:p>
+              <a:t>First large-scale measurement and analysis of trending-term exploitation.</a:t>
+            </a:r>
+          </a:p>
+          <a:p>
+            <a:endParaRPr lang="en-GB" dirty="0"/>
+          </a:p>
+          <a:p>
+            <a:r>
+              <a:rPr lang="en-GB" dirty="0"/>
+              <a:t>Classification of MFA (Made for AdSense) and malware </a:t>
+            </a:r>
+            <a:r>
+              <a:rPr lang="en-GB" dirty="0" smtClean="0"/>
+              <a:t>sites.</a:t>
+            </a:r>
+            <a:endParaRPr lang="en-GB" dirty="0"/>
+          </a:p>
+          <a:p>
+            <a:r>
+              <a:rPr lang="en-GB" dirty="0"/>
+              <a:t>Difference between MFA and malware sites </a:t>
+            </a:r>
+            <a:r>
+              <a:rPr lang="en-GB" dirty="0" smtClean="0"/>
+              <a:t>tactics.</a:t>
+            </a:r>
+            <a:endParaRPr lang="en-GB" dirty="0"/>
+          </a:p>
+          <a:p>
+            <a:r>
+              <a:rPr lang="en-GB" dirty="0"/>
+              <a:t>Trending-term abuse </a:t>
+            </a:r>
+            <a:r>
+              <a:rPr lang="en-GB" dirty="0" smtClean="0"/>
+              <a:t>measurement.</a:t>
+            </a:r>
+            <a:endParaRPr lang="en-GB" dirty="0"/>
+          </a:p>
+          <a:p>
+            <a:r>
+              <a:rPr lang="en-GB" dirty="0"/>
+              <a:t>Economics of exploitation / Revenue </a:t>
+            </a:r>
+            <a:r>
+              <a:rPr lang="en-GB" dirty="0" smtClean="0"/>
+              <a:t>analysis.</a:t>
+            </a:r>
+            <a:endParaRPr lang="en-GB" dirty="0"/>
+          </a:p>
+          <a:p>
+            <a:r>
+              <a:rPr lang="en-GB" dirty="0"/>
+              <a:t>Google’s intervention reduced revenue by 30%</a:t>
+            </a:r>
+          </a:p>
+          <a:p>
+            <a:endParaRPr lang="en-GB" dirty="0"/>
+          </a:p>
+          <a:p>
+            <a:r>
+              <a:rPr lang="en-GB" dirty="0"/>
+              <a:t>Over 60 million search results and tweets </a:t>
+            </a:r>
+            <a:r>
+              <a:rPr lang="en-GB" dirty="0" smtClean="0"/>
+              <a:t>collected.</a:t>
+            </a:r>
+            <a:endParaRPr lang="en-GB" dirty="0"/>
+          </a:p>
+          <a:p>
+            <a:r>
+              <a:rPr lang="en-GB" dirty="0"/>
+              <a:t>Result: MFA $100,000 per month, Malware $60,000 per month before search-engine intervention. </a:t>
+            </a:r>
             <a:endParaRPr lang="en-GB" dirty="0"/>
           </a:p>
         </p:txBody>
@@ -6172,7 +6478,7 @@
 </file>
 
 <file path=ppt/slides/slide7.xml><?xml version="1.0" encoding="utf-8"?>
-<p:sld xmlns:a="http://schemas.openxmlformats.org/drawingml/2006/main" xmlns:r="http://schemas.openxmlformats.org/officeDocument/2006/relationships" xmlns:mc="http://schemas.openxmlformats.org/markup-compatibility/2006" xmlns:mv="urn:schemas-microsoft-com:mac:vml" xmlns:p="http://schemas.openxmlformats.org/presentationml/2006/main" mc:Ignorable="mv" mc:PreserveAttributes="mv:*">
+<p:sld xmlns:a="http://schemas.openxmlformats.org/drawingml/2006/main" xmlns:r="http://schemas.openxmlformats.org/officeDocument/2006/relationships" xmlns:p="http://schemas.openxmlformats.org/presentationml/2006/main">
   <p:cSld>
     <p:spTree>
       <p:nvGrpSpPr>
@@ -6205,7 +6511,7 @@
           <a:p>
             <a:r>
               <a:rPr lang="en-GB" dirty="0" smtClean="0"/>
-              <a:t>Architectural Design</a:t>
+              <a:t>Time Issues</a:t>
             </a:r>
             <a:endParaRPr lang="en-GB" dirty="0"/>
           </a:p>
@@ -6224,49 +6530,85 @@
         <p:spPr/>
         <p:txBody>
           <a:bodyPr>
-            <a:normAutofit/>
+            <a:normAutofit fontScale="85000" lnSpcReduction="10000"/>
           </a:bodyPr>
           <a:lstStyle/>
           <a:p>
             <a:r>
               <a:rPr lang="en-GB" dirty="0"/>
-              <a:t>Distributed </a:t>
-            </a:r>
-            <a:r>
-              <a:rPr lang="en-GB" dirty="0" smtClean="0"/>
-              <a:t>Architecture</a:t>
+              <a:t>Time cost for data collection in the previous reports:</a:t>
             </a:r>
           </a:p>
           <a:p>
             <a:pPr lvl="1"/>
             <a:r>
-              <a:rPr lang="en-GB" dirty="0" smtClean="0"/>
-              <a:t>Celery</a:t>
-            </a:r>
-            <a:r>
-              <a:rPr lang="en-GB" dirty="0"/>
-              <a:t> with RabbitMQ for message passing and Redis to store results</a:t>
+              <a:rPr lang="en-GB" dirty="0" err="1"/>
+              <a:t>deSEO</a:t>
+            </a:r>
+            <a:r>
+              <a:rPr lang="en-GB" dirty="0"/>
+              <a:t>:  28th May 2010 --- 3rd Feb 2011     (~7 months)</a:t>
             </a:r>
           </a:p>
           <a:p>
             <a:pPr lvl="1"/>
             <a:r>
               <a:rPr lang="en-GB" dirty="0"/>
-              <a:t>"Celery is an asynchronous task queue/job queue based on distributed message passing."</a:t>
+              <a:t>Automatic Malware Collecting System:  22nd Nov 2010 --- 11th Jan 2011     (~2 months)</a:t>
             </a:r>
           </a:p>
           <a:p>
             <a:pPr lvl="1"/>
             <a:r>
               <a:rPr lang="en-GB" dirty="0"/>
-              <a:t>Work can be distributed over a cluster of many machines on different networks.</a:t>
-            </a:r>
-          </a:p>
-          <a:p>
-            <a:pPr lvl="1"/>
-            <a:r>
-              <a:rPr lang="en-GB" dirty="0"/>
-              <a:t>Machines can be added and removed from the cluster without losing tasks</a:t>
+              <a:t>Trending-term Exploitation:  24th Jul 2010 --- 24 Apr 2011     (9 months)</a:t>
+            </a:r>
+          </a:p>
+          <a:p>
+            <a:pPr marL="0" indent="0">
+              <a:buNone/>
+            </a:pPr>
+            <a:endParaRPr lang="en-GB" dirty="0" smtClean="0"/>
+          </a:p>
+          <a:p>
+            <a:pPr marL="0" indent="0">
+              <a:buNone/>
+            </a:pPr>
+            <a:r>
+              <a:rPr lang="en-GB" dirty="0" smtClean="0"/>
+              <a:t>The </a:t>
+            </a:r>
+            <a:r>
+              <a:rPr lang="en-GB" dirty="0"/>
+              <a:t>time we have: 1st Oct 2012 </a:t>
+            </a:r>
+            <a:r>
+              <a:rPr lang="en-GB" dirty="0" smtClean="0"/>
+              <a:t>- </a:t>
+            </a:r>
+            <a:r>
+              <a:rPr lang="en-GB" dirty="0"/>
+              <a:t>13th Dec 2012  </a:t>
+            </a:r>
+            <a:r>
+              <a:rPr lang="en-GB" dirty="0" smtClean="0"/>
+              <a:t>(~2 </a:t>
+            </a:r>
+            <a:r>
+              <a:rPr lang="en-GB" dirty="0"/>
+              <a:t>month)</a:t>
+            </a:r>
+          </a:p>
+          <a:p>
+            <a:r>
+              <a:rPr lang="en-GB" dirty="0"/>
+              <a:t>Start the project from scratch</a:t>
+            </a:r>
+          </a:p>
+          <a:p>
+            <a:r>
+              <a:rPr lang="en-GB" dirty="0"/>
+              <a:t>2 presentations</a:t>
             </a:r>
           </a:p>
           <a:p>
@@ -6290,7 +6632,7 @@
 </file>
 
 <file path=ppt/slides/slide8.xml><?xml version="1.0" encoding="utf-8"?>
-<p:sld xmlns:a="http://schemas.openxmlformats.org/drawingml/2006/main" xmlns:r="http://schemas.openxmlformats.org/officeDocument/2006/relationships" xmlns:mc="http://schemas.openxmlformats.org/markup-compatibility/2006" xmlns:mv="urn:schemas-microsoft-com:mac:vml" xmlns:p="http://schemas.openxmlformats.org/presentationml/2006/main" mc:Ignorable="mv" mc:PreserveAttributes="mv:*">
+<p:sld xmlns:a="http://schemas.openxmlformats.org/drawingml/2006/main" xmlns:r="http://schemas.openxmlformats.org/officeDocument/2006/relationships" xmlns:p="http://schemas.openxmlformats.org/presentationml/2006/main">
   <p:cSld>
     <p:spTree>
       <p:nvGrpSpPr>
@@ -6323,111 +6665,81 @@
           <a:p>
             <a:r>
               <a:rPr lang="en-GB" dirty="0" smtClean="0"/>
-              <a:t>Arch. Design: Task Type Breakdown</a:t>
-            </a:r>
+              <a:t>Design: Distributed </a:t>
+            </a:r>
+            <a:r>
+              <a:rPr lang="en-GB" dirty="0"/>
+              <a:t>Architecture</a:t>
+            </a:r>
+          </a:p>
+        </p:txBody>
+      </p:sp>
+      <p:sp>
+        <p:nvSpPr>
+          <p:cNvPr id="3" name="Content Placeholder 2"/>
+          <p:cNvSpPr>
+            <a:spLocks noGrp="1"/>
+          </p:cNvSpPr>
+          <p:nvPr>
+            <p:ph idx="1"/>
+          </p:nvPr>
+        </p:nvSpPr>
+        <p:spPr/>
+        <p:txBody>
+          <a:bodyPr>
+            <a:normAutofit fontScale="85000" lnSpcReduction="20000"/>
+          </a:bodyPr>
+          <a:lstStyle/>
+          <a:p>
+            <a:r>
+              <a:rPr lang="en-GB" dirty="0" smtClean="0"/>
+              <a:t>Celery</a:t>
+            </a:r>
+            <a:r>
+              <a:rPr lang="en-GB" dirty="0"/>
+              <a:t> with RabbitMQ for message passing and Redis to store </a:t>
+            </a:r>
+            <a:r>
+              <a:rPr lang="en-GB" dirty="0" smtClean="0"/>
+              <a:t>results</a:t>
+            </a:r>
+          </a:p>
+          <a:p>
             <a:endParaRPr lang="en-GB" dirty="0"/>
           </a:p>
-        </p:txBody>
-      </p:sp>
-      <p:sp>
-        <p:nvSpPr>
-          <p:cNvPr id="3" name="Content Placeholder 2"/>
-          <p:cNvSpPr>
-            <a:spLocks noGrp="1"/>
-          </p:cNvSpPr>
-          <p:nvPr>
-            <p:ph idx="1"/>
-          </p:nvPr>
-        </p:nvSpPr>
-        <p:spPr/>
-        <p:txBody>
-          <a:bodyPr>
-            <a:normAutofit fontScale="92500" lnSpcReduction="20000"/>
-          </a:bodyPr>
-          <a:lstStyle/>
-          <a:p>
-            <a:r>
-              <a:rPr lang="en-GB" dirty="0" smtClean="0"/>
-              <a:t>Trend Discovery</a:t>
-            </a:r>
-          </a:p>
-          <a:p>
-            <a:pPr lvl="1"/>
-            <a:r>
-              <a:rPr lang="en-GB" dirty="0" smtClean="0"/>
-              <a:t>Find trends on </a:t>
-            </a:r>
-            <a:r>
-              <a:rPr lang="en-GB" dirty="0"/>
-              <a:t>Twitter</a:t>
-            </a:r>
-            <a:r>
-              <a:rPr lang="en-GB" dirty="0" smtClean="0"/>
-              <a:t>, or news feeds like </a:t>
-            </a:r>
-            <a:r>
-              <a:rPr lang="en-GB" dirty="0"/>
-              <a:t>The Sun</a:t>
-            </a:r>
-            <a:r>
-              <a:rPr lang="en-GB" dirty="0" smtClean="0"/>
-              <a:t>, </a:t>
-            </a:r>
-            <a:r>
-              <a:rPr lang="en-GB" dirty="0"/>
-              <a:t>BBC News</a:t>
-            </a:r>
-            <a:r>
-              <a:rPr lang="en-GB" dirty="0" smtClean="0"/>
-              <a:t> and The Register</a:t>
-            </a:r>
-          </a:p>
-          <a:p>
-            <a:pPr lvl="1"/>
-            <a:r>
-              <a:rPr lang="en-GB" dirty="0" smtClean="0"/>
-              <a:t>Takes no input, returns a list of keywords</a:t>
-            </a:r>
-          </a:p>
-          <a:p>
-            <a:r>
-              <a:rPr lang="en-GB" dirty="0" smtClean="0"/>
-              <a:t>Search</a:t>
-            </a:r>
-          </a:p>
-          <a:p>
-            <a:pPr lvl="1"/>
-            <a:r>
-              <a:rPr lang="en-GB" dirty="0" smtClean="0"/>
-              <a:t>Searches for a keyword in a Search Engine such as Google or Dogpile.</a:t>
-            </a:r>
-          </a:p>
-          <a:p>
-            <a:pPr lvl="1"/>
-            <a:r>
-              <a:rPr lang="en-GB" dirty="0" smtClean="0"/>
-              <a:t>Takes a keyword as input, returns a list of URLs</a:t>
-            </a:r>
-          </a:p>
-          <a:p>
-            <a:r>
-              <a:rPr lang="en-GB" dirty="0" smtClean="0"/>
-              <a:t>Malware Scan</a:t>
-            </a:r>
-          </a:p>
-          <a:p>
-            <a:pPr lvl="1"/>
-            <a:r>
-              <a:rPr lang="en-GB" dirty="0" smtClean="0"/>
-              <a:t>Queues a page to be scanned for malware.</a:t>
-            </a:r>
-          </a:p>
-          <a:p>
-            <a:pPr lvl="1"/>
-            <a:r>
-              <a:rPr lang="en-GB" dirty="0" smtClean="0"/>
-              <a:t>Takes a URL as input, returns a malware report.</a:t>
-            </a:r>
+          <a:p>
+            <a:r>
+              <a:rPr lang="en-GB" dirty="0"/>
+              <a:t>"Celery is an asynchronous task queue/job queue based on distributed message passing</a:t>
+            </a:r>
+            <a:r>
+              <a:rPr lang="en-GB" dirty="0" smtClean="0"/>
+              <a:t>.“</a:t>
+            </a:r>
+          </a:p>
+          <a:p>
+            <a:endParaRPr lang="en-GB" dirty="0"/>
+          </a:p>
+          <a:p>
+            <a:r>
+              <a:rPr lang="en-GB" dirty="0"/>
+              <a:t>Work can be distributed over a cluster of many machines on different networks</a:t>
+            </a:r>
+            <a:r>
+              <a:rPr lang="en-GB" dirty="0" smtClean="0"/>
+              <a:t>.</a:t>
+            </a:r>
+          </a:p>
+          <a:p>
+            <a:endParaRPr lang="en-GB" dirty="0"/>
+          </a:p>
+          <a:p>
+            <a:r>
+              <a:rPr lang="en-GB" dirty="0"/>
+              <a:t>Machines can be added and removed from the cluster without losing tasks</a:t>
+            </a:r>
+          </a:p>
+          <a:p>
             <a:endParaRPr lang="en-GB" dirty="0"/>
           </a:p>
         </p:txBody>
@@ -6448,7 +6760,7 @@
 </file>
 
 <file path=ppt/slides/slide9.xml><?xml version="1.0" encoding="utf-8"?>
-<p:sld xmlns:a="http://schemas.openxmlformats.org/drawingml/2006/main" xmlns:r="http://schemas.openxmlformats.org/officeDocument/2006/relationships" xmlns:mc="http://schemas.openxmlformats.org/markup-compatibility/2006" xmlns:mv="urn:schemas-microsoft-com:mac:vml" xmlns:p="http://schemas.openxmlformats.org/presentationml/2006/main" mc:Ignorable="mv" mc:PreserveAttributes="mv:*">
+<p:sld xmlns:a="http://schemas.openxmlformats.org/drawingml/2006/main" xmlns:r="http://schemas.openxmlformats.org/officeDocument/2006/relationships" xmlns:p="http://schemas.openxmlformats.org/presentationml/2006/main">
   <p:cSld>
     <p:spTree>
       <p:nvGrpSpPr>
@@ -6481,7 +6793,7 @@
           <a:p>
             <a:r>
               <a:rPr lang="en-GB" dirty="0" smtClean="0"/>
-              <a:t>Arch. Design: Periodic Tasks</a:t>
+              <a:t>Arch. Design: Task Type Breakdown</a:t>
             </a:r>
             <a:endParaRPr lang="en-GB" dirty="0"/>
           </a:p>
@@ -6505,52 +6817,87 @@
           <a:lstStyle/>
           <a:p>
             <a:r>
-              <a:rPr lang="en-GB" dirty="0"/>
-              <a:t>Each period run each Trend </a:t>
-            </a:r>
-            <a:r>
-              <a:rPr lang="en-GB" dirty="0" smtClean="0"/>
-              <a:t>Discovery, </a:t>
-            </a:r>
-            <a:r>
-              <a:rPr lang="en-GB" dirty="0"/>
-              <a:t>launching Search and Malware Scanning tasks as required.</a:t>
-            </a:r>
-          </a:p>
-          <a:p>
-            <a:r>
-              <a:rPr lang="en-GB" dirty="0"/>
-              <a:t>Also run a new set of Search and Malware Scanning tasks for each Trend Discovery task that has been run historically.</a:t>
-            </a:r>
-          </a:p>
-          <a:p>
-            <a:r>
-              <a:rPr lang="en-GB" dirty="0"/>
-              <a:t>So as to investigate malware incidence over time for each trend source</a:t>
+              <a:rPr lang="en-GB" dirty="0" smtClean="0"/>
+              <a:t>Trend Discovery</a:t>
             </a:r>
           </a:p>
           <a:p>
             <a:pPr lvl="1"/>
             <a:r>
-              <a:rPr lang="en-GB" dirty="0"/>
-              <a:t>How long does it take on average for topics to be targeted by malware?</a:t>
+              <a:rPr lang="en-GB" dirty="0" smtClean="0"/>
+              <a:t>Find trends on </a:t>
+            </a:r>
+            <a:r>
+              <a:rPr lang="en-GB" dirty="0"/>
+              <a:t>Twitter</a:t>
+            </a:r>
+            <a:r>
+              <a:rPr lang="en-GB" dirty="0" smtClean="0"/>
+              <a:t>, or news feeds like </a:t>
+            </a:r>
+            <a:r>
+              <a:rPr lang="en-GB" dirty="0"/>
+              <a:t>The Sun</a:t>
+            </a:r>
+            <a:r>
+              <a:rPr lang="en-GB" dirty="0" smtClean="0"/>
+              <a:t>, </a:t>
+            </a:r>
+            <a:r>
+              <a:rPr lang="en-GB" dirty="0"/>
+              <a:t>BBC News</a:t>
+            </a:r>
+            <a:r>
+              <a:rPr lang="en-GB" dirty="0" smtClean="0"/>
+              <a:t> and The Register</a:t>
             </a:r>
           </a:p>
           <a:p>
             <a:pPr lvl="1"/>
             <a:r>
-              <a:rPr lang="en-GB" dirty="0"/>
-              <a:t>How long before malware is removed?</a:t>
+              <a:rPr lang="en-GB" dirty="0" smtClean="0"/>
+              <a:t>Takes no input, returns a list of keywords</a:t>
+            </a:r>
+          </a:p>
+          <a:p>
+            <a:r>
+              <a:rPr lang="en-GB" dirty="0" smtClean="0"/>
+              <a:t>Search</a:t>
             </a:r>
           </a:p>
           <a:p>
             <a:pPr lvl="1"/>
             <a:r>
-              <a:rPr lang="en-GB" dirty="0"/>
-              <a:t>Which source gets the most malware?</a:t>
-            </a:r>
-          </a:p>
-          <a:p>
+              <a:rPr lang="en-GB" dirty="0" smtClean="0"/>
+              <a:t>Searches for a keyword in a Search Engine such as Google or Dogpile.</a:t>
+            </a:r>
+          </a:p>
+          <a:p>
+            <a:pPr lvl="1"/>
+            <a:r>
+              <a:rPr lang="en-GB" dirty="0" smtClean="0"/>
+              <a:t>Takes a keyword as input, returns a list of URLs</a:t>
+            </a:r>
+          </a:p>
+          <a:p>
+            <a:r>
+              <a:rPr lang="en-GB" dirty="0" smtClean="0"/>
+              <a:t>Malware Scan</a:t>
+            </a:r>
+          </a:p>
+          <a:p>
+            <a:pPr lvl="1"/>
+            <a:r>
+              <a:rPr lang="en-GB" dirty="0" smtClean="0"/>
+              <a:t>Queues a page to be scanned for malware.</a:t>
+            </a:r>
+          </a:p>
+          <a:p>
+            <a:pPr lvl="1"/>
+            <a:r>
+              <a:rPr lang="en-GB" dirty="0" smtClean="0"/>
+              <a:t>Takes a URL as input, returns a malware report.</a:t>
+            </a:r>
             <a:endParaRPr lang="en-GB" dirty="0"/>
           </a:p>
         </p:txBody>

</xml_diff>

<commit_message>
Added more final touches to wk4 presentation
 - Bigger font on phys. arch. diagram
 - References
 - Finished logical dia.
</commit_message>
<xml_diff>
--- a/doc/pres1/wk4-progress.pptx
+++ b/doc/pres1/wk4-progress.pptx
@@ -139,6 +139,10 @@
 </p:cmAuthorLst>
 </file>
 
+<file path=ppt/activeX/activeX1.xml><?xml version="1.0" encoding="utf-8"?>
+<ax:ocx xmlns:ax="http://schemas.microsoft.com/office/2006/activeX" xmlns:r="http://schemas.openxmlformats.org/officeDocument/2006/relationships" ax:classid="{D27CDB6E-AE6D-11CF-96B8-444553540000}" ax:persistence="persistStorage" r:id="rId1"/>
+</file>
+
 <file path=ppt/comments/comment1.xml><?xml version="1.0" encoding="utf-8"?>
 <p:cmLst xmlns:a="http://schemas.openxmlformats.org/drawingml/2006/main" xmlns:r="http://schemas.openxmlformats.org/officeDocument/2006/relationships" xmlns:p="http://schemas.openxmlformats.org/presentationml/2006/main">
   <p:cm authorId="0" dt="2012-10-23T13:09:23.805" idx="1">
@@ -243,6 +247,7 @@
           <a:p>
             <a:fld id="{18F98EB7-082C-9949-BFCA-B4BAD2D6FDBD}" type="datetimeFigureOut">
               <a:rPr lang="en-US" smtClean="0"/>
+              <a:pPr/>
               <a:t>10/23/2012</a:t>
             </a:fld>
             <a:endParaRPr lang="en-US"/>
@@ -309,6 +314,7 @@
           <a:p>
             <a:fld id="{E04A4919-99E7-6D4E-8297-7B2819B26390}" type="slidenum">
               <a:rPr lang="en-US" smtClean="0"/>
+              <a:pPr/>
               <a:t>‹#›</a:t>
             </a:fld>
             <a:endParaRPr lang="en-US"/>
@@ -318,7 +324,7 @@
     </p:spTree>
     <p:extLst>
       <p:ext uri="{BB962C8B-B14F-4D97-AF65-F5344CB8AC3E}">
-        <p14:creationId xmlns:p14="http://schemas.microsoft.com/office/powerpoint/2010/main" val="1901348598"/>
+        <p14:creationId xmlns:p14="http://schemas.microsoft.com/office/powerpoint/2010/main" xmlns="" val="1901348598"/>
       </p:ext>
     </p:extLst>
   </p:cSld>
@@ -580,7 +586,7 @@
     </p:spTree>
     <p:extLst>
       <p:ext uri="{BB962C8B-B14F-4D97-AF65-F5344CB8AC3E}">
-        <p14:creationId xmlns:p14="http://schemas.microsoft.com/office/powerpoint/2010/main" val="1219798393"/>
+        <p14:creationId xmlns:p14="http://schemas.microsoft.com/office/powerpoint/2010/main" xmlns="" val="1219798393"/>
       </p:ext>
     </p:extLst>
   </p:cSld>
@@ -3861,7 +3867,7 @@
         </p:nvSpPr>
         <p:spPr>
           <a:xfrm>
-            <a:off x="251520" y="4725145"/>
+            <a:off x="467544" y="5229200"/>
             <a:ext cx="1728192" cy="1080120"/>
           </a:xfrm>
           <a:prstGeom prst="roundRect">
@@ -3920,7 +3926,7 @@
         </p:nvSpPr>
         <p:spPr>
           <a:xfrm>
-            <a:off x="3563888" y="3501008"/>
+            <a:off x="3419872" y="3356992"/>
             <a:ext cx="1728192" cy="1080120"/>
           </a:xfrm>
           <a:prstGeom prst="roundRect">
@@ -3978,7 +3984,7 @@
         </p:nvSpPr>
         <p:spPr>
           <a:xfrm>
-            <a:off x="6948264" y="1484784"/>
+            <a:off x="6732240" y="1412776"/>
             <a:ext cx="1728192" cy="1080120"/>
           </a:xfrm>
           <a:prstGeom prst="roundRect">
@@ -4008,24 +4014,8 @@
             <a:pPr algn="ctr"/>
             <a:r>
               <a:rPr lang="en-GB" dirty="0" smtClean="0"/>
-              <a:t>Trends</a:t>
-            </a:r>
-          </a:p>
-          <a:p>
-            <a:pPr algn="ctr"/>
-            <a:r>
-              <a:rPr lang="en-GB" dirty="0" smtClean="0"/>
-              <a:t>(</a:t>
-            </a:r>
-            <a:r>
-              <a:rPr lang="en-GB" dirty="0" err="1" smtClean="0"/>
-              <a:t>eg</a:t>
-            </a:r>
-            <a:r>
-              <a:rPr lang="en-GB" dirty="0" smtClean="0"/>
-              <a:t>. Twitter)</a:t>
-            </a:r>
-            <a:endParaRPr lang="en-US" dirty="0" smtClean="0"/>
+              <a:t>Malware Scanner Dispatch</a:t>
+            </a:r>
           </a:p>
         </p:txBody>
       </p:sp>
@@ -4036,8 +4026,8 @@
           <p:nvPr/>
         </p:nvSpPr>
         <p:spPr>
-          <a:xfrm rot="428135">
-            <a:off x="2126539" y="5255027"/>
+          <a:xfrm rot="192481">
+            <a:off x="2480979" y="5977074"/>
             <a:ext cx="1584176" cy="144016"/>
           </a:xfrm>
           <a:prstGeom prst="rightArrow">
@@ -4072,6 +4062,9 @@
               <a:rPr lang="en-GB" dirty="0" smtClean="0"/>
               <a:t>Bees</a:t>
             </a:r>
+          </a:p>
+          <a:p>
+            <a:pPr algn="ctr"/>
             <a:endParaRPr lang="en-GB" dirty="0"/>
           </a:p>
         </p:txBody>
@@ -4083,8 +4076,8 @@
           <p:nvPr/>
         </p:nvSpPr>
         <p:spPr>
-          <a:xfrm rot="20223377">
-            <a:off x="2017127" y="4308145"/>
+          <a:xfrm rot="19923443">
+            <a:off x="2281151" y="4871887"/>
             <a:ext cx="1584176" cy="144016"/>
           </a:xfrm>
           <a:prstGeom prst="rightArrow">
@@ -4117,8 +4110,16 @@
             <a:pPr algn="ctr"/>
             <a:r>
               <a:rPr lang="en-GB" dirty="0" smtClean="0"/>
-              <a:t>Taken 2</a:t>
-            </a:r>
+              <a:t>Taken </a:t>
+            </a:r>
+            <a:r>
+              <a:rPr lang="en-GB" dirty="0" smtClean="0"/>
+              <a:t>2</a:t>
+            </a:r>
+          </a:p>
+          <a:p>
+            <a:pPr algn="ctr"/>
+            <a:endParaRPr lang="en-GB" dirty="0" smtClean="0"/>
           </a:p>
         </p:txBody>
       </p:sp>
@@ -4129,8 +4130,62 @@
           <p:nvPr/>
         </p:nvSpPr>
         <p:spPr>
-          <a:xfrm>
-            <a:off x="2123728" y="4869161"/>
+          <a:xfrm rot="21267373">
+            <a:off x="2414675" y="5650116"/>
+            <a:ext cx="1728192" cy="144015"/>
+          </a:xfrm>
+          <a:prstGeom prst="rightArrow">
+            <a:avLst>
+              <a:gd name="adj1" fmla="val 12335"/>
+              <a:gd name="adj2" fmla="val 50000"/>
+            </a:avLst>
+          </a:prstGeom>
+        </p:spPr>
+        <p:style>
+          <a:lnRef idx="2">
+            <a:schemeClr val="accent6">
+              <a:shade val="50000"/>
+            </a:schemeClr>
+          </a:lnRef>
+          <a:fillRef idx="1">
+            <a:schemeClr val="accent6"/>
+          </a:fillRef>
+          <a:effectRef idx="0">
+            <a:schemeClr val="accent6"/>
+          </a:effectRef>
+          <a:fontRef idx="minor">
+            <a:schemeClr val="lt1"/>
+          </a:fontRef>
+        </p:style>
+        <p:txBody>
+          <a:bodyPr rtlCol="0" anchor="ctr"/>
+          <a:lstStyle/>
+          <a:p>
+            <a:pPr algn="ctr"/>
+            <a:r>
+              <a:rPr lang="en-GB" dirty="0" smtClean="0"/>
+              <a:t>Russell </a:t>
+            </a:r>
+            <a:r>
+              <a:rPr lang="en-GB" dirty="0" smtClean="0"/>
+              <a:t>Howard</a:t>
+            </a:r>
+          </a:p>
+          <a:p>
+            <a:pPr algn="ctr"/>
+            <a:endParaRPr lang="en-GB" dirty="0"/>
+          </a:p>
+        </p:txBody>
+      </p:sp>
+      <p:sp>
+        <p:nvSpPr>
+          <p:cNvPr id="33" name="Right Arrow 32"/>
+          <p:cNvSpPr/>
+          <p:nvPr/>
+        </p:nvSpPr>
+        <p:spPr>
+          <a:xfrm rot="20586153">
+            <a:off x="2398492" y="5240296"/>
             <a:ext cx="1584176" cy="144016"/>
           </a:xfrm>
           <a:prstGeom prst="rightArrow">
@@ -4163,21 +4218,24 @@
             <a:pPr algn="ctr"/>
             <a:r>
               <a:rPr lang="en-GB" dirty="0" smtClean="0"/>
-              <a:t>Russell Howard</a:t>
-            </a:r>
-            <a:endParaRPr lang="en-GB" dirty="0"/>
-          </a:p>
-        </p:txBody>
-      </p:sp>
-      <p:sp>
-        <p:nvSpPr>
-          <p:cNvPr id="33" name="Right Arrow 32"/>
+              <a:t>Armstrong</a:t>
+            </a:r>
+          </a:p>
+          <a:p>
+            <a:pPr algn="ctr"/>
+            <a:endParaRPr lang="en-GB" dirty="0" smtClean="0"/>
+          </a:p>
+        </p:txBody>
+      </p:sp>
+      <p:sp>
+        <p:nvSpPr>
+          <p:cNvPr id="34" name="Right Arrow 33"/>
           <p:cNvSpPr/>
           <p:nvPr/>
         </p:nvSpPr>
         <p:spPr>
-          <a:xfrm rot="835691">
-            <a:off x="2117773" y="5633768"/>
+          <a:xfrm rot="849122">
+            <a:off x="2405326" y="6356780"/>
             <a:ext cx="1584176" cy="144016"/>
           </a:xfrm>
           <a:prstGeom prst="rightArrow">
@@ -4210,21 +4268,25 @@
             <a:pPr algn="ctr"/>
             <a:r>
               <a:rPr lang="en-GB" dirty="0" smtClean="0"/>
-              <a:t>Armstrong</a:t>
-            </a:r>
-          </a:p>
-        </p:txBody>
-      </p:sp>
-      <p:sp>
-        <p:nvSpPr>
-          <p:cNvPr id="34" name="Right Arrow 33"/>
+              <a:t>Costa</a:t>
+            </a:r>
+          </a:p>
+          <a:p>
+            <a:pPr algn="ctr"/>
+            <a:endParaRPr lang="en-GB" dirty="0" smtClean="0"/>
+          </a:p>
+        </p:txBody>
+      </p:sp>
+      <p:sp>
+        <p:nvSpPr>
+          <p:cNvPr id="36" name="Right Arrow 35"/>
           <p:cNvSpPr/>
           <p:nvPr/>
         </p:nvSpPr>
         <p:spPr>
-          <a:xfrm rot="1738722">
-            <a:off x="1987438" y="6078598"/>
-            <a:ext cx="1584176" cy="144016"/>
+          <a:xfrm rot="19495457">
+            <a:off x="4964339" y="2682885"/>
+            <a:ext cx="1711753" cy="152144"/>
           </a:xfrm>
           <a:prstGeom prst="rightArrow">
             <a:avLst>
@@ -4253,24 +4315,30 @@
           <a:bodyPr rtlCol="0" anchor="ctr"/>
           <a:lstStyle/>
           <a:p>
-            <a:pPr algn="ctr"/>
-            <a:r>
-              <a:rPr lang="en-GB" dirty="0" smtClean="0"/>
-              <a:t>Costa</a:t>
-            </a:r>
-          </a:p>
-        </p:txBody>
-      </p:sp>
-      <p:sp>
-        <p:nvSpPr>
-          <p:cNvPr id="36" name="Right Arrow 35"/>
+            <a:r>
+              <a:rPr lang="en-GB" dirty="0" smtClean="0"/>
+              <a:t>imdb.com</a:t>
+            </a:r>
+            <a:r>
+              <a:rPr lang="en-GB" dirty="0" smtClean="0"/>
+              <a:t>/...</a:t>
+            </a:r>
+          </a:p>
+          <a:p>
+            <a:endParaRPr lang="en-GB" dirty="0" smtClean="0"/>
+          </a:p>
+        </p:txBody>
+      </p:sp>
+      <p:sp>
+        <p:nvSpPr>
+          <p:cNvPr id="13" name="Right Arrow 12"/>
           <p:cNvSpPr/>
           <p:nvPr/>
         </p:nvSpPr>
         <p:spPr>
-          <a:xfrm rot="19531843">
-            <a:off x="4904222" y="2734413"/>
-            <a:ext cx="1584176" cy="144016"/>
+          <a:xfrm rot="20664935">
+            <a:off x="5198035" y="3029599"/>
+            <a:ext cx="2409953" cy="165735"/>
           </a:xfrm>
           <a:prstGeom prst="rightArrow">
             <a:avLst>
@@ -4299,11 +4367,110 @@
           <a:bodyPr rtlCol="0" anchor="ctr"/>
           <a:lstStyle/>
           <a:p>
-            <a:pPr algn="ctr"/>
-            <a:r>
-              <a:rPr lang="en-GB" dirty="0" smtClean="0"/>
-              <a:t>Taken 2a</a:t>
-            </a:r>
+            <a:r>
+              <a:rPr lang="en-GB" dirty="0" smtClean="0"/>
+              <a:t>rottentomatoes.com/...</a:t>
+            </a:r>
+          </a:p>
+          <a:p>
+            <a:endParaRPr lang="en-GB" dirty="0" smtClean="0"/>
+          </a:p>
+        </p:txBody>
+      </p:sp>
+      <p:sp>
+        <p:nvSpPr>
+          <p:cNvPr id="16" name="Right Arrow 15"/>
+          <p:cNvSpPr/>
+          <p:nvPr/>
+        </p:nvSpPr>
+        <p:spPr>
+          <a:xfrm rot="21076108">
+            <a:off x="5284355" y="3440151"/>
+            <a:ext cx="2964799" cy="124575"/>
+          </a:xfrm>
+          <a:prstGeom prst="rightArrow">
+            <a:avLst>
+              <a:gd name="adj1" fmla="val 12335"/>
+              <a:gd name="adj2" fmla="val 50000"/>
+            </a:avLst>
+          </a:prstGeom>
+        </p:spPr>
+        <p:style>
+          <a:lnRef idx="2">
+            <a:schemeClr val="accent6">
+              <a:shade val="50000"/>
+            </a:schemeClr>
+          </a:lnRef>
+          <a:fillRef idx="1">
+            <a:schemeClr val="accent6"/>
+          </a:fillRef>
+          <a:effectRef idx="0">
+            <a:schemeClr val="accent6"/>
+          </a:effectRef>
+          <a:fontRef idx="minor">
+            <a:schemeClr val="lt1"/>
+          </a:fontRef>
+        </p:style>
+        <p:txBody>
+          <a:bodyPr rtlCol="0" anchor="ctr"/>
+          <a:lstStyle/>
+          <a:p>
+            <a:r>
+              <a:rPr lang="en-GB" dirty="0" smtClean="0"/>
+              <a:t>asklaila.com/.../Taken-2/8024</a:t>
+            </a:r>
+          </a:p>
+          <a:p>
+            <a:endParaRPr lang="en-GB" dirty="0" smtClean="0"/>
+          </a:p>
+        </p:txBody>
+      </p:sp>
+      <p:sp>
+        <p:nvSpPr>
+          <p:cNvPr id="17" name="Right Arrow 16"/>
+          <p:cNvSpPr/>
+          <p:nvPr/>
+        </p:nvSpPr>
+        <p:spPr>
+          <a:xfrm rot="21353759">
+            <a:off x="5293437" y="3822803"/>
+            <a:ext cx="2961016" cy="144016"/>
+          </a:xfrm>
+          <a:prstGeom prst="rightArrow">
+            <a:avLst>
+              <a:gd name="adj1" fmla="val 12335"/>
+              <a:gd name="adj2" fmla="val 50000"/>
+            </a:avLst>
+          </a:prstGeom>
+        </p:spPr>
+        <p:style>
+          <a:lnRef idx="2">
+            <a:schemeClr val="accent6">
+              <a:shade val="50000"/>
+            </a:schemeClr>
+          </a:lnRef>
+          <a:fillRef idx="1">
+            <a:schemeClr val="accent6"/>
+          </a:fillRef>
+          <a:effectRef idx="0">
+            <a:schemeClr val="accent6"/>
+          </a:effectRef>
+          <a:fontRef idx="minor">
+            <a:schemeClr val="lt1"/>
+          </a:fontRef>
+        </p:style>
+        <p:txBody>
+          <a:bodyPr rtlCol="0" anchor="ctr"/>
+          <a:lstStyle/>
+          <a:p>
+            <a:r>
+              <a:rPr lang="en-GB" dirty="0" smtClean="0"/>
+              <a:t>movie2k.to/Taken-2-watch...</a:t>
+            </a:r>
+            <a:endParaRPr lang="en-GB" dirty="0" smtClean="0"/>
+          </a:p>
+          <a:p>
+            <a:endParaRPr lang="en-GB" dirty="0" smtClean="0"/>
           </a:p>
         </p:txBody>
       </p:sp>
@@ -4611,37 +4778,51 @@
       </p:sp>
       <p:pic>
         <p:nvPicPr>
-          <p:cNvPr id="4" name="Content Placeholder 3"/>
+          <p:cNvPr id="5" name="Picture 4" descr="physical-arch-pres.png"/>
           <p:cNvPicPr>
-            <a:picLocks noGrp="1" noChangeAspect="1"/>
+            <a:picLocks noChangeAspect="1"/>
           </p:cNvPicPr>
-          <p:nvPr>
-            <p:ph idx="1"/>
-          </p:nvPr>
+          <p:nvPr/>
         </p:nvPicPr>
         <p:blipFill>
-          <a:blip r:embed="rId2">
-            <a:extLst>
-              <a:ext uri="{28A0092B-C50C-407E-A947-70E740481C1C}">
-                <a14:useLocalDpi xmlns:a14="http://schemas.microsoft.com/office/drawing/2010/main" val="0"/>
-              </a:ext>
-            </a:extLst>
-          </a:blip>
+          <a:blip r:embed="rId2" cstate="print"/>
           <a:stretch>
             <a:fillRect/>
           </a:stretch>
         </p:blipFill>
         <p:spPr>
           <a:xfrm>
-            <a:off x="1979712" y="1346841"/>
-            <a:ext cx="5184576" cy="5106495"/>
+            <a:off x="1979712" y="1340768"/>
+            <a:ext cx="5256584" cy="5209650"/>
           </a:xfrm>
+          <a:prstGeom prst="rect">
+            <a:avLst/>
+          </a:prstGeom>
         </p:spPr>
       </p:pic>
+      <p:sp>
+        <p:nvSpPr>
+          <p:cNvPr id="6" name="Content Placeholder 5"/>
+          <p:cNvSpPr>
+            <a:spLocks noGrp="1"/>
+          </p:cNvSpPr>
+          <p:nvPr>
+            <p:ph idx="1"/>
+          </p:nvPr>
+        </p:nvSpPr>
+        <p:spPr/>
+        <p:txBody>
+          <a:bodyPr/>
+          <a:lstStyle/>
+          <a:p>
+            <a:endParaRPr lang="en-GB"/>
+          </a:p>
+        </p:txBody>
+      </p:sp>
     </p:spTree>
     <p:extLst>
       <p:ext uri="{BB962C8B-B14F-4D97-AF65-F5344CB8AC3E}">
-        <p14:creationId xmlns:p14="http://schemas.microsoft.com/office/powerpoint/2010/main" val="3245773167"/>
+        <p14:creationId xmlns:p14="http://schemas.microsoft.com/office/powerpoint/2010/main" xmlns="" val="3245773167"/>
       </p:ext>
     </p:extLst>
   </p:cSld>
@@ -4987,7 +5168,7 @@
     </p:spTree>
     <p:extLst>
       <p:ext uri="{BB962C8B-B14F-4D97-AF65-F5344CB8AC3E}">
-        <p14:creationId xmlns:p14="http://schemas.microsoft.com/office/powerpoint/2010/main" val="3521878626"/>
+        <p14:creationId xmlns:p14="http://schemas.microsoft.com/office/powerpoint/2010/main" xmlns="" val="3521878626"/>
       </p:ext>
     </p:extLst>
   </p:cSld>
@@ -5138,7 +5319,7 @@
     </p:spTree>
     <p:extLst>
       <p:ext uri="{BB962C8B-B14F-4D97-AF65-F5344CB8AC3E}">
-        <p14:creationId xmlns:p14="http://schemas.microsoft.com/office/powerpoint/2010/main" val="514011514"/>
+        <p14:creationId xmlns:p14="http://schemas.microsoft.com/office/powerpoint/2010/main" xmlns="" val="514011514"/>
       </p:ext>
     </p:extLst>
   </p:cSld>
@@ -5195,34 +5376,29 @@
           </a:p>
         </p:txBody>
       </p:sp>
-      <p:pic>
-        <p:nvPicPr>
-          <p:cNvPr id="8" name="F1_BY9V8YTo?version=3&amp;hl=en_US&amp;rel=0"/>
-          <p:cNvPicPr>
-            <a:picLocks noGrp="1"/>
-          </p:cNvPicPr>
+      <p:sp>
+        <p:nvSpPr>
+          <p:cNvPr id="5" name="Content Placeholder 4"/>
+          <p:cNvSpPr>
+            <a:spLocks noGrp="1"/>
+          </p:cNvSpPr>
           <p:nvPr>
             <p:ph idx="1"/>
-            <a:videoFile r:link="rId1"/>
-          </p:nvPr>
-        </p:nvPicPr>
-        <p:blipFill>
-          <a:blip r:embed="rId3"/>
-          <a:stretch>
-            <a:fillRect/>
-          </a:stretch>
-        </p:blipFill>
-        <p:spPr>
-          <a:xfrm>
-            <a:off x="899592" y="1124744"/>
-            <a:ext cx="7287949" cy="5465962"/>
-          </a:xfrm>
-          <a:prstGeom prst="rect">
-            <a:avLst/>
-          </a:prstGeom>
-        </p:spPr>
-      </p:pic>
+          </p:nvPr>
+        </p:nvSpPr>
+        <p:spPr/>
+        <p:txBody>
+          <a:bodyPr/>
+          <a:lstStyle/>
+          <a:p>
+            <a:endParaRPr lang="en-GB" dirty="0"/>
+          </a:p>
+        </p:txBody>
+      </p:sp>
     </p:spTree>
+    <p:controls>
+      <p:control spid="1026" name="ShockwaveFlash1" r:id="rId2" imgW="8207280" imgH="5183280"/>
+    </p:controls>
   </p:cSld>
   <p:clrMapOvr>
     <a:masterClrMapping/>
@@ -5230,80 +5406,7 @@
   <p:timing>
     <p:tnLst>
       <p:par>
-        <p:cTn id="1" dur="indefinite" restart="never" nodeType="tmRoot">
-          <p:childTnLst>
-            <p:seq concurrent="1" nextAc="seek">
-              <p:cTn id="2" dur="indefinite" nodeType="mainSeq">
-                <p:childTnLst>
-                  <p:par>
-                    <p:cTn id="3" fill="hold">
-                      <p:stCondLst>
-                        <p:cond delay="indefinite"/>
-                        <p:cond evt="onBegin" delay="0">
-                          <p:tn val="2"/>
-                        </p:cond>
-                      </p:stCondLst>
-                      <p:childTnLst>
-                        <p:par>
-                          <p:cTn id="4" fill="hold">
-                            <p:stCondLst>
-                              <p:cond delay="0"/>
-                            </p:stCondLst>
-                            <p:childTnLst>
-                              <p:par>
-                                <p:cTn id="5" presetID="1" presetClass="mediacall" presetSubtype="0" fill="hold" nodeType="afterEffect">
-                                  <p:stCondLst>
-                                    <p:cond delay="0"/>
-                                  </p:stCondLst>
-                                  <p:childTnLst>
-                                    <p:cmd type="call" cmd="playFrom(0.0)">
-                                      <p:cBhvr>
-                                        <p:cTn id="6" dur="1" fill="hold"/>
-                                        <p:tgtEl>
-                                          <p:spTgt spid="8"/>
-                                        </p:tgtEl>
-                                      </p:cBhvr>
-                                    </p:cmd>
-                                  </p:childTnLst>
-                                </p:cTn>
-                              </p:par>
-                            </p:childTnLst>
-                          </p:cTn>
-                        </p:par>
-                      </p:childTnLst>
-                    </p:cTn>
-                  </p:par>
-                </p:childTnLst>
-              </p:cTn>
-              <p:prevCondLst>
-                <p:cond evt="onPrev" delay="0">
-                  <p:tgtEl>
-                    <p:sldTgt/>
-                  </p:tgtEl>
-                </p:cond>
-              </p:prevCondLst>
-              <p:nextCondLst>
-                <p:cond evt="onNext" delay="0">
-                  <p:tgtEl>
-                    <p:sldTgt/>
-                  </p:tgtEl>
-                </p:cond>
-              </p:nextCondLst>
-            </p:seq>
-            <p:video>
-              <p:cMediaNode vol="80000">
-                <p:cTn id="7" fill="hold" display="0">
-                  <p:stCondLst>
-                    <p:cond delay="indefinite"/>
-                  </p:stCondLst>
-                </p:cTn>
-                <p:tgtEl>
-                  <p:spTgt spid="8"/>
-                </p:tgtEl>
-              </p:cMediaNode>
-            </p:video>
-          </p:childTnLst>
-        </p:cTn>
+        <p:cTn id="1" dur="indefinite" restart="never" nodeType="tmRoot"/>
       </p:par>
     </p:tnLst>
   </p:timing>
@@ -5375,39 +5478,39 @@
               <a:rPr lang="en-GB" dirty="0" smtClean="0"/>
               <a:t>Literature Review</a:t>
             </a:r>
+          </a:p>
+          <a:p>
+            <a:r>
+              <a:rPr lang="en-GB" dirty="0" smtClean="0"/>
+              <a:t>Development within Framework</a:t>
+            </a:r>
+            <a:endParaRPr lang="en-GB" dirty="0"/>
+          </a:p>
+          <a:p>
+            <a:pPr lvl="1"/>
+            <a:r>
+              <a:rPr lang="en-GB" dirty="0" smtClean="0"/>
+              <a:t>Twitter, The Sun, and  RSS Trend sources</a:t>
+            </a:r>
+          </a:p>
+          <a:p>
+            <a:pPr lvl="1"/>
+            <a:r>
+              <a:rPr lang="en-GB" dirty="0" smtClean="0"/>
+              <a:t>Dogpile.co.uk search engine script</a:t>
+            </a:r>
+          </a:p>
+          <a:p>
+            <a:pPr lvl="1"/>
+            <a:r>
+              <a:rPr lang="en-GB" dirty="0" smtClean="0"/>
+              <a:t>Placeholder malware </a:t>
+            </a:r>
+            <a:r>
+              <a:rPr lang="en-GB" dirty="0" err="1" smtClean="0"/>
+              <a:t>anlayser</a:t>
+            </a:r>
             <a:endParaRPr lang="en-GB" dirty="0" smtClean="0"/>
-          </a:p>
-          <a:p>
-            <a:r>
-              <a:rPr lang="en-GB" dirty="0" smtClean="0"/>
-              <a:t>Development within </a:t>
-            </a:r>
-            <a:r>
-              <a:rPr lang="en-GB" dirty="0" smtClean="0"/>
-              <a:t>Framework</a:t>
-            </a:r>
-            <a:endParaRPr lang="en-GB" dirty="0"/>
-          </a:p>
-          <a:p>
-            <a:pPr lvl="1"/>
-            <a:r>
-              <a:rPr lang="en-GB" dirty="0" smtClean="0"/>
-              <a:t>Twitter, The Sun, and  RSS Trend sources</a:t>
-            </a:r>
-          </a:p>
-          <a:p>
-            <a:pPr lvl="1"/>
-            <a:r>
-              <a:rPr lang="en-GB" dirty="0" smtClean="0"/>
-              <a:t>Dogpile.co.uk search engine script</a:t>
-            </a:r>
-          </a:p>
-          <a:p>
-            <a:pPr lvl="1"/>
-            <a:r>
-              <a:rPr lang="en-GB" dirty="0" smtClean="0"/>
-              <a:t>Placeholder malware scanner</a:t>
-            </a:r>
           </a:p>
           <a:p>
             <a:pPr lvl="1"/>
@@ -5525,14 +5628,12 @@
               <a:rPr lang="en-GB" dirty="0" smtClean="0"/>
               <a:t>Add passive malware detection</a:t>
             </a:r>
-            <a:endParaRPr lang="en-GB" dirty="0" smtClean="0"/>
-          </a:p>
-          <a:p>
-            <a:r>
-              <a:rPr lang="en-GB" dirty="0" smtClean="0"/>
-              <a:t>Collect Data</a:t>
-            </a:r>
-            <a:endParaRPr lang="en-GB" dirty="0"/>
+          </a:p>
+          <a:p>
+            <a:r>
+              <a:rPr lang="en-GB" dirty="0" smtClean="0"/>
+              <a:t>Compile sample data for report</a:t>
+            </a:r>
           </a:p>
         </p:txBody>
       </p:sp>
@@ -5802,7 +5903,9 @@
         </p:nvSpPr>
         <p:spPr/>
         <p:txBody>
-          <a:bodyPr/>
+          <a:bodyPr>
+            <a:normAutofit fontScale="70000" lnSpcReduction="20000"/>
+          </a:bodyPr>
           <a:lstStyle/>
           <a:p>
             <a:pPr marL="971550" lvl="1" indent="-514350">
@@ -5828,6 +5931,175 @@
               <a:buFont typeface="+mj-lt"/>
               <a:buAutoNum type="arabicPeriod"/>
             </a:pPr>
+            <a:r>
+              <a:rPr lang="en-GB" dirty="0" smtClean="0"/>
+              <a:t>John P. John, Fang Yu, </a:t>
+            </a:r>
+            <a:r>
+              <a:rPr lang="en-GB" dirty="0" err="1" smtClean="0"/>
+              <a:t>Yinglian</a:t>
+            </a:r>
+            <a:r>
+              <a:rPr lang="en-GB" dirty="0" smtClean="0"/>
+              <a:t> </a:t>
+            </a:r>
+            <a:r>
+              <a:rPr lang="en-GB" dirty="0" err="1" smtClean="0"/>
+              <a:t>Xie</a:t>
+            </a:r>
+            <a:r>
+              <a:rPr lang="en-GB" dirty="0" smtClean="0"/>
+              <a:t>, </a:t>
+            </a:r>
+            <a:r>
+              <a:rPr lang="en-GB" dirty="0" err="1" smtClean="0"/>
+              <a:t>Arvind</a:t>
+            </a:r>
+            <a:r>
+              <a:rPr lang="en-GB" dirty="0" smtClean="0"/>
+              <a:t> Krishnamurthy, and </a:t>
+            </a:r>
+            <a:r>
+              <a:rPr lang="en-GB" dirty="0" err="1" smtClean="0"/>
+              <a:t>Martín</a:t>
+            </a:r>
+            <a:r>
+              <a:rPr lang="en-GB" dirty="0" smtClean="0"/>
+              <a:t> </a:t>
+            </a:r>
+            <a:r>
+              <a:rPr lang="en-GB" dirty="0" err="1" smtClean="0"/>
+              <a:t>Abadi</a:t>
+            </a:r>
+            <a:r>
+              <a:rPr lang="en-GB" dirty="0" smtClean="0"/>
+              <a:t>. 2011. </a:t>
+            </a:r>
+            <a:r>
+              <a:rPr lang="en-GB" dirty="0" err="1" smtClean="0"/>
+              <a:t>deSEO</a:t>
+            </a:r>
+            <a:r>
+              <a:rPr lang="en-GB" dirty="0" smtClean="0"/>
+              <a:t>: combating search-result poisoning. In </a:t>
+            </a:r>
+            <a:r>
+              <a:rPr lang="en-GB" i="1" dirty="0" smtClean="0"/>
+              <a:t>Proceedings of the 20th USENIX conference on Security</a:t>
+            </a:r>
+            <a:r>
+              <a:rPr lang="en-GB" dirty="0" smtClean="0"/>
+              <a:t>(SEC'11). USENIX Association, Berkeley, CA, USA, 20-20</a:t>
+            </a:r>
+            <a:r>
+              <a:rPr lang="en-GB" dirty="0" smtClean="0"/>
+              <a:t>.</a:t>
+            </a:r>
+          </a:p>
+          <a:p>
+            <a:pPr marL="971550" lvl="1" indent="-514350">
+              <a:buFont typeface="+mj-lt"/>
+              <a:buAutoNum type="arabicPeriod"/>
+            </a:pPr>
+            <a:r>
+              <a:rPr lang="en-GB" dirty="0" err="1" smtClean="0"/>
+              <a:t>Byung-Ik</a:t>
+            </a:r>
+            <a:r>
+              <a:rPr lang="en-GB" dirty="0" smtClean="0"/>
+              <a:t> Kim, B. I. K., </a:t>
+            </a:r>
+            <a:r>
+              <a:rPr lang="en-GB" dirty="0" err="1" smtClean="0"/>
+              <a:t>Jongil</a:t>
+            </a:r>
+            <a:r>
+              <a:rPr lang="en-GB" dirty="0" smtClean="0"/>
+              <a:t> </a:t>
+            </a:r>
+            <a:r>
+              <a:rPr lang="en-GB" dirty="0" err="1" smtClean="0"/>
+              <a:t>Jeong</a:t>
+            </a:r>
+            <a:r>
+              <a:rPr lang="en-GB" dirty="0" smtClean="0"/>
+              <a:t>, J. J., &amp; </a:t>
+            </a:r>
+            <a:r>
+              <a:rPr lang="en-GB" dirty="0" err="1" smtClean="0"/>
+              <a:t>Hyuncheol</a:t>
+            </a:r>
+            <a:r>
+              <a:rPr lang="en-GB" dirty="0" smtClean="0"/>
+              <a:t> </a:t>
+            </a:r>
+            <a:r>
+              <a:rPr lang="en-GB" dirty="0" err="1" smtClean="0"/>
+              <a:t>Jeong</a:t>
+            </a:r>
+            <a:r>
+              <a:rPr lang="en-GB" dirty="0" smtClean="0"/>
+              <a:t>, H. J. (2012). A Study on the Automatic Malware Collecting System Based on the Searching Keyword. </a:t>
+            </a:r>
+            <a:r>
+              <a:rPr lang="en-GB" i="1" dirty="0" smtClean="0"/>
+              <a:t>International Journal of Hybrid Information Technology</a:t>
+            </a:r>
+            <a:r>
+              <a:rPr lang="en-GB" dirty="0" smtClean="0"/>
+              <a:t>, </a:t>
+            </a:r>
+            <a:r>
+              <a:rPr lang="en-GB" i="1" dirty="0" smtClean="0"/>
+              <a:t>5</a:t>
+            </a:r>
+            <a:r>
+              <a:rPr lang="en-GB" dirty="0" smtClean="0"/>
+              <a:t>(1), 47-60</a:t>
+            </a:r>
+            <a:endParaRPr lang="en-GB" dirty="0" smtClean="0"/>
+          </a:p>
+          <a:p>
+            <a:pPr marL="971550" lvl="1" indent="-514350">
+              <a:buFont typeface="+mj-lt"/>
+              <a:buAutoNum type="arabicPeriod"/>
+            </a:pPr>
+            <a:r>
+              <a:rPr lang="en-GB" dirty="0" smtClean="0"/>
+              <a:t>Tyler Moore, </a:t>
+            </a:r>
+            <a:r>
+              <a:rPr lang="en-GB" dirty="0" err="1" smtClean="0"/>
+              <a:t>Nektarios</a:t>
+            </a:r>
+            <a:r>
+              <a:rPr lang="en-GB" dirty="0" smtClean="0"/>
+              <a:t> </a:t>
+            </a:r>
+            <a:r>
+              <a:rPr lang="en-GB" dirty="0" err="1" smtClean="0"/>
+              <a:t>Leontiadis</a:t>
+            </a:r>
+            <a:r>
+              <a:rPr lang="en-GB" dirty="0" smtClean="0"/>
+              <a:t>, and Nicolas </a:t>
+            </a:r>
+            <a:r>
+              <a:rPr lang="en-GB" dirty="0" err="1" smtClean="0"/>
+              <a:t>Christin</a:t>
+            </a:r>
+            <a:r>
+              <a:rPr lang="en-GB" dirty="0" smtClean="0"/>
+              <a:t>. 2011. Fashion crimes: trending-term exploitation on the web. In </a:t>
+            </a:r>
+            <a:r>
+              <a:rPr lang="en-GB" i="1" dirty="0" smtClean="0"/>
+              <a:t>Proceedings of the 18th ACM conference on Computer and communications security</a:t>
+            </a:r>
+            <a:r>
+              <a:rPr lang="en-GB" dirty="0" smtClean="0"/>
+              <a:t> (CCS '11). ACM, New York, NY, USA, 455-466. </a:t>
+            </a:r>
             <a:endParaRPr lang="en-GB" dirty="0"/>
           </a:p>
         </p:txBody>
@@ -6127,7 +6399,7 @@
     </p:spTree>
     <p:extLst>
       <p:ext uri="{BB962C8B-B14F-4D97-AF65-F5344CB8AC3E}">
-        <p14:creationId xmlns:p14="http://schemas.microsoft.com/office/powerpoint/2010/main" val="3818486410"/>
+        <p14:creationId xmlns:p14="http://schemas.microsoft.com/office/powerpoint/2010/main" xmlns="" val="3818486410"/>
       </p:ext>
     </p:extLst>
   </p:cSld>
@@ -6458,7 +6730,6 @@
               <a:rPr lang="en-GB" dirty="0"/>
               <a:t>Result: MFA $100,000 per month, Malware $60,000 per month before search-engine intervention. </a:t>
             </a:r>
-            <a:endParaRPr lang="en-GB" dirty="0"/>
           </a:p>
         </p:txBody>
       </p:sp>
@@ -6547,21 +6818,65 @@
             </a:r>
             <a:r>
               <a:rPr lang="en-GB" dirty="0"/>
-              <a:t>:  28th May 2010 --- 3rd Feb 2011     (~7 months)</a:t>
+              <a:t>:  28th May 2010 </a:t>
+            </a:r>
+            <a:r>
+              <a:rPr lang="en-GB" dirty="0" smtClean="0"/>
+              <a:t>- </a:t>
+            </a:r>
+            <a:r>
+              <a:rPr lang="en-GB" dirty="0"/>
+              <a:t>3rd Feb </a:t>
+            </a:r>
+            <a:r>
+              <a:rPr lang="en-GB" dirty="0" smtClean="0"/>
+              <a:t>2011 </a:t>
+            </a:r>
+            <a:r>
+              <a:rPr lang="en-GB" dirty="0"/>
+              <a:t>(~7 months)</a:t>
             </a:r>
           </a:p>
           <a:p>
             <a:pPr lvl="1"/>
             <a:r>
               <a:rPr lang="en-GB" dirty="0"/>
-              <a:t>Automatic Malware Collecting System:  22nd Nov 2010 --- 11th Jan 2011     (~2 months)</a:t>
+              <a:t>Automatic Malware Collecting System:  22nd Nov 2010 </a:t>
+            </a:r>
+            <a:r>
+              <a:rPr lang="en-GB" dirty="0" smtClean="0"/>
+              <a:t>-</a:t>
+            </a:r>
+            <a:r>
+              <a:rPr lang="en-GB" dirty="0" smtClean="0"/>
+              <a:t> </a:t>
+            </a:r>
+            <a:r>
+              <a:rPr lang="en-GB" dirty="0"/>
+              <a:t>11th Jan 2011 </a:t>
+            </a:r>
+            <a:r>
+              <a:rPr lang="en-GB" dirty="0" smtClean="0"/>
+              <a:t>(~</a:t>
+            </a:r>
+            <a:r>
+              <a:rPr lang="en-GB" dirty="0"/>
+              <a:t>2 months)</a:t>
             </a:r>
           </a:p>
           <a:p>
             <a:pPr lvl="1"/>
             <a:r>
               <a:rPr lang="en-GB" dirty="0"/>
-              <a:t>Trending-term Exploitation:  24th Jul 2010 --- 24 Apr 2011     (9 months)</a:t>
+              <a:t>Trending-term Exploitation:  24th Jul 2010 </a:t>
+            </a:r>
+            <a:r>
+              <a:rPr lang="en-GB" dirty="0" smtClean="0"/>
+              <a:t>- </a:t>
+            </a:r>
+            <a:r>
+              <a:rPr lang="en-GB" dirty="0"/>
+              <a:t>24 Apr 2011     (9 months)</a:t>
             </a:r>
           </a:p>
           <a:p>
@@ -6571,20 +6886,18 @@
             <a:endParaRPr lang="en-GB" dirty="0" smtClean="0"/>
           </a:p>
           <a:p>
-            <a:pPr marL="0" indent="0">
-              <a:buNone/>
-            </a:pPr>
-            <a:r>
-              <a:rPr lang="en-GB" dirty="0" smtClean="0"/>
-              <a:t>The </a:t>
-            </a:r>
-            <a:r>
-              <a:rPr lang="en-GB" dirty="0"/>
-              <a:t>time we have: 1st Oct 2012 </a:t>
-            </a:r>
-            <a:r>
-              <a:rPr lang="en-GB" dirty="0" smtClean="0"/>
-              <a:t>- </a:t>
+            <a:pPr marL="0" indent="0"/>
+            <a:r>
+              <a:rPr lang="en-GB" dirty="0" smtClean="0"/>
+              <a:t>   GDP Duration: </a:t>
+            </a:r>
+            <a:r>
+              <a:rPr lang="en-GB" dirty="0"/>
+              <a:t>1st </a:t>
+            </a:r>
+            <a:r>
+              <a:rPr lang="en-GB" dirty="0" smtClean="0"/>
+              <a:t>Oct - </a:t>
             </a:r>
             <a:r>
               <a:rPr lang="en-GB" dirty="0"/>
@@ -6592,20 +6905,19 @@
             </a:r>
             <a:r>
               <a:rPr lang="en-GB" dirty="0" smtClean="0"/>
-              <a:t>(~2 </a:t>
-            </a:r>
-            <a:r>
-              <a:rPr lang="en-GB" dirty="0"/>
-              <a:t>month)</a:t>
-            </a:r>
-          </a:p>
-          <a:p>
+              <a:t>(11 weeks)</a:t>
+            </a:r>
+            <a:endParaRPr lang="en-GB" dirty="0"/>
+          </a:p>
+          <a:p>
+            <a:pPr lvl="1"/>
             <a:r>
               <a:rPr lang="en-GB" dirty="0"/>
               <a:t>Start the project from scratch</a:t>
             </a:r>
           </a:p>
           <a:p>
+            <a:pPr lvl="1"/>
             <a:r>
               <a:rPr lang="en-GB" dirty="0"/>
               <a:t>2 presentations</a:t>

</xml_diff>

<commit_message>
Rendered presentation as PDF for web
</commit_message>
<xml_diff>
--- a/doc/pres1/wk4-progress.pptx
+++ b/doc/pres1/wk4-progress.pptx
@@ -324,7 +324,7 @@
     </p:spTree>
     <p:extLst>
       <p:ext uri="{BB962C8B-B14F-4D97-AF65-F5344CB8AC3E}">
-        <p14:creationId xmlns:p14="http://schemas.microsoft.com/office/powerpoint/2010/main" xmlns="" val="1901348598"/>
+        <p14:creationId xmlns="" xmlns:p14="http://schemas.microsoft.com/office/powerpoint/2010/main" val="1901348598"/>
       </p:ext>
     </p:extLst>
   </p:cSld>
@@ -586,7 +586,7 @@
     </p:spTree>
     <p:extLst>
       <p:ext uri="{BB962C8B-B14F-4D97-AF65-F5344CB8AC3E}">
-        <p14:creationId xmlns:p14="http://schemas.microsoft.com/office/powerpoint/2010/main" xmlns="" val="1219798393"/>
+        <p14:creationId xmlns="" xmlns:p14="http://schemas.microsoft.com/office/powerpoint/2010/main" val="1219798393"/>
       </p:ext>
     </p:extLst>
   </p:cSld>
@@ -4110,11 +4110,7 @@
             <a:pPr algn="ctr"/>
             <a:r>
               <a:rPr lang="en-GB" dirty="0" smtClean="0"/>
-              <a:t>Taken </a:t>
-            </a:r>
-            <a:r>
-              <a:rPr lang="en-GB" dirty="0" smtClean="0"/>
-              <a:t>2</a:t>
+              <a:t>Taken 2</a:t>
             </a:r>
           </a:p>
           <a:p>
@@ -4164,11 +4160,7 @@
             <a:pPr algn="ctr"/>
             <a:r>
               <a:rPr lang="en-GB" dirty="0" smtClean="0"/>
-              <a:t>Russell </a:t>
-            </a:r>
-            <a:r>
-              <a:rPr lang="en-GB" dirty="0" smtClean="0"/>
-              <a:t>Howard</a:t>
+              <a:t>Russell Howard</a:t>
             </a:r>
           </a:p>
           <a:p>
@@ -4317,11 +4309,7 @@
           <a:p>
             <a:r>
               <a:rPr lang="en-GB" dirty="0" smtClean="0"/>
-              <a:t>imdb.com</a:t>
-            </a:r>
-            <a:r>
-              <a:rPr lang="en-GB" dirty="0" smtClean="0"/>
-              <a:t>/...</a:t>
+              <a:t>imdb.com/...</a:t>
             </a:r>
           </a:p>
           <a:p>
@@ -4467,7 +4455,6 @@
               <a:rPr lang="en-GB" dirty="0" smtClean="0"/>
               <a:t>movie2k.to/Taken-2-watch...</a:t>
             </a:r>
-            <a:endParaRPr lang="en-GB" dirty="0" smtClean="0"/>
           </a:p>
           <a:p>
             <a:endParaRPr lang="en-GB" dirty="0" smtClean="0"/>
@@ -4822,7 +4809,7 @@
     </p:spTree>
     <p:extLst>
       <p:ext uri="{BB962C8B-B14F-4D97-AF65-F5344CB8AC3E}">
-        <p14:creationId xmlns:p14="http://schemas.microsoft.com/office/powerpoint/2010/main" xmlns="" val="3245773167"/>
+        <p14:creationId xmlns="" xmlns:p14="http://schemas.microsoft.com/office/powerpoint/2010/main" val="3245773167"/>
       </p:ext>
     </p:extLst>
   </p:cSld>
@@ -5168,7 +5155,7 @@
     </p:spTree>
     <p:extLst>
       <p:ext uri="{BB962C8B-B14F-4D97-AF65-F5344CB8AC3E}">
-        <p14:creationId xmlns:p14="http://schemas.microsoft.com/office/powerpoint/2010/main" xmlns="" val="3521878626"/>
+        <p14:creationId xmlns="" xmlns:p14="http://schemas.microsoft.com/office/powerpoint/2010/main" val="3521878626"/>
       </p:ext>
     </p:extLst>
   </p:cSld>
@@ -5319,7 +5306,7 @@
     </p:spTree>
     <p:extLst>
       <p:ext uri="{BB962C8B-B14F-4D97-AF65-F5344CB8AC3E}">
-        <p14:creationId xmlns:p14="http://schemas.microsoft.com/office/powerpoint/2010/main" xmlns="" val="514011514"/>
+        <p14:creationId xmlns="" xmlns:p14="http://schemas.microsoft.com/office/powerpoint/2010/main" val="514011514"/>
       </p:ext>
     </p:extLst>
   </p:cSld>
@@ -5989,11 +5976,7 @@
             </a:r>
             <a:r>
               <a:rPr lang="en-GB" dirty="0" smtClean="0"/>
-              <a:t>(SEC'11). USENIX Association, Berkeley, CA, USA, 20-20</a:t>
-            </a:r>
-            <a:r>
-              <a:rPr lang="en-GB" dirty="0" smtClean="0"/>
-              <a:t>.</a:t>
+              <a:t>(SEC'11). USENIX Association, Berkeley, CA, USA, 20-20.</a:t>
             </a:r>
           </a:p>
           <a:p>
@@ -6057,7 +6040,6 @@
               <a:rPr lang="en-GB" dirty="0" smtClean="0"/>
               <a:t>(1), 47-60</a:t>
             </a:r>
-            <a:endParaRPr lang="en-GB" dirty="0" smtClean="0"/>
           </a:p>
           <a:p>
             <a:pPr marL="971550" lvl="1" indent="-514350">
@@ -6399,7 +6381,7 @@
     </p:spTree>
     <p:extLst>
       <p:ext uri="{BB962C8B-B14F-4D97-AF65-F5344CB8AC3E}">
-        <p14:creationId xmlns:p14="http://schemas.microsoft.com/office/powerpoint/2010/main" xmlns="" val="3818486410"/>
+        <p14:creationId xmlns="" xmlns:p14="http://schemas.microsoft.com/office/powerpoint/2010/main" val="3818486410"/>
       </p:ext>
     </p:extLst>
   </p:cSld>
@@ -6845,11 +6827,7 @@
             </a:r>
             <a:r>
               <a:rPr lang="en-GB" dirty="0" smtClean="0"/>
-              <a:t>-</a:t>
-            </a:r>
-            <a:r>
-              <a:rPr lang="en-GB" dirty="0" smtClean="0"/>
-              <a:t> </a:t>
+              <a:t>- </a:t>
             </a:r>
             <a:r>
               <a:rPr lang="en-GB" dirty="0"/>

</xml_diff>